<commit_message>
GNU history was added
</commit_message>
<xml_diff>
--- a/amirkabir_linux_festival.pptx
+++ b/amirkabir_linux_festival.pptx
@@ -5,17 +5,23 @@
     <p:sldMasterId id="2147483648" r:id="rId1"/>
   </p:sldMasterIdLst>
   <p:notesMasterIdLst>
-    <p:notesMasterId r:id="rId7"/>
+    <p:notesMasterId r:id="rId13"/>
   </p:notesMasterIdLst>
   <p:handoutMasterIdLst>
-    <p:handoutMasterId r:id="rId8"/>
+    <p:handoutMasterId r:id="rId14"/>
   </p:handoutMasterIdLst>
   <p:sldIdLst>
     <p:sldId id="256" r:id="rId2"/>
     <p:sldId id="257" r:id="rId3"/>
-    <p:sldId id="258" r:id="rId4"/>
-    <p:sldId id="260" r:id="rId5"/>
-    <p:sldId id="261" r:id="rId6"/>
+    <p:sldId id="264" r:id="rId4"/>
+    <p:sldId id="258" r:id="rId5"/>
+    <p:sldId id="260" r:id="rId6"/>
+    <p:sldId id="261" r:id="rId7"/>
+    <p:sldId id="262" r:id="rId8"/>
+    <p:sldId id="265" r:id="rId9"/>
+    <p:sldId id="263" r:id="rId10"/>
+    <p:sldId id="267" r:id="rId11"/>
+    <p:sldId id="266" r:id="rId12"/>
   </p:sldIdLst>
   <p:sldSz cx="12192000" cy="6858000"/>
   <p:notesSz cx="6858000" cy="9144000"/>
@@ -218,7 +224,7 @@
           <a:p>
             <a:fld id="{762B48F5-BACC-47D6-A0F7-82FBF9C6BC85}" type="datetimeFigureOut">
               <a:rPr lang="en-US"/>
-              <a:t>2/1/2020</a:t>
+              <a:t>2/2/2020</a:t>
             </a:fld>
             <a:endParaRPr/>
           </a:p>
@@ -383,7 +389,7 @@
           <a:p>
             <a:fld id="{0CB1CD00-5424-4675-AB18-2C419B060449}" type="datetimeFigureOut">
               <a:rPr lang="en-US"/>
-              <a:t>2/1/2020</a:t>
+              <a:t>2/2/2020</a:t>
             </a:fld>
             <a:endParaRPr/>
           </a:p>
@@ -1034,7 +1040,7 @@
           <a:p>
             <a:fld id="{37CC0096-1860-4642-9CD2-0079EA5E7CD1}" type="datetimeFigureOut">
               <a:rPr lang="en-US" smtClean="0"/>
-              <a:t>2/1/2020</a:t>
+              <a:t>2/2/2020</a:t>
             </a:fld>
             <a:endParaRPr lang="en-US"/>
           </a:p>
@@ -1214,7 +1220,7 @@
           <a:p>
             <a:fld id="{37CC0096-1860-4642-9CD2-0079EA5E7CD1}" type="datetimeFigureOut">
               <a:rPr lang="en-US" smtClean="0"/>
-              <a:t>2/1/2020</a:t>
+              <a:t>2/2/2020</a:t>
             </a:fld>
             <a:endParaRPr lang="en-US"/>
           </a:p>
@@ -1388,7 +1394,7 @@
           <a:p>
             <a:fld id="{37CC0096-1860-4642-9CD2-0079EA5E7CD1}" type="datetimeFigureOut">
               <a:rPr lang="en-US" smtClean="0"/>
-              <a:t>2/1/2020</a:t>
+              <a:t>2/2/2020</a:t>
             </a:fld>
             <a:endParaRPr lang="en-US"/>
           </a:p>
@@ -1823,7 +1829,7 @@
           <a:p>
             <a:fld id="{37CC0096-1860-4642-9CD2-0079EA5E7CD1}" type="datetimeFigureOut">
               <a:rPr lang="en-US" smtClean="0"/>
-              <a:t>2/1/2020</a:t>
+              <a:t>2/2/2020</a:t>
             </a:fld>
             <a:endParaRPr lang="en-US"/>
           </a:p>
@@ -2263,7 +2269,7 @@
           <a:p>
             <a:fld id="{37CC0096-1860-4642-9CD2-0079EA5E7CD1}" type="datetimeFigureOut">
               <a:rPr lang="en-US" smtClean="0"/>
-              <a:t>2/1/2020</a:t>
+              <a:t>2/2/2020</a:t>
             </a:fld>
             <a:endParaRPr lang="en-US"/>
           </a:p>
@@ -2381,7 +2387,7 @@
           <a:p>
             <a:fld id="{37CC0096-1860-4642-9CD2-0079EA5E7CD1}" type="datetimeFigureOut">
               <a:rPr lang="en-US" smtClean="0"/>
-              <a:t>2/1/2020</a:t>
+              <a:t>2/2/2020</a:t>
             </a:fld>
             <a:endParaRPr lang="en-US"/>
           </a:p>
@@ -2476,7 +2482,7 @@
           <a:p>
             <a:fld id="{37CC0096-1860-4642-9CD2-0079EA5E7CD1}" type="datetimeFigureOut">
               <a:rPr lang="en-US" smtClean="0"/>
-              <a:t>2/1/2020</a:t>
+              <a:t>2/2/2020</a:t>
             </a:fld>
             <a:endParaRPr lang="en-US"/>
           </a:p>
@@ -2760,7 +2766,7 @@
           <a:p>
             <a:fld id="{37CC0096-1860-4642-9CD2-0079EA5E7CD1}" type="datetimeFigureOut">
               <a:rPr lang="en-US" smtClean="0"/>
-              <a:t>2/1/2020</a:t>
+              <a:t>2/2/2020</a:t>
             </a:fld>
             <a:endParaRPr lang="en-US"/>
           </a:p>
@@ -3073,7 +3079,7 @@
           <a:p>
             <a:fld id="{37CC0096-1860-4642-9CD2-0079EA5E7CD1}" type="datetimeFigureOut">
               <a:rPr lang="en-US" smtClean="0"/>
-              <a:t>2/1/2020</a:t>
+              <a:t>2/2/2020</a:t>
             </a:fld>
             <a:endParaRPr lang="en-US"/>
           </a:p>
@@ -3305,7 +3311,7 @@
             <a:fld id="{37CC0096-1860-4642-9CD2-0079EA5E7CD1}" type="datetimeFigureOut">
               <a:rPr lang="en-US" smtClean="0"/>
               <a:pPr/>
-              <a:t>2/1/2020</a:t>
+              <a:t>2/2/2020</a:t>
             </a:fld>
             <a:endParaRPr lang="en-US"/>
           </a:p>
@@ -3803,6 +3809,750 @@
 </p:sld>
 </file>
 
+<file path=ppt/slides/slide10.xml><?xml version="1.0" encoding="utf-8"?>
+<p:sld xmlns:a="http://schemas.openxmlformats.org/drawingml/2006/main" xmlns:r="http://schemas.openxmlformats.org/officeDocument/2006/relationships" xmlns:p="http://schemas.openxmlformats.org/presentationml/2006/main">
+  <p:cSld>
+    <p:spTree>
+      <p:nvGrpSpPr>
+        <p:cNvPr id="1" name=""/>
+        <p:cNvGrpSpPr/>
+        <p:nvPr/>
+      </p:nvGrpSpPr>
+      <p:grpSpPr>
+        <a:xfrm>
+          <a:off x="0" y="0"/>
+          <a:ext cx="0" cy="0"/>
+          <a:chOff x="0" y="0"/>
+          <a:chExt cx="0" cy="0"/>
+        </a:xfrm>
+      </p:grpSpPr>
+      <p:sp>
+        <p:nvSpPr>
+          <p:cNvPr id="6" name="TextBox 5"/>
+          <p:cNvSpPr txBox="1"/>
+          <p:nvPr/>
+        </p:nvSpPr>
+        <p:spPr>
+          <a:xfrm>
+            <a:off x="457200" y="533400"/>
+            <a:ext cx="9905999" cy="369332"/>
+          </a:xfrm>
+          <a:prstGeom prst="rect">
+            <a:avLst/>
+          </a:prstGeom>
+          <a:noFill/>
+        </p:spPr>
+        <p:txBody>
+          <a:bodyPr wrap="square" rtlCol="0">
+            <a:spAutoFit/>
+          </a:bodyPr>
+          <a:lstStyle/>
+          <a:p>
+            <a:r>
+              <a:rPr lang="en-US" dirty="0"/>
+              <a:t>Copyleft</a:t>
+            </a:r>
+            <a:r>
+              <a:rPr lang="en-US" dirty="0" smtClean="0"/>
+              <a:t> and GPL (GNU General Public License):</a:t>
+            </a:r>
+            <a:endParaRPr lang="en-US" dirty="0"/>
+          </a:p>
+        </p:txBody>
+      </p:sp>
+      <p:sp>
+        <p:nvSpPr>
+          <p:cNvPr id="7" name="Rectangle 6"/>
+          <p:cNvSpPr/>
+          <p:nvPr/>
+        </p:nvSpPr>
+        <p:spPr>
+          <a:xfrm>
+            <a:off x="914401" y="1416630"/>
+            <a:ext cx="9601200" cy="1477328"/>
+          </a:xfrm>
+          <a:prstGeom prst="rect">
+            <a:avLst/>
+          </a:prstGeom>
+        </p:spPr>
+        <p:txBody>
+          <a:bodyPr wrap="square">
+            <a:spAutoFit/>
+          </a:bodyPr>
+          <a:lstStyle/>
+          <a:p>
+            <a:pPr marL="285750" lvl="1" indent="-285750">
+              <a:buFont typeface="Arial" panose="020B0604020202020204" pitchFamily="34" charset="0"/>
+              <a:buChar char="•"/>
+            </a:pPr>
+            <a:r>
+              <a:rPr lang="en-US" dirty="0">
+                <a:solidFill>
+                  <a:schemeClr val="accent1"/>
+                </a:solidFill>
+              </a:rPr>
+              <a:t>instead of a means for restricting a program, it becomes a </a:t>
+            </a:r>
+            <a:r>
+              <a:rPr lang="en-US" dirty="0">
+                <a:solidFill>
+                  <a:schemeClr val="accent3"/>
+                </a:solidFill>
+              </a:rPr>
+              <a:t>means for keeping the program </a:t>
+            </a:r>
+            <a:r>
+              <a:rPr lang="en-US" dirty="0" smtClean="0">
+                <a:solidFill>
+                  <a:schemeClr val="accent3"/>
+                </a:solidFill>
+              </a:rPr>
+              <a:t>free</a:t>
+            </a:r>
+            <a:r>
+              <a:rPr lang="fa-IR" dirty="0" smtClean="0">
+                <a:solidFill>
+                  <a:schemeClr val="accent1"/>
+                </a:solidFill>
+              </a:rPr>
+              <a:t>.</a:t>
+            </a:r>
+            <a:r>
+              <a:rPr lang="en-US" dirty="0" smtClean="0">
+                <a:solidFill>
+                  <a:schemeClr val="accent1"/>
+                </a:solidFill>
+              </a:rPr>
+              <a:t> The </a:t>
+            </a:r>
+            <a:r>
+              <a:rPr lang="en-US" dirty="0" smtClean="0">
+                <a:solidFill>
+                  <a:schemeClr val="accent3"/>
+                </a:solidFill>
+              </a:rPr>
+              <a:t>central idea </a:t>
+            </a:r>
+            <a:r>
+              <a:rPr lang="en-US" dirty="0" smtClean="0">
+                <a:solidFill>
+                  <a:schemeClr val="accent1"/>
+                </a:solidFill>
+              </a:rPr>
+              <a:t>of copyleft is that we give everyone </a:t>
+            </a:r>
+            <a:r>
+              <a:rPr lang="en-US" dirty="0" smtClean="0">
+                <a:solidFill>
+                  <a:schemeClr val="accent3"/>
+                </a:solidFill>
+              </a:rPr>
+              <a:t>permission</a:t>
+            </a:r>
+            <a:r>
+              <a:rPr lang="en-US" dirty="0" smtClean="0">
+                <a:solidFill>
+                  <a:schemeClr val="accent1"/>
+                </a:solidFill>
+              </a:rPr>
+              <a:t> to </a:t>
+            </a:r>
+            <a:r>
+              <a:rPr lang="en-US" dirty="0" smtClean="0">
+                <a:solidFill>
+                  <a:schemeClr val="accent3"/>
+                </a:solidFill>
+              </a:rPr>
+              <a:t>run </a:t>
+            </a:r>
+            <a:r>
+              <a:rPr lang="en-US" dirty="0" smtClean="0">
+                <a:solidFill>
+                  <a:schemeClr val="accent1"/>
+                </a:solidFill>
+              </a:rPr>
+              <a:t>the</a:t>
+            </a:r>
+            <a:r>
+              <a:rPr lang="en-US" dirty="0" smtClean="0">
+                <a:solidFill>
+                  <a:schemeClr val="accent3"/>
+                </a:solidFill>
+              </a:rPr>
+              <a:t> </a:t>
+            </a:r>
+            <a:r>
+              <a:rPr lang="en-US" dirty="0" smtClean="0">
+                <a:solidFill>
+                  <a:schemeClr val="accent1"/>
+                </a:solidFill>
+              </a:rPr>
+              <a:t>program, </a:t>
+            </a:r>
+            <a:r>
+              <a:rPr lang="en-US" dirty="0">
+                <a:solidFill>
+                  <a:schemeClr val="accent3"/>
+                </a:solidFill>
+              </a:rPr>
+              <a:t>copy</a:t>
+            </a:r>
+            <a:r>
+              <a:rPr lang="en-US" dirty="0">
+                <a:solidFill>
+                  <a:schemeClr val="accent1"/>
+                </a:solidFill>
+              </a:rPr>
+              <a:t> the program, </a:t>
+            </a:r>
+            <a:r>
+              <a:rPr lang="en-US" dirty="0">
+                <a:solidFill>
+                  <a:schemeClr val="accent3"/>
+                </a:solidFill>
+              </a:rPr>
+              <a:t>modify</a:t>
+            </a:r>
+            <a:r>
+              <a:rPr lang="en-US" dirty="0">
+                <a:solidFill>
+                  <a:schemeClr val="accent1"/>
+                </a:solidFill>
+              </a:rPr>
+              <a:t> the program, and </a:t>
+            </a:r>
+            <a:r>
+              <a:rPr lang="en-US" dirty="0">
+                <a:solidFill>
+                  <a:schemeClr val="accent3"/>
+                </a:solidFill>
+              </a:rPr>
+              <a:t>distribute modified </a:t>
+            </a:r>
+            <a:r>
+              <a:rPr lang="en-US" dirty="0" smtClean="0">
+                <a:solidFill>
+                  <a:schemeClr val="accent1"/>
+                </a:solidFill>
+              </a:rPr>
+              <a:t>versions </a:t>
+            </a:r>
+            <a:r>
+              <a:rPr lang="en-US" dirty="0" smtClean="0">
+                <a:solidFill>
+                  <a:schemeClr val="accent3"/>
+                </a:solidFill>
+              </a:rPr>
+              <a:t>but </a:t>
+            </a:r>
+            <a:r>
+              <a:rPr lang="en-US" dirty="0">
+                <a:solidFill>
+                  <a:schemeClr val="accent3"/>
+                </a:solidFill>
+              </a:rPr>
+              <a:t>not permission to add restrictions of their own</a:t>
+            </a:r>
+            <a:r>
+              <a:rPr lang="en-US" dirty="0">
+                <a:solidFill>
+                  <a:schemeClr val="accent1"/>
+                </a:solidFill>
+              </a:rPr>
+              <a:t>. </a:t>
+            </a:r>
+            <a:r>
+              <a:rPr lang="en-US" dirty="0"/>
+              <a:t/>
+            </a:r>
+            <a:br>
+              <a:rPr lang="en-US" dirty="0"/>
+            </a:br>
+            <a:endParaRPr lang="en-US" dirty="0">
+              <a:solidFill>
+                <a:schemeClr val="accent1"/>
+              </a:solidFill>
+            </a:endParaRPr>
+          </a:p>
+        </p:txBody>
+      </p:sp>
+      <p:sp>
+        <p:nvSpPr>
+          <p:cNvPr id="8" name="Rectangle 7"/>
+          <p:cNvSpPr/>
+          <p:nvPr/>
+        </p:nvSpPr>
+        <p:spPr>
+          <a:xfrm>
+            <a:off x="914402" y="1013505"/>
+            <a:ext cx="4027064" cy="369332"/>
+          </a:xfrm>
+          <a:prstGeom prst="rect">
+            <a:avLst/>
+          </a:prstGeom>
+        </p:spPr>
+        <p:txBody>
+          <a:bodyPr wrap="none">
+            <a:spAutoFit/>
+          </a:bodyPr>
+          <a:lstStyle/>
+          <a:p>
+            <a:pPr marL="285750" indent="-285750">
+              <a:buFont typeface="Arial" panose="020B0604020202020204" pitchFamily="34" charset="0"/>
+              <a:buChar char="•"/>
+            </a:pPr>
+            <a:r>
+              <a:rPr lang="en-US" altLang="en-US" dirty="0">
+                <a:solidFill>
+                  <a:schemeClr val="accent1"/>
+                </a:solidFill>
+              </a:rPr>
+              <a:t>GPL was written by Stallman in </a:t>
+            </a:r>
+            <a:r>
+              <a:rPr lang="fa-IR" altLang="en-US" dirty="0" smtClean="0">
+                <a:solidFill>
+                  <a:schemeClr val="accent1"/>
+                </a:solidFill>
+              </a:rPr>
+              <a:t>1989</a:t>
+            </a:r>
+            <a:endParaRPr lang="en-US" altLang="en-US" dirty="0">
+              <a:solidFill>
+                <a:schemeClr val="accent1"/>
+              </a:solidFill>
+            </a:endParaRPr>
+          </a:p>
+        </p:txBody>
+      </p:sp>
+      <p:sp>
+        <p:nvSpPr>
+          <p:cNvPr id="9" name="Rectangle 8"/>
+          <p:cNvSpPr/>
+          <p:nvPr/>
+        </p:nvSpPr>
+        <p:spPr>
+          <a:xfrm>
+            <a:off x="914401" y="2819400"/>
+            <a:ext cx="9525000" cy="369332"/>
+          </a:xfrm>
+          <a:prstGeom prst="rect">
+            <a:avLst/>
+          </a:prstGeom>
+        </p:spPr>
+        <p:txBody>
+          <a:bodyPr wrap="square">
+            <a:spAutoFit/>
+          </a:bodyPr>
+          <a:lstStyle/>
+          <a:p>
+            <a:r>
+              <a:rPr lang="en-US" dirty="0">
+                <a:solidFill>
+                  <a:schemeClr val="accent6"/>
+                </a:solidFill>
+                <a:latin typeface="Microsoft Sans Serif" panose="020B0604020202020204" pitchFamily="34" charset="0"/>
+              </a:rPr>
+              <a:t>Basic features of the GNU Public </a:t>
+            </a:r>
+            <a:r>
+              <a:rPr lang="en-US" dirty="0" smtClean="0">
+                <a:solidFill>
+                  <a:schemeClr val="accent6"/>
+                </a:solidFill>
+                <a:latin typeface="Microsoft Sans Serif" panose="020B0604020202020204" pitchFamily="34" charset="0"/>
+              </a:rPr>
+              <a:t>License include </a:t>
+            </a:r>
+            <a:r>
+              <a:rPr lang="en-US" dirty="0">
+                <a:solidFill>
+                  <a:schemeClr val="accent6"/>
+                </a:solidFill>
+                <a:latin typeface="Microsoft Sans Serif" panose="020B0604020202020204" pitchFamily="34" charset="0"/>
+              </a:rPr>
+              <a:t>the following:</a:t>
+            </a:r>
+            <a:endParaRPr lang="en-US" dirty="0">
+              <a:solidFill>
+                <a:schemeClr val="accent6"/>
+              </a:solidFill>
+            </a:endParaRPr>
+          </a:p>
+        </p:txBody>
+      </p:sp>
+      <p:sp>
+        <p:nvSpPr>
+          <p:cNvPr id="10" name="Rectangle 9"/>
+          <p:cNvSpPr/>
+          <p:nvPr/>
+        </p:nvSpPr>
+        <p:spPr>
+          <a:xfrm>
+            <a:off x="952502" y="3352800"/>
+            <a:ext cx="9448798" cy="369332"/>
+          </a:xfrm>
+          <a:prstGeom prst="rect">
+            <a:avLst/>
+          </a:prstGeom>
+        </p:spPr>
+        <p:txBody>
+          <a:bodyPr wrap="square">
+            <a:spAutoFit/>
+          </a:bodyPr>
+          <a:lstStyle/>
+          <a:p>
+            <a:pPr marL="742950" lvl="1" indent="-285750">
+              <a:buFont typeface="Arial" panose="020B0604020202020204" pitchFamily="34" charset="0"/>
+              <a:buChar char="•"/>
+            </a:pPr>
+            <a:r>
+              <a:rPr lang="en-US" b="1" dirty="0" smtClean="0">
+                <a:solidFill>
+                  <a:schemeClr val="accent2"/>
+                </a:solidFill>
+                <a:latin typeface="Microsoft Sans Serif" panose="020B0604020202020204" pitchFamily="34" charset="0"/>
+              </a:rPr>
+              <a:t>Author Rights </a:t>
+            </a:r>
+            <a:r>
+              <a:rPr lang="en-US" b="1" dirty="0" smtClean="0">
+                <a:solidFill>
+                  <a:schemeClr val="accent1"/>
+                </a:solidFill>
+                <a:latin typeface="Microsoft Sans Serif" panose="020B0604020202020204" pitchFamily="34" charset="0"/>
+              </a:rPr>
+              <a:t>— The </a:t>
+            </a:r>
+            <a:r>
+              <a:rPr lang="en-US" b="1" dirty="0" smtClean="0">
+                <a:solidFill>
+                  <a:schemeClr val="accent3"/>
+                </a:solidFill>
+                <a:latin typeface="Microsoft Sans Serif" panose="020B0604020202020204" pitchFamily="34" charset="0"/>
+              </a:rPr>
+              <a:t>original </a:t>
+            </a:r>
+            <a:r>
+              <a:rPr lang="en-US" b="1" dirty="0">
+                <a:solidFill>
+                  <a:schemeClr val="accent3"/>
+                </a:solidFill>
+                <a:latin typeface="Microsoft Sans Serif" panose="020B0604020202020204" pitchFamily="34" charset="0"/>
+              </a:rPr>
+              <a:t>author </a:t>
+            </a:r>
+            <a:r>
+              <a:rPr lang="en-US" b="1" dirty="0">
+                <a:solidFill>
+                  <a:schemeClr val="accent1"/>
+                </a:solidFill>
+                <a:latin typeface="Microsoft Sans Serif" panose="020B0604020202020204" pitchFamily="34" charset="0"/>
+              </a:rPr>
+              <a:t>retains the </a:t>
+            </a:r>
+            <a:r>
+              <a:rPr lang="en-US" b="1" dirty="0">
+                <a:solidFill>
+                  <a:schemeClr val="accent3"/>
+                </a:solidFill>
+                <a:latin typeface="Microsoft Sans Serif" panose="020B0604020202020204" pitchFamily="34" charset="0"/>
+              </a:rPr>
+              <a:t>rights</a:t>
+            </a:r>
+            <a:r>
+              <a:rPr lang="en-US" b="1" dirty="0">
+                <a:solidFill>
+                  <a:schemeClr val="accent1"/>
+                </a:solidFill>
+                <a:latin typeface="Microsoft Sans Serif" panose="020B0604020202020204" pitchFamily="34" charset="0"/>
+              </a:rPr>
+              <a:t> to his or her software.</a:t>
+            </a:r>
+            <a:endParaRPr lang="en-US" dirty="0">
+              <a:solidFill>
+                <a:schemeClr val="accent1"/>
+              </a:solidFill>
+            </a:endParaRPr>
+          </a:p>
+        </p:txBody>
+      </p:sp>
+      <p:sp>
+        <p:nvSpPr>
+          <p:cNvPr id="11" name="Rectangle 10"/>
+          <p:cNvSpPr/>
+          <p:nvPr/>
+        </p:nvSpPr>
+        <p:spPr>
+          <a:xfrm>
+            <a:off x="949189" y="3752612"/>
+            <a:ext cx="9448798" cy="369332"/>
+          </a:xfrm>
+          <a:prstGeom prst="rect">
+            <a:avLst/>
+          </a:prstGeom>
+        </p:spPr>
+        <p:txBody>
+          <a:bodyPr wrap="square">
+            <a:spAutoFit/>
+          </a:bodyPr>
+          <a:lstStyle/>
+          <a:p>
+            <a:pPr marL="742950" lvl="1" indent="-285750">
+              <a:buFont typeface="Arial" panose="020B0604020202020204" pitchFamily="34" charset="0"/>
+              <a:buChar char="•"/>
+            </a:pPr>
+            <a:r>
+              <a:rPr lang="en-US" b="1" dirty="0" smtClean="0">
+                <a:solidFill>
+                  <a:schemeClr val="accent2"/>
+                </a:solidFill>
+                <a:latin typeface="Microsoft Sans Serif" panose="020B0604020202020204" pitchFamily="34" charset="0"/>
+              </a:rPr>
+              <a:t>Free Distribution </a:t>
+            </a:r>
+            <a:r>
+              <a:rPr lang="en-US" b="1" dirty="0" smtClean="0">
+                <a:solidFill>
+                  <a:schemeClr val="accent1"/>
+                </a:solidFill>
+                <a:latin typeface="Microsoft Sans Serif" panose="020B0604020202020204" pitchFamily="34" charset="0"/>
+              </a:rPr>
+              <a:t>— </a:t>
+            </a:r>
+            <a:r>
+              <a:rPr lang="en-US" b="1" dirty="0" smtClean="0">
+                <a:solidFill>
+                  <a:schemeClr val="accent3"/>
+                </a:solidFill>
+                <a:latin typeface="Microsoft Sans Serif" panose="020B0604020202020204" pitchFamily="34" charset="0"/>
+              </a:rPr>
+              <a:t>Source code </a:t>
+            </a:r>
+            <a:r>
+              <a:rPr lang="en-US" b="1" dirty="0" smtClean="0">
+                <a:solidFill>
+                  <a:schemeClr val="accent1"/>
+                </a:solidFill>
+                <a:latin typeface="Microsoft Sans Serif" panose="020B0604020202020204" pitchFamily="34" charset="0"/>
+              </a:rPr>
+              <a:t>must be </a:t>
+            </a:r>
+            <a:r>
+              <a:rPr lang="en-US" b="1" dirty="0" smtClean="0">
+                <a:solidFill>
+                  <a:schemeClr val="accent3"/>
+                </a:solidFill>
+                <a:latin typeface="Microsoft Sans Serif" panose="020B0604020202020204" pitchFamily="34" charset="0"/>
+              </a:rPr>
+              <a:t>included</a:t>
+            </a:r>
+            <a:r>
+              <a:rPr lang="en-US" b="1" dirty="0" smtClean="0">
+                <a:solidFill>
+                  <a:schemeClr val="accent1"/>
+                </a:solidFill>
+                <a:latin typeface="Microsoft Sans Serif" panose="020B0604020202020204" pitchFamily="34" charset="0"/>
+              </a:rPr>
+              <a:t> with the distribution.</a:t>
+            </a:r>
+            <a:endParaRPr lang="en-US" dirty="0">
+              <a:solidFill>
+                <a:schemeClr val="accent1"/>
+              </a:solidFill>
+            </a:endParaRPr>
+          </a:p>
+        </p:txBody>
+      </p:sp>
+      <p:sp>
+        <p:nvSpPr>
+          <p:cNvPr id="14" name="Rectangle 13"/>
+          <p:cNvSpPr/>
+          <p:nvPr/>
+        </p:nvSpPr>
+        <p:spPr>
+          <a:xfrm>
+            <a:off x="949189" y="4202668"/>
+            <a:ext cx="9448798" cy="369332"/>
+          </a:xfrm>
+          <a:prstGeom prst="rect">
+            <a:avLst/>
+          </a:prstGeom>
+        </p:spPr>
+        <p:txBody>
+          <a:bodyPr wrap="square">
+            <a:spAutoFit/>
+          </a:bodyPr>
+          <a:lstStyle/>
+          <a:p>
+            <a:pPr marL="742950" lvl="1" indent="-285750">
+              <a:buFont typeface="Arial" panose="020B0604020202020204" pitchFamily="34" charset="0"/>
+              <a:buChar char="•"/>
+            </a:pPr>
+            <a:r>
+              <a:rPr lang="en-US" b="1" dirty="0" smtClean="0">
+                <a:solidFill>
+                  <a:schemeClr val="accent2"/>
+                </a:solidFill>
+                <a:latin typeface="Microsoft Sans Serif" panose="020B0604020202020204" pitchFamily="34" charset="0"/>
+              </a:rPr>
+              <a:t>Copyright Maintained </a:t>
+            </a:r>
+            <a:r>
+              <a:rPr lang="en-US" b="1" dirty="0" smtClean="0">
+                <a:solidFill>
+                  <a:schemeClr val="accent1"/>
+                </a:solidFill>
+                <a:latin typeface="Microsoft Sans Serif" panose="020B0604020202020204" pitchFamily="34" charset="0"/>
+              </a:rPr>
+              <a:t>— The Original GNU agreement maintained .</a:t>
+            </a:r>
+            <a:endParaRPr lang="en-US" dirty="0">
+              <a:solidFill>
+                <a:schemeClr val="accent1"/>
+              </a:solidFill>
+            </a:endParaRPr>
+          </a:p>
+        </p:txBody>
+      </p:sp>
+      <p:sp>
+        <p:nvSpPr>
+          <p:cNvPr id="15" name="Rectangle 14"/>
+          <p:cNvSpPr/>
+          <p:nvPr/>
+        </p:nvSpPr>
+        <p:spPr>
+          <a:xfrm>
+            <a:off x="949189" y="5219224"/>
+            <a:ext cx="10057737" cy="923330"/>
+          </a:xfrm>
+          <a:prstGeom prst="rect">
+            <a:avLst/>
+          </a:prstGeom>
+        </p:spPr>
+        <p:txBody>
+          <a:bodyPr wrap="square">
+            <a:spAutoFit/>
+          </a:bodyPr>
+          <a:lstStyle/>
+          <a:p>
+            <a:pPr marL="285750" indent="-285750">
+              <a:buFont typeface="Arial" panose="020B0604020202020204" pitchFamily="34" charset="0"/>
+              <a:buChar char="•"/>
+            </a:pPr>
+            <a:r>
+              <a:rPr lang="en-US" dirty="0" smtClean="0">
+                <a:solidFill>
+                  <a:schemeClr val="accent2"/>
+                </a:solidFill>
+              </a:rPr>
+              <a:t>Stallman </a:t>
+            </a:r>
+            <a:r>
+              <a:rPr lang="en-US" dirty="0">
+                <a:solidFill>
+                  <a:schemeClr val="accent2"/>
+                </a:solidFill>
+              </a:rPr>
+              <a:t>explains</a:t>
+            </a:r>
+            <a:r>
+              <a:rPr lang="en-US" dirty="0">
+                <a:solidFill>
+                  <a:schemeClr val="accent1"/>
+                </a:solidFill>
+              </a:rPr>
+              <a:t>: "The two terms describe almost the same category of software, but they stand for views based on fundamentally different values. Open source is a development methodology; free software is a social movement."</a:t>
+            </a:r>
+            <a:endParaRPr lang="en-US" dirty="0">
+              <a:solidFill>
+                <a:schemeClr val="accent1"/>
+              </a:solidFill>
+            </a:endParaRPr>
+          </a:p>
+        </p:txBody>
+      </p:sp>
+      <p:sp>
+        <p:nvSpPr>
+          <p:cNvPr id="16" name="Rectangle 15"/>
+          <p:cNvSpPr/>
+          <p:nvPr/>
+        </p:nvSpPr>
+        <p:spPr>
+          <a:xfrm>
+            <a:off x="911088" y="4685824"/>
+            <a:ext cx="9525000" cy="369332"/>
+          </a:xfrm>
+          <a:prstGeom prst="rect">
+            <a:avLst/>
+          </a:prstGeom>
+        </p:spPr>
+        <p:txBody>
+          <a:bodyPr wrap="square">
+            <a:spAutoFit/>
+          </a:bodyPr>
+          <a:lstStyle/>
+          <a:p>
+            <a:r>
+              <a:rPr lang="en-US" dirty="0" smtClean="0">
+                <a:solidFill>
+                  <a:schemeClr val="accent6"/>
+                </a:solidFill>
+                <a:latin typeface="Microsoft Sans Serif" panose="020B0604020202020204" pitchFamily="34" charset="0"/>
+              </a:rPr>
+              <a:t>Open Source:</a:t>
+            </a:r>
+            <a:endParaRPr lang="en-US" dirty="0">
+              <a:solidFill>
+                <a:schemeClr val="accent6"/>
+              </a:solidFill>
+            </a:endParaRPr>
+          </a:p>
+        </p:txBody>
+      </p:sp>
+    </p:spTree>
+    <p:extLst>
+      <p:ext uri="{BB962C8B-B14F-4D97-AF65-F5344CB8AC3E}">
+        <p14:creationId xmlns:p14="http://schemas.microsoft.com/office/powerpoint/2010/main" val="4197425435"/>
+      </p:ext>
+    </p:extLst>
+  </p:cSld>
+  <p:clrMapOvr>
+    <a:masterClrMapping/>
+  </p:clrMapOvr>
+</p:sld>
+</file>
+
+<file path=ppt/slides/slide11.xml><?xml version="1.0" encoding="utf-8"?>
+<p:sld xmlns:a="http://schemas.openxmlformats.org/drawingml/2006/main" xmlns:r="http://schemas.openxmlformats.org/officeDocument/2006/relationships" xmlns:p="http://schemas.openxmlformats.org/presentationml/2006/main">
+  <p:cSld>
+    <p:spTree>
+      <p:nvGrpSpPr>
+        <p:cNvPr id="1" name=""/>
+        <p:cNvGrpSpPr/>
+        <p:nvPr/>
+      </p:nvGrpSpPr>
+      <p:grpSpPr>
+        <a:xfrm>
+          <a:off x="0" y="0"/>
+          <a:ext cx="0" cy="0"/>
+          <a:chOff x="0" y="0"/>
+          <a:chExt cx="0" cy="0"/>
+        </a:xfrm>
+      </p:grpSpPr>
+    </p:spTree>
+    <p:extLst>
+      <p:ext uri="{BB962C8B-B14F-4D97-AF65-F5344CB8AC3E}">
+        <p14:creationId xmlns:p14="http://schemas.microsoft.com/office/powerpoint/2010/main" val="2443043259"/>
+      </p:ext>
+    </p:extLst>
+  </p:cSld>
+  <p:clrMapOvr>
+    <a:masterClrMapping/>
+  </p:clrMapOvr>
+</p:sld>
+</file>
+
 <file path=ppt/slides/slide2.xml><?xml version="1.0" encoding="utf-8"?>
 <p:sld xmlns:a="http://schemas.openxmlformats.org/drawingml/2006/main" xmlns:r="http://schemas.openxmlformats.org/officeDocument/2006/relationships" xmlns:p="http://schemas.openxmlformats.org/presentationml/2006/main">
   <p:cSld>
@@ -3842,10 +4592,18 @@
           <a:p>
             <a:pPr algn="ctr"/>
             <a:r>
-              <a:rPr lang="en-US" dirty="0" smtClean="0"/>
+              <a:rPr lang="en-US" dirty="0" smtClean="0">
+                <a:solidFill>
+                  <a:schemeClr val="accent5"/>
+                </a:solidFill>
+              </a:rPr>
               <a:t>history_of_linux</a:t>
             </a:r>
-            <a:endParaRPr lang="en-US" dirty="0"/>
+            <a:endParaRPr lang="en-US" dirty="0">
+              <a:solidFill>
+                <a:schemeClr val="accent5"/>
+              </a:solidFill>
+            </a:endParaRPr>
           </a:p>
         </p:txBody>
       </p:sp>
@@ -3898,114 +4656,35 @@
         </p:nvSpPr>
         <p:spPr>
           <a:xfrm>
-            <a:off x="533400" y="838200"/>
-            <a:ext cx="4495800" cy="457200"/>
-          </a:xfrm>
-        </p:spPr>
-        <p:txBody>
-          <a:bodyPr>
-            <a:normAutofit fontScale="90000"/>
-          </a:bodyPr>
-          <a:lstStyle/>
-          <a:p>
-            <a:r>
-              <a:rPr lang="en-US" sz="2800" dirty="0" smtClean="0"/>
-              <a:t>multics:</a:t>
-            </a:r>
-            <a:endParaRPr lang="en-US" sz="2800" dirty="0"/>
-          </a:p>
-        </p:txBody>
-      </p:sp>
-      <p:sp>
-        <p:nvSpPr>
-          <p:cNvPr id="3" name="Text Placeholder 2"/>
-          <p:cNvSpPr>
-            <a:spLocks noGrp="1"/>
-          </p:cNvSpPr>
-          <p:nvPr>
-            <p:ph type="body" idx="1"/>
-          </p:nvPr>
-        </p:nvSpPr>
-        <p:spPr>
-          <a:xfrm>
-            <a:off x="457200" y="2057400"/>
-            <a:ext cx="11201400" cy="1506537"/>
+            <a:off x="1447800" y="2895600"/>
+            <a:ext cx="9144000" cy="685800"/>
           </a:xfrm>
         </p:spPr>
         <p:txBody>
           <a:bodyPr/>
           <a:lstStyle/>
           <a:p>
-            <a:pPr marL="342900" indent="-342900">
-              <a:buFont typeface="Arial" panose="020B0604020202020204" pitchFamily="34" charset="0"/>
-              <a:buChar char="•"/>
-            </a:pPr>
-            <a:r>
-              <a:rPr lang="en-US" dirty="0" smtClean="0"/>
-              <a:t>Multics (Multiplexed </a:t>
-            </a:r>
-            <a:r>
-              <a:rPr lang="en-US" dirty="0"/>
-              <a:t>Information and Computing Service) was a </a:t>
-            </a:r>
-            <a:r>
-              <a:rPr lang="en-US" dirty="0" smtClean="0"/>
-              <a:t>mainframe</a:t>
-            </a:r>
-            <a:r>
-              <a:rPr lang="en-US" dirty="0"/>
-              <a:t> time-sharing </a:t>
-            </a:r>
-            <a:r>
-              <a:rPr lang="en-US" dirty="0" smtClean="0"/>
-              <a:t>operating system</a:t>
-            </a:r>
-            <a:r>
-              <a:rPr lang="en-US" dirty="0"/>
-              <a:t> that was developed in the 1963-1969 period through the collaboration of the Massachusetts Institute of Technology (MIT), General Electric (GE), and Bell </a:t>
-            </a:r>
-            <a:r>
-              <a:rPr lang="en-US" dirty="0" smtClean="0"/>
-              <a:t>Labs (AT&amp;T).</a:t>
-            </a:r>
-            <a:endParaRPr lang="en-US" dirty="0"/>
-          </a:p>
-        </p:txBody>
-      </p:sp>
-      <p:pic>
-        <p:nvPicPr>
-          <p:cNvPr id="4" name="Picture 3"/>
-          <p:cNvPicPr>
-            <a:picLocks noChangeAspect="1"/>
-          </p:cNvPicPr>
-          <p:nvPr/>
-        </p:nvPicPr>
-        <p:blipFill>
-          <a:blip r:embed="rId2">
-            <a:extLst>
-              <a:ext uri="{28A0092B-C50C-407E-A947-70E740481C1C}">
-                <a14:useLocalDpi xmlns:a14="http://schemas.microsoft.com/office/drawing/2010/main" val="0"/>
-              </a:ext>
-            </a:extLst>
-          </a:blip>
-          <a:stretch>
-            <a:fillRect/>
-          </a:stretch>
-        </p:blipFill>
-        <p:spPr>
-          <a:xfrm>
-            <a:off x="10058400" y="403225"/>
-            <a:ext cx="1588272" cy="1327150"/>
-          </a:xfrm>
-          <a:prstGeom prst="rect">
-            <a:avLst/>
-          </a:prstGeom>
-        </p:spPr>
-      </p:pic>
+            <a:pPr algn="ctr"/>
+            <a:r>
+              <a:rPr lang="en-US" dirty="0">
+                <a:solidFill>
+                  <a:schemeClr val="accent5"/>
+                </a:solidFill>
+              </a:rPr>
+              <a:t>early_operating_systems</a:t>
+            </a:r>
+            <a:endParaRPr lang="en-US" dirty="0">
+              <a:solidFill>
+                <a:schemeClr val="accent5"/>
+              </a:solidFill>
+            </a:endParaRPr>
+          </a:p>
+        </p:txBody>
+      </p:sp>
     </p:spTree>
     <p:extLst>
       <p:ext uri="{BB962C8B-B14F-4D97-AF65-F5344CB8AC3E}">
-        <p14:creationId xmlns:p14="http://schemas.microsoft.com/office/powerpoint/2010/main" val="3344017342"/>
+        <p14:creationId xmlns:p14="http://schemas.microsoft.com/office/powerpoint/2010/main" val="2238825460"/>
       </p:ext>
     </p:extLst>
   </p:cSld>
@@ -4063,7 +4742,7 @@
           <a:p>
             <a:r>
               <a:rPr lang="en-US" sz="2800" dirty="0" smtClean="0"/>
-              <a:t>unix:</a:t>
+              <a:t>multics:</a:t>
             </a:r>
             <a:endParaRPr lang="en-US" sz="2800" dirty="0"/>
           </a:p>
@@ -4081,8 +4760,8 @@
         </p:nvSpPr>
         <p:spPr>
           <a:xfrm>
-            <a:off x="457200" y="2057401"/>
-            <a:ext cx="11201400" cy="457200"/>
+            <a:off x="457200" y="2057400"/>
+            <a:ext cx="11201400" cy="1506537"/>
           </a:xfrm>
         </p:spPr>
         <p:txBody>
@@ -4094,29 +4773,47 @@
               <a:buChar char="•"/>
             </a:pPr>
             <a:r>
+              <a:rPr lang="en-US" dirty="0" smtClean="0"/>
+              <a:t>Multics (Multiplexed </a:t>
+            </a:r>
+            <a:r>
               <a:rPr lang="en-US" dirty="0"/>
-              <a:t>By 1970, Bell Labs had withdrawn from </a:t>
+              <a:t>Information and Computing Service) was a </a:t>
             </a:r>
             <a:r>
               <a:rPr lang="en-US" dirty="0" smtClean="0"/>
-              <a:t>the Multics project.</a:t>
-            </a:r>
-          </a:p>
-          <a:p>
-            <a:endParaRPr lang="en-US" dirty="0" smtClean="0"/>
+              <a:t>mainframe</a:t>
+            </a:r>
+            <a:r>
+              <a:rPr lang="en-US" dirty="0"/>
+              <a:t> time-sharing </a:t>
+            </a:r>
+            <a:r>
+              <a:rPr lang="en-US" dirty="0" smtClean="0"/>
+              <a:t>operating system</a:t>
+            </a:r>
+            <a:r>
+              <a:rPr lang="en-US" dirty="0"/>
+              <a:t> that was developed in the 1963-1969 period through the collaboration of the Massachusetts Institute of Technology (MIT), General Electric (GE), and Bell </a:t>
+            </a:r>
+            <a:r>
+              <a:rPr lang="en-US" dirty="0" smtClean="0"/>
+              <a:t>Labs (AT&amp;T).</a:t>
+            </a:r>
+            <a:endParaRPr lang="en-US" dirty="0"/>
           </a:p>
         </p:txBody>
       </p:sp>
       <p:pic>
         <p:nvPicPr>
-          <p:cNvPr id="7" name="Picture 6"/>
+          <p:cNvPr id="4" name="Picture 3"/>
           <p:cNvPicPr>
             <a:picLocks noChangeAspect="1"/>
           </p:cNvPicPr>
           <p:nvPr/>
         </p:nvPicPr>
         <p:blipFill>
-          <a:blip r:embed="rId2" cstate="print">
+          <a:blip r:embed="rId2">
             <a:extLst>
               <a:ext uri="{28A0092B-C50C-407E-A947-70E740481C1C}">
                 <a14:useLocalDpi xmlns:a14="http://schemas.microsoft.com/office/drawing/2010/main" val="0"/>
@@ -4129,154 +4826,18 @@
         </p:blipFill>
         <p:spPr>
           <a:xfrm>
-            <a:off x="10287000" y="685800"/>
-            <a:ext cx="1213899" cy="685800"/>
+            <a:off x="10058400" y="403225"/>
+            <a:ext cx="1588272" cy="1327150"/>
           </a:xfrm>
           <a:prstGeom prst="rect">
             <a:avLst/>
           </a:prstGeom>
         </p:spPr>
       </p:pic>
-      <p:pic>
-        <p:nvPicPr>
-          <p:cNvPr id="8" name="Picture 7"/>
-          <p:cNvPicPr>
-            <a:picLocks noChangeAspect="1"/>
-          </p:cNvPicPr>
-          <p:nvPr/>
-        </p:nvPicPr>
-        <p:blipFill>
-          <a:blip r:embed="rId3">
-            <a:extLst>
-              <a:ext uri="{28A0092B-C50C-407E-A947-70E740481C1C}">
-                <a14:useLocalDpi xmlns:a14="http://schemas.microsoft.com/office/drawing/2010/main" val="0"/>
-              </a:ext>
-            </a:extLst>
-          </a:blip>
-          <a:stretch>
-            <a:fillRect/>
-          </a:stretch>
-        </p:blipFill>
-        <p:spPr>
-          <a:xfrm>
-            <a:off x="8962942" y="3124200"/>
-            <a:ext cx="2708910" cy="1981200"/>
-          </a:xfrm>
-          <a:prstGeom prst="rect">
-            <a:avLst/>
-          </a:prstGeom>
-        </p:spPr>
-      </p:pic>
-      <p:sp>
-        <p:nvSpPr>
-          <p:cNvPr id="9" name="TextBox 8"/>
-          <p:cNvSpPr txBox="1"/>
-          <p:nvPr/>
-        </p:nvSpPr>
-        <p:spPr>
-          <a:xfrm>
-            <a:off x="533400" y="3124200"/>
-            <a:ext cx="8305800" cy="2308324"/>
-          </a:xfrm>
-          <a:prstGeom prst="rect">
-            <a:avLst/>
-          </a:prstGeom>
-          <a:noFill/>
-        </p:spPr>
-        <p:txBody>
-          <a:bodyPr wrap="square" rtlCol="0">
-            <a:spAutoFit/>
-          </a:bodyPr>
-          <a:lstStyle/>
-          <a:p>
-            <a:pPr marL="285750" indent="-285750">
-              <a:buFont typeface="Arial" panose="020B0604020202020204" pitchFamily="34" charset="0"/>
-              <a:buChar char="•"/>
-            </a:pPr>
-            <a:r>
-              <a:rPr lang="en-US" dirty="0">
-                <a:solidFill>
-                  <a:schemeClr val="accent1"/>
-                </a:solidFill>
-              </a:rPr>
-              <a:t>Ken Thompson:</a:t>
-            </a:r>
-          </a:p>
-          <a:p>
-            <a:r>
-              <a:rPr lang="en-US" dirty="0">
-                <a:solidFill>
-                  <a:schemeClr val="accent1"/>
-                </a:solidFill>
-              </a:rPr>
-              <a:t>	“I did the first of two or three versions of UNIX all alone. And Dennis 	became an evangelist. Then there was a rewrite in a higher-level 	language that would come to be called C. He worked mostly on the 	language and on the I/O system, and I worked on all the rest of the 	operating system. That was for the </a:t>
-            </a:r>
-            <a:r>
-              <a:rPr lang="en-US" dirty="0" smtClean="0">
-                <a:solidFill>
-                  <a:schemeClr val="accent1"/>
-                </a:solidFill>
-              </a:rPr>
-              <a:t>PDP-11, </a:t>
-            </a:r>
-            <a:r>
-              <a:rPr lang="en-US" dirty="0">
-                <a:solidFill>
-                  <a:schemeClr val="accent1"/>
-                </a:solidFill>
-              </a:rPr>
-              <a:t>which was serendipitous, 	because that was the computer that took over the academic community.”</a:t>
-            </a:r>
-          </a:p>
-          <a:p>
-            <a:endParaRPr lang="en-US" dirty="0">
-              <a:solidFill>
-                <a:schemeClr val="accent1"/>
-              </a:solidFill>
-            </a:endParaRPr>
-          </a:p>
-        </p:txBody>
-      </p:sp>
-      <p:sp>
-        <p:nvSpPr>
-          <p:cNvPr id="10" name="Rectangle 9"/>
-          <p:cNvSpPr/>
-          <p:nvPr/>
-        </p:nvSpPr>
-        <p:spPr>
-          <a:xfrm>
-            <a:off x="533400" y="5562600"/>
-            <a:ext cx="4235455" cy="369332"/>
-          </a:xfrm>
-          <a:prstGeom prst="rect">
-            <a:avLst/>
-          </a:prstGeom>
-        </p:spPr>
-        <p:txBody>
-          <a:bodyPr wrap="none">
-            <a:spAutoFit/>
-          </a:bodyPr>
-          <a:lstStyle/>
-          <a:p>
-            <a:pPr marL="285750" indent="-285750">
-              <a:buFont typeface="Arial" panose="020B0604020202020204" pitchFamily="34" charset="0"/>
-              <a:buChar char="•"/>
-            </a:pPr>
-            <a:r>
-              <a:rPr lang="en-US" dirty="0">
-                <a:solidFill>
-                  <a:schemeClr val="accent1"/>
-                </a:solidFill>
-              </a:rPr>
-              <a:t>UNIX is the first free Operating System</a:t>
-            </a:r>
-          </a:p>
-        </p:txBody>
-      </p:sp>
     </p:spTree>
     <p:extLst>
       <p:ext uri="{BB962C8B-B14F-4D97-AF65-F5344CB8AC3E}">
-        <p14:creationId xmlns:p14="http://schemas.microsoft.com/office/powerpoint/2010/main" val="2820919567"/>
+        <p14:creationId xmlns:p14="http://schemas.microsoft.com/office/powerpoint/2010/main" val="3344017342"/>
       </p:ext>
     </p:extLst>
   </p:cSld>
@@ -4334,7 +4895,7 @@
           <a:p>
             <a:r>
               <a:rPr lang="en-US" sz="2800" dirty="0" smtClean="0"/>
-              <a:t>BSD:</a:t>
+              <a:t>unix:</a:t>
             </a:r>
             <a:endParaRPr lang="en-US" sz="2800" dirty="0"/>
           </a:p>
@@ -4352,14 +4913,12 @@
         </p:nvSpPr>
         <p:spPr>
           <a:xfrm>
-            <a:off x="457200" y="2057400"/>
-            <a:ext cx="11201400" cy="609599"/>
-          </a:xfrm>
-        </p:spPr>
-        <p:txBody>
-          <a:bodyPr>
-            <a:normAutofit lnSpcReduction="10000"/>
-          </a:bodyPr>
+            <a:off x="457200" y="2057401"/>
+            <a:ext cx="11201400" cy="457200"/>
+          </a:xfrm>
+        </p:spPr>
+        <p:txBody>
+          <a:bodyPr/>
           <a:lstStyle/>
           <a:p>
             <a:pPr marL="342900" indent="-342900">
@@ -4367,8 +4926,12 @@
               <a:buChar char="•"/>
             </a:pPr>
             <a:r>
+              <a:rPr lang="en-US" dirty="0"/>
+              <a:t>By 1970, Bell Labs had withdrawn from </a:t>
+            </a:r>
+            <a:r>
               <a:rPr lang="en-US" dirty="0" smtClean="0"/>
-              <a:t>BSD (Berkeley Software Distribution) was the first major variant of unix created at University of California at Berkeley.</a:t>
+              <a:t>the Multics project.</a:t>
             </a:r>
           </a:p>
           <a:p>
@@ -4376,6 +4939,66 @@
           </a:p>
         </p:txBody>
       </p:sp>
+      <p:pic>
+        <p:nvPicPr>
+          <p:cNvPr id="7" name="Picture 6"/>
+          <p:cNvPicPr>
+            <a:picLocks noChangeAspect="1"/>
+          </p:cNvPicPr>
+          <p:nvPr/>
+        </p:nvPicPr>
+        <p:blipFill>
+          <a:blip r:embed="rId2" cstate="print">
+            <a:extLst>
+              <a:ext uri="{28A0092B-C50C-407E-A947-70E740481C1C}">
+                <a14:useLocalDpi xmlns:a14="http://schemas.microsoft.com/office/drawing/2010/main" val="0"/>
+              </a:ext>
+            </a:extLst>
+          </a:blip>
+          <a:stretch>
+            <a:fillRect/>
+          </a:stretch>
+        </p:blipFill>
+        <p:spPr>
+          <a:xfrm>
+            <a:off x="10287000" y="685800"/>
+            <a:ext cx="1213899" cy="685800"/>
+          </a:xfrm>
+          <a:prstGeom prst="rect">
+            <a:avLst/>
+          </a:prstGeom>
+        </p:spPr>
+      </p:pic>
+      <p:pic>
+        <p:nvPicPr>
+          <p:cNvPr id="8" name="Picture 7"/>
+          <p:cNvPicPr>
+            <a:picLocks noChangeAspect="1"/>
+          </p:cNvPicPr>
+          <p:nvPr/>
+        </p:nvPicPr>
+        <p:blipFill>
+          <a:blip r:embed="rId3">
+            <a:extLst>
+              <a:ext uri="{28A0092B-C50C-407E-A947-70E740481C1C}">
+                <a14:useLocalDpi xmlns:a14="http://schemas.microsoft.com/office/drawing/2010/main" val="0"/>
+              </a:ext>
+            </a:extLst>
+          </a:blip>
+          <a:stretch>
+            <a:fillRect/>
+          </a:stretch>
+        </p:blipFill>
+        <p:spPr>
+          <a:xfrm>
+            <a:off x="8962942" y="3124200"/>
+            <a:ext cx="2708910" cy="1981200"/>
+          </a:xfrm>
+          <a:prstGeom prst="rect">
+            <a:avLst/>
+          </a:prstGeom>
+        </p:spPr>
+      </p:pic>
       <p:sp>
         <p:nvSpPr>
           <p:cNvPr id="9" name="TextBox 8"/>
@@ -4385,7 +5008,7 @@
         <p:spPr>
           <a:xfrm>
             <a:off x="533400" y="3124200"/>
-            <a:ext cx="10744200" cy="1200329"/>
+            <a:ext cx="8305800" cy="2308324"/>
           </a:xfrm>
           <a:prstGeom prst="rect">
             <a:avLst/>
@@ -4408,7 +5031,17 @@
                   <a:schemeClr val="accent1"/>
                 </a:solidFill>
               </a:rPr>
-              <a:t>the BSD and Bell Labs versions of UNIX headed off in  </a:t>
+              <a:t>Ken Thompson:</a:t>
+            </a:r>
+          </a:p>
+          <a:p>
+            <a:r>
+              <a:rPr lang="en-US" dirty="0">
+                <a:solidFill>
+                  <a:schemeClr val="accent1"/>
+                </a:solidFill>
+              </a:rPr>
+              <a:t>	“I did the first of two or three versions of UNIX all alone. And Dennis 	became an evangelist. Then there was a rewrite in a higher-level 	language that would come to be called C. He worked mostly on the 	language and on the I/O system, and I worked on all the rest of the 	operating system. That was for the </a:t>
             </a:r>
             <a:r>
               <a:rPr lang="en-US" dirty="0" smtClean="0">
@@ -4416,7 +5049,7 @@
                   <a:schemeClr val="accent1"/>
                 </a:solidFill>
               </a:rPr>
-              <a:t>separate directions</a:t>
+              <a:t>PDP-11, </a:t>
             </a:r>
             <a:r>
               <a:rPr lang="en-US" dirty="0">
@@ -4424,61 +5057,260 @@
                   <a:schemeClr val="accent1"/>
                 </a:solidFill>
               </a:rPr>
-              <a:t>. BSD continued forward in the </a:t>
-            </a:r>
-            <a:r>
-              <a:rPr lang="en-US" dirty="0" smtClean="0">
-                <a:solidFill>
-                  <a:schemeClr val="accent1"/>
-                </a:solidFill>
-              </a:rPr>
-              <a:t>free-ﬂowing</a:t>
-            </a:r>
-            <a:r>
-              <a:rPr lang="en-US" dirty="0">
-                <a:solidFill>
-                  <a:schemeClr val="accent1"/>
-                </a:solidFill>
-              </a:rPr>
-              <a:t>, share-the-code manner that </a:t>
-            </a:r>
-            <a:r>
-              <a:rPr lang="en-US" dirty="0" smtClean="0">
-                <a:solidFill>
-                  <a:schemeClr val="accent1"/>
-                </a:solidFill>
-              </a:rPr>
-              <a:t>was the </a:t>
-            </a:r>
-            <a:r>
-              <a:rPr lang="en-US" dirty="0">
-                <a:solidFill>
-                  <a:schemeClr val="accent1"/>
-                </a:solidFill>
-              </a:rPr>
-              <a:t>hallmark of the early Bell Labs UNIX, whereas AT&amp;T started steering UNIX </a:t>
-            </a:r>
-            <a:r>
-              <a:rPr lang="en-US" dirty="0" smtClean="0">
-                <a:solidFill>
-                  <a:schemeClr val="accent1"/>
-                </a:solidFill>
-              </a:rPr>
-              <a:t>toward  commercialization</a:t>
-            </a:r>
+              <a:t>which was serendipitous, 	because that was the computer that took over the academic community.”</a:t>
+            </a:r>
+          </a:p>
+          <a:p>
             <a:endParaRPr lang="en-US" dirty="0">
               <a:solidFill>
                 <a:schemeClr val="accent1"/>
               </a:solidFill>
             </a:endParaRPr>
           </a:p>
-          <a:p>
+        </p:txBody>
+      </p:sp>
+      <p:sp>
+        <p:nvSpPr>
+          <p:cNvPr id="10" name="Rectangle 9"/>
+          <p:cNvSpPr/>
+          <p:nvPr/>
+        </p:nvSpPr>
+        <p:spPr>
+          <a:xfrm>
+            <a:off x="533400" y="5562600"/>
+            <a:ext cx="4235455" cy="369332"/>
+          </a:xfrm>
+          <a:prstGeom prst="rect">
+            <a:avLst/>
+          </a:prstGeom>
+        </p:spPr>
+        <p:txBody>
+          <a:bodyPr wrap="none">
+            <a:spAutoFit/>
+          </a:bodyPr>
+          <a:lstStyle/>
+          <a:p>
+            <a:pPr marL="285750" indent="-285750">
+              <a:buFont typeface="Arial" panose="020B0604020202020204" pitchFamily="34" charset="0"/>
+              <a:buChar char="•"/>
+            </a:pPr>
+            <a:r>
+              <a:rPr lang="en-US" dirty="0">
+                <a:solidFill>
+                  <a:schemeClr val="accent1"/>
+                </a:solidFill>
+              </a:rPr>
+              <a:t>UNIX is the first free Operating System</a:t>
+            </a:r>
+          </a:p>
+        </p:txBody>
+      </p:sp>
+    </p:spTree>
+    <p:extLst>
+      <p:ext uri="{BB962C8B-B14F-4D97-AF65-F5344CB8AC3E}">
+        <p14:creationId xmlns:p14="http://schemas.microsoft.com/office/powerpoint/2010/main" val="2820919567"/>
+      </p:ext>
+    </p:extLst>
+  </p:cSld>
+  <p:clrMapOvr>
+    <a:masterClrMapping/>
+  </p:clrMapOvr>
+  <p:timing>
+    <p:tnLst>
+      <p:par>
+        <p:cTn id="1" dur="indefinite" restart="never" nodeType="tmRoot"/>
+      </p:par>
+    </p:tnLst>
+  </p:timing>
+</p:sld>
+</file>
+
+<file path=ppt/slides/slide6.xml><?xml version="1.0" encoding="utf-8"?>
+<p:sld xmlns:a="http://schemas.openxmlformats.org/drawingml/2006/main" xmlns:r="http://schemas.openxmlformats.org/officeDocument/2006/relationships" xmlns:p="http://schemas.openxmlformats.org/presentationml/2006/main">
+  <p:cSld>
+    <p:spTree>
+      <p:nvGrpSpPr>
+        <p:cNvPr id="1" name=""/>
+        <p:cNvGrpSpPr/>
+        <p:nvPr/>
+      </p:nvGrpSpPr>
+      <p:grpSpPr>
+        <a:xfrm>
+          <a:off x="0" y="0"/>
+          <a:ext cx="0" cy="0"/>
+          <a:chOff x="0" y="0"/>
+          <a:chExt cx="0" cy="0"/>
+        </a:xfrm>
+      </p:grpSpPr>
+      <p:sp>
+        <p:nvSpPr>
+          <p:cNvPr id="2" name="Title 1"/>
+          <p:cNvSpPr>
+            <a:spLocks noGrp="1"/>
+          </p:cNvSpPr>
+          <p:nvPr>
+            <p:ph type="title"/>
+          </p:nvPr>
+        </p:nvSpPr>
+        <p:spPr>
+          <a:xfrm>
+            <a:off x="533400" y="838200"/>
+            <a:ext cx="4495800" cy="457200"/>
+          </a:xfrm>
+        </p:spPr>
+        <p:txBody>
+          <a:bodyPr>
+            <a:normAutofit fontScale="90000"/>
+          </a:bodyPr>
+          <a:lstStyle/>
+          <a:p>
+            <a:r>
+              <a:rPr lang="en-US" sz="2800" dirty="0" smtClean="0"/>
+              <a:t>BSD:</a:t>
+            </a:r>
+            <a:endParaRPr lang="en-US" sz="2800" dirty="0"/>
+          </a:p>
+        </p:txBody>
+      </p:sp>
+      <p:sp>
+        <p:nvSpPr>
+          <p:cNvPr id="3" name="Text Placeholder 2"/>
+          <p:cNvSpPr>
+            <a:spLocks noGrp="1"/>
+          </p:cNvSpPr>
+          <p:nvPr>
+            <p:ph type="body" idx="1"/>
+          </p:nvPr>
+        </p:nvSpPr>
+        <p:spPr>
+          <a:xfrm>
+            <a:off x="457200" y="2057400"/>
+            <a:ext cx="11201400" cy="609599"/>
+          </a:xfrm>
+        </p:spPr>
+        <p:txBody>
+          <a:bodyPr>
+            <a:normAutofit lnSpcReduction="10000"/>
+          </a:bodyPr>
+          <a:lstStyle/>
+          <a:p>
+            <a:pPr marL="342900" indent="-342900">
+              <a:buFont typeface="Arial" panose="020B0604020202020204" pitchFamily="34" charset="0"/>
+              <a:buChar char="•"/>
+            </a:pPr>
+            <a:r>
+              <a:rPr lang="en-US" dirty="0" smtClean="0"/>
+              <a:t>BSD (Berkeley Software Distribution) was the first major variant of unix created at University of California at Berkeley.</a:t>
+            </a:r>
+          </a:p>
+          <a:p>
+            <a:endParaRPr lang="en-US" dirty="0" smtClean="0"/>
+          </a:p>
+        </p:txBody>
+      </p:sp>
+      <p:sp>
+        <p:nvSpPr>
+          <p:cNvPr id="9" name="TextBox 8"/>
+          <p:cNvSpPr txBox="1"/>
+          <p:nvPr/>
+        </p:nvSpPr>
+        <p:spPr>
+          <a:xfrm>
+            <a:off x="533400" y="3124200"/>
+            <a:ext cx="10744200" cy="1200329"/>
+          </a:xfrm>
+          <a:prstGeom prst="rect">
+            <a:avLst/>
+          </a:prstGeom>
+          <a:noFill/>
+        </p:spPr>
+        <p:txBody>
+          <a:bodyPr wrap="square" rtlCol="0">
+            <a:spAutoFit/>
+          </a:bodyPr>
+          <a:lstStyle/>
+          <a:p>
+            <a:pPr marL="285750" indent="-285750">
+              <a:buFont typeface="Arial" panose="020B0604020202020204" pitchFamily="34" charset="0"/>
+              <a:buChar char="•"/>
+            </a:pPr>
+            <a:r>
+              <a:rPr lang="en-US" dirty="0">
+                <a:solidFill>
+                  <a:schemeClr val="accent1"/>
+                </a:solidFill>
+              </a:rPr>
+              <a:t>the BSD and Bell Labs versions of UNIX headed off in  </a:t>
+            </a:r>
+            <a:r>
+              <a:rPr lang="en-US" dirty="0" smtClean="0">
+                <a:solidFill>
+                  <a:schemeClr val="accent1"/>
+                </a:solidFill>
+              </a:rPr>
+              <a:t>separate directions</a:t>
+            </a:r>
+            <a:r>
+              <a:rPr lang="en-US" dirty="0">
+                <a:solidFill>
+                  <a:schemeClr val="accent1"/>
+                </a:solidFill>
+              </a:rPr>
+              <a:t>. BSD continued forward in the </a:t>
+            </a:r>
+            <a:r>
+              <a:rPr lang="en-US" dirty="0" smtClean="0">
+                <a:solidFill>
+                  <a:schemeClr val="accent1"/>
+                </a:solidFill>
+              </a:rPr>
+              <a:t>free-ﬂowing</a:t>
+            </a:r>
+            <a:r>
+              <a:rPr lang="en-US" dirty="0">
+                <a:solidFill>
+                  <a:schemeClr val="accent1"/>
+                </a:solidFill>
+              </a:rPr>
+              <a:t>, share-the-code manner that </a:t>
+            </a:r>
+            <a:r>
+              <a:rPr lang="en-US" dirty="0" smtClean="0">
+                <a:solidFill>
+                  <a:schemeClr val="accent1"/>
+                </a:solidFill>
+              </a:rPr>
+              <a:t>was the </a:t>
+            </a:r>
+            <a:r>
+              <a:rPr lang="en-US" dirty="0">
+                <a:solidFill>
+                  <a:schemeClr val="accent1"/>
+                </a:solidFill>
+              </a:rPr>
+              <a:t>hallmark of the early Bell Labs UNIX, whereas AT&amp;T started steering UNIX </a:t>
+            </a:r>
+            <a:r>
+              <a:rPr lang="en-US" dirty="0" smtClean="0">
+                <a:solidFill>
+                  <a:schemeClr val="accent1"/>
+                </a:solidFill>
+              </a:rPr>
+              <a:t>toward  commercialization</a:t>
+            </a:r>
             <a:endParaRPr lang="en-US" dirty="0">
               <a:solidFill>
                 <a:schemeClr val="accent1"/>
               </a:solidFill>
             </a:endParaRPr>
           </a:p>
+          <a:p>
+            <a:endParaRPr lang="en-US" dirty="0">
+              <a:solidFill>
+                <a:schemeClr val="accent1"/>
+              </a:solidFill>
+            </a:endParaRPr>
+          </a:p>
         </p:txBody>
       </p:sp>
       <p:sp>
@@ -4489,7 +5321,7 @@
         </p:nvSpPr>
         <p:spPr>
           <a:xfrm>
-            <a:off x="533400" y="4597064"/>
+            <a:off x="533400" y="4267200"/>
             <a:ext cx="1407758" cy="923330"/>
           </a:xfrm>
           <a:prstGeom prst="rect">
@@ -4597,6 +5429,1009 @@
       </p:par>
     </p:tnLst>
   </p:timing>
+</p:sld>
+</file>
+
+<file path=ppt/slides/slide7.xml><?xml version="1.0" encoding="utf-8"?>
+<p:sld xmlns:a="http://schemas.openxmlformats.org/drawingml/2006/main" xmlns:r="http://schemas.openxmlformats.org/officeDocument/2006/relationships" xmlns:p="http://schemas.openxmlformats.org/presentationml/2006/main">
+  <p:cSld>
+    <p:spTree>
+      <p:nvGrpSpPr>
+        <p:cNvPr id="1" name=""/>
+        <p:cNvGrpSpPr/>
+        <p:nvPr/>
+      </p:nvGrpSpPr>
+      <p:grpSpPr>
+        <a:xfrm>
+          <a:off x="0" y="0"/>
+          <a:ext cx="0" cy="0"/>
+          <a:chOff x="0" y="0"/>
+          <a:chExt cx="0" cy="0"/>
+        </a:xfrm>
+      </p:grpSpPr>
+      <p:sp>
+        <p:nvSpPr>
+          <p:cNvPr id="2" name="Title 1"/>
+          <p:cNvSpPr>
+            <a:spLocks noGrp="1"/>
+          </p:cNvSpPr>
+          <p:nvPr>
+            <p:ph type="title"/>
+          </p:nvPr>
+        </p:nvSpPr>
+        <p:spPr>
+          <a:xfrm>
+            <a:off x="533400" y="838200"/>
+            <a:ext cx="4495800" cy="457200"/>
+          </a:xfrm>
+        </p:spPr>
+        <p:txBody>
+          <a:bodyPr>
+            <a:normAutofit fontScale="90000"/>
+          </a:bodyPr>
+          <a:lstStyle/>
+          <a:p>
+            <a:r>
+              <a:rPr lang="en-US" sz="2800" dirty="0" smtClean="0"/>
+              <a:t>GNU:</a:t>
+            </a:r>
+            <a:endParaRPr lang="en-US" sz="2800" dirty="0"/>
+          </a:p>
+        </p:txBody>
+      </p:sp>
+      <p:sp>
+        <p:nvSpPr>
+          <p:cNvPr id="3" name="Text Placeholder 2"/>
+          <p:cNvSpPr>
+            <a:spLocks noGrp="1"/>
+          </p:cNvSpPr>
+          <p:nvPr>
+            <p:ph type="body" idx="1"/>
+          </p:nvPr>
+        </p:nvSpPr>
+        <p:spPr>
+          <a:xfrm>
+            <a:off x="457200" y="2057400"/>
+            <a:ext cx="8001000" cy="609599"/>
+          </a:xfrm>
+        </p:spPr>
+        <p:txBody>
+          <a:bodyPr>
+            <a:normAutofit lnSpcReduction="10000"/>
+          </a:bodyPr>
+          <a:lstStyle/>
+          <a:p>
+            <a:pPr marL="342900" indent="-342900">
+              <a:buFont typeface="Arial" panose="020B0604020202020204" pitchFamily="34" charset="0"/>
+              <a:buChar char="•"/>
+            </a:pPr>
+            <a:r>
+              <a:rPr lang="en-US" dirty="0" smtClean="0"/>
+              <a:t>GNU (GNU </a:t>
+            </a:r>
+            <a:r>
+              <a:rPr lang="en-US" dirty="0"/>
+              <a:t>is Not </a:t>
+            </a:r>
+            <a:r>
+              <a:rPr lang="en-US" dirty="0" smtClean="0"/>
+              <a:t>UNIX) was started in 1983 by Richard Stallman</a:t>
+            </a:r>
+            <a:r>
+              <a:rPr lang="en-US" dirty="0" smtClean="0"/>
+              <a:t>.</a:t>
+            </a:r>
+            <a:endParaRPr lang="en-US" dirty="0" smtClean="0"/>
+          </a:p>
+          <a:p>
+            <a:endParaRPr lang="en-US" dirty="0" smtClean="0"/>
+          </a:p>
+        </p:txBody>
+      </p:sp>
+      <p:sp>
+        <p:nvSpPr>
+          <p:cNvPr id="9" name="TextBox 8"/>
+          <p:cNvSpPr txBox="1"/>
+          <p:nvPr/>
+        </p:nvSpPr>
+        <p:spPr>
+          <a:xfrm>
+            <a:off x="457200" y="2730321"/>
+            <a:ext cx="8001000" cy="646331"/>
+          </a:xfrm>
+          <a:prstGeom prst="rect">
+            <a:avLst/>
+          </a:prstGeom>
+          <a:noFill/>
+        </p:spPr>
+        <p:txBody>
+          <a:bodyPr wrap="square" rtlCol="0">
+            <a:spAutoFit/>
+          </a:bodyPr>
+          <a:lstStyle/>
+          <a:p>
+            <a:pPr marL="285750" indent="-285750">
+              <a:buFont typeface="Arial" panose="020B0604020202020204" pitchFamily="34" charset="0"/>
+              <a:buChar char="•"/>
+            </a:pPr>
+            <a:r>
+              <a:rPr lang="en-US" dirty="0">
+                <a:solidFill>
+                  <a:schemeClr val="accent1"/>
+                </a:solidFill>
+              </a:rPr>
+              <a:t>GNU was intended to become a recoding of the entire UNIX operating system that could </a:t>
+            </a:r>
+            <a:r>
+              <a:rPr lang="en-US" dirty="0" smtClean="0">
+                <a:solidFill>
+                  <a:schemeClr val="accent1"/>
+                </a:solidFill>
+              </a:rPr>
+              <a:t>be freely </a:t>
+            </a:r>
+            <a:r>
+              <a:rPr lang="en-US" dirty="0">
+                <a:solidFill>
+                  <a:schemeClr val="accent1"/>
+                </a:solidFill>
+              </a:rPr>
+              <a:t>distributed</a:t>
+            </a:r>
+            <a:endParaRPr lang="en-US" dirty="0">
+              <a:solidFill>
+                <a:schemeClr val="accent1"/>
+              </a:solidFill>
+            </a:endParaRPr>
+          </a:p>
+        </p:txBody>
+      </p:sp>
+      <p:pic>
+        <p:nvPicPr>
+          <p:cNvPr id="4" name="Picture 3"/>
+          <p:cNvPicPr>
+            <a:picLocks noChangeAspect="1"/>
+          </p:cNvPicPr>
+          <p:nvPr/>
+        </p:nvPicPr>
+        <p:blipFill>
+          <a:blip r:embed="rId2">
+            <a:extLst>
+              <a:ext uri="{28A0092B-C50C-407E-A947-70E740481C1C}">
+                <a14:useLocalDpi xmlns:a14="http://schemas.microsoft.com/office/drawing/2010/main" val="0"/>
+              </a:ext>
+            </a:extLst>
+          </a:blip>
+          <a:stretch>
+            <a:fillRect/>
+          </a:stretch>
+        </p:blipFill>
+        <p:spPr>
+          <a:xfrm>
+            <a:off x="10439400" y="571500"/>
+            <a:ext cx="1219200" cy="990599"/>
+          </a:xfrm>
+          <a:prstGeom prst="rect">
+            <a:avLst/>
+          </a:prstGeom>
+        </p:spPr>
+      </p:pic>
+      <p:pic>
+        <p:nvPicPr>
+          <p:cNvPr id="11" name="Picture 4"/>
+          <p:cNvPicPr>
+            <a:picLocks noChangeAspect="1" noChangeArrowheads="1"/>
+          </p:cNvPicPr>
+          <p:nvPr/>
+        </p:nvPicPr>
+        <p:blipFill>
+          <a:blip r:embed="rId3">
+            <a:extLst>
+              <a:ext uri="{28A0092B-C50C-407E-A947-70E740481C1C}">
+                <a14:useLocalDpi xmlns:a14="http://schemas.microsoft.com/office/drawing/2010/main" val="0"/>
+              </a:ext>
+            </a:extLst>
+          </a:blip>
+          <a:srcRect/>
+          <a:stretch>
+            <a:fillRect/>
+          </a:stretch>
+        </p:blipFill>
+        <p:spPr bwMode="auto">
+          <a:xfrm>
+            <a:off x="9525000" y="2057400"/>
+            <a:ext cx="2133600" cy="2590800"/>
+          </a:xfrm>
+          <a:prstGeom prst="rect">
+            <a:avLst/>
+          </a:prstGeom>
+          <a:noFill/>
+          <a:ln>
+            <a:noFill/>
+          </a:ln>
+          <a:effectLst/>
+          <a:extLst>
+            <a:ext uri="{909E8E84-426E-40DD-AFC4-6F175D3DCCD1}">
+              <a14:hiddenFill xmlns:a14="http://schemas.microsoft.com/office/drawing/2010/main">
+                <a:solidFill>
+                  <a:schemeClr val="accent1"/>
+                </a:solidFill>
+              </a14:hiddenFill>
+            </a:ext>
+            <a:ext uri="{91240B29-F687-4F45-9708-019B960494DF}">
+              <a14:hiddenLine xmlns:a14="http://schemas.microsoft.com/office/drawing/2010/main" w="9525">
+                <a:solidFill>
+                  <a:schemeClr val="tx1"/>
+                </a:solidFill>
+                <a:miter lim="800000"/>
+                <a:headEnd/>
+                <a:tailEnd/>
+              </a14:hiddenLine>
+            </a:ext>
+            <a:ext uri="{AF507438-7753-43E0-B8FC-AC1667EBCBE1}">
+              <a14:hiddenEffects xmlns:a14="http://schemas.microsoft.com/office/drawing/2010/main">
+                <a:effectLst>
+                  <a:outerShdw dist="35921" dir="2700000" algn="ctr" rotWithShape="0">
+                    <a:schemeClr val="bg2"/>
+                  </a:outerShdw>
+                </a:effectLst>
+              </a14:hiddenEffects>
+            </a:ext>
+          </a:extLst>
+        </p:spPr>
+      </p:pic>
+      <p:sp>
+        <p:nvSpPr>
+          <p:cNvPr id="6" name="Rectangle 5"/>
+          <p:cNvSpPr/>
+          <p:nvPr/>
+        </p:nvSpPr>
+        <p:spPr>
+          <a:xfrm>
+            <a:off x="457200" y="6096000"/>
+            <a:ext cx="4919937" cy="369332"/>
+          </a:xfrm>
+          <a:prstGeom prst="rect">
+            <a:avLst/>
+          </a:prstGeom>
+        </p:spPr>
+        <p:txBody>
+          <a:bodyPr wrap="none">
+            <a:spAutoFit/>
+          </a:bodyPr>
+          <a:lstStyle/>
+          <a:p>
+            <a:pPr marL="285750" indent="-285750">
+              <a:buFont typeface="Arial" panose="020B0604020202020204" pitchFamily="34" charset="0"/>
+              <a:buChar char="•"/>
+            </a:pPr>
+            <a:r>
+              <a:rPr lang="en-US" dirty="0">
+                <a:solidFill>
+                  <a:schemeClr val="accent1"/>
+                </a:solidFill>
+              </a:rPr>
+              <a:t>https://www.gnu.org/gnu/thegnuproject.html</a:t>
+            </a:r>
+          </a:p>
+        </p:txBody>
+      </p:sp>
+      <p:sp>
+        <p:nvSpPr>
+          <p:cNvPr id="12" name="Rectangle 11"/>
+          <p:cNvSpPr/>
+          <p:nvPr/>
+        </p:nvSpPr>
+        <p:spPr>
+          <a:xfrm>
+            <a:off x="457201" y="3505200"/>
+            <a:ext cx="8001000" cy="1200329"/>
+          </a:xfrm>
+          <a:prstGeom prst="rect">
+            <a:avLst/>
+          </a:prstGeom>
+        </p:spPr>
+        <p:txBody>
+          <a:bodyPr wrap="square">
+            <a:spAutoFit/>
+          </a:bodyPr>
+          <a:lstStyle/>
+          <a:p>
+            <a:pPr marL="285750" indent="-285750">
+              <a:buFont typeface="Arial" panose="020B0604020202020204" pitchFamily="34" charset="0"/>
+              <a:buChar char="•"/>
+            </a:pPr>
+            <a:r>
+              <a:rPr lang="en-US" dirty="0">
+                <a:solidFill>
+                  <a:schemeClr val="accent1"/>
+                </a:solidFill>
+              </a:rPr>
+              <a:t>By 1990, the GNU system was almost complete; the only major missing component was the kernel</a:t>
+            </a:r>
+            <a:r>
+              <a:rPr lang="en-US" dirty="0" smtClean="0">
+                <a:solidFill>
+                  <a:schemeClr val="accent1"/>
+                </a:solidFill>
+              </a:rPr>
+              <a:t>. </a:t>
+            </a:r>
+            <a:r>
+              <a:rPr lang="en-US" dirty="0">
+                <a:solidFill>
+                  <a:schemeClr val="accent1"/>
+                </a:solidFill>
+                <a:latin typeface="Arial" panose="020B0604020202020204" pitchFamily="34" charset="0"/>
+              </a:rPr>
+              <a:t>Initially the components required for kernel development were written: editors, shell, compiler</a:t>
+            </a:r>
+            <a:endParaRPr lang="en-US" dirty="0">
+              <a:solidFill>
+                <a:schemeClr val="accent1"/>
+              </a:solidFill>
+            </a:endParaRPr>
+          </a:p>
+          <a:p>
+            <a:r>
+              <a:rPr lang="en-US" dirty="0" smtClean="0">
+                <a:solidFill>
+                  <a:schemeClr val="accent1"/>
+                </a:solidFill>
+                <a:latin typeface="Arial" panose="020B0604020202020204" pitchFamily="34" charset="0"/>
+              </a:rPr>
+              <a:t> </a:t>
+            </a:r>
+            <a:endParaRPr lang="en-US" dirty="0">
+              <a:solidFill>
+                <a:schemeClr val="accent1"/>
+              </a:solidFill>
+            </a:endParaRPr>
+          </a:p>
+        </p:txBody>
+      </p:sp>
+      <p:sp>
+        <p:nvSpPr>
+          <p:cNvPr id="8" name="Rectangle 7"/>
+          <p:cNvSpPr/>
+          <p:nvPr/>
+        </p:nvSpPr>
+        <p:spPr>
+          <a:xfrm>
+            <a:off x="457200" y="4514671"/>
+            <a:ext cx="8001000" cy="646331"/>
+          </a:xfrm>
+          <a:prstGeom prst="rect">
+            <a:avLst/>
+          </a:prstGeom>
+        </p:spPr>
+        <p:txBody>
+          <a:bodyPr wrap="square">
+            <a:spAutoFit/>
+          </a:bodyPr>
+          <a:lstStyle/>
+          <a:p>
+            <a:pPr marL="285750" indent="-285750">
+              <a:buFont typeface="Arial" panose="020B0604020202020204" pitchFamily="34" charset="0"/>
+              <a:buChar char="•"/>
+            </a:pPr>
+            <a:r>
+              <a:rPr lang="en-US" dirty="0" smtClean="0">
+                <a:solidFill>
+                  <a:schemeClr val="accent1"/>
+                </a:solidFill>
+                <a:latin typeface="Times New Roman" panose="02020603050405020304" pitchFamily="18" charset="0"/>
+              </a:rPr>
+              <a:t>the </a:t>
+            </a:r>
+            <a:r>
+              <a:rPr lang="en-US" dirty="0">
+                <a:solidFill>
+                  <a:schemeClr val="accent1"/>
+                </a:solidFill>
+                <a:latin typeface="Times New Roman" panose="02020603050405020304" pitchFamily="18" charset="0"/>
+              </a:rPr>
+              <a:t>GNU Hurd is a collection of servers (i.e., a herd of GNUs) that run on top of Mach, and </a:t>
+            </a:r>
+            <a:r>
+              <a:rPr lang="en-US" dirty="0" smtClean="0">
+                <a:solidFill>
+                  <a:schemeClr val="accent1"/>
+                </a:solidFill>
+                <a:latin typeface="Times New Roman" panose="02020603050405020304" pitchFamily="18" charset="0"/>
+              </a:rPr>
+              <a:t>do </a:t>
+            </a:r>
+            <a:r>
+              <a:rPr lang="en-US" dirty="0">
+                <a:solidFill>
+                  <a:schemeClr val="accent1"/>
+                </a:solidFill>
+                <a:latin typeface="Times New Roman" panose="02020603050405020304" pitchFamily="18" charset="0"/>
+              </a:rPr>
+              <a:t>the various jobs of the Unix kernel</a:t>
+            </a:r>
+            <a:r>
+              <a:rPr lang="en-US" dirty="0" smtClean="0">
+                <a:solidFill>
+                  <a:schemeClr val="accent1"/>
+                </a:solidFill>
+                <a:latin typeface="Times New Roman" panose="02020603050405020304" pitchFamily="18" charset="0"/>
+              </a:rPr>
+              <a:t>.</a:t>
+            </a:r>
+            <a:endParaRPr lang="en-US" dirty="0">
+              <a:solidFill>
+                <a:schemeClr val="accent1"/>
+              </a:solidFill>
+            </a:endParaRPr>
+          </a:p>
+        </p:txBody>
+      </p:sp>
+      <p:sp>
+        <p:nvSpPr>
+          <p:cNvPr id="13" name="Rectangle 12"/>
+          <p:cNvSpPr/>
+          <p:nvPr/>
+        </p:nvSpPr>
+        <p:spPr>
+          <a:xfrm>
+            <a:off x="457200" y="5362376"/>
+            <a:ext cx="3337773" cy="369332"/>
+          </a:xfrm>
+          <a:prstGeom prst="rect">
+            <a:avLst/>
+          </a:prstGeom>
+        </p:spPr>
+        <p:txBody>
+          <a:bodyPr wrap="none">
+            <a:spAutoFit/>
+          </a:bodyPr>
+          <a:lstStyle/>
+          <a:p>
+            <a:pPr marL="285750" indent="-285750">
+              <a:buFont typeface="Arial" panose="020B0604020202020204" pitchFamily="34" charset="0"/>
+              <a:buChar char="•"/>
+            </a:pPr>
+            <a:r>
+              <a:rPr lang="en-US" altLang="en-US" dirty="0" smtClean="0">
+                <a:solidFill>
+                  <a:schemeClr val="accent1"/>
+                </a:solidFill>
+              </a:rPr>
+              <a:t>GNU/Hurd was </a:t>
+            </a:r>
+            <a:r>
+              <a:rPr lang="en-US" altLang="en-US" dirty="0">
+                <a:solidFill>
+                  <a:schemeClr val="accent1"/>
+                </a:solidFill>
+              </a:rPr>
+              <a:t>not successful</a:t>
+            </a:r>
+            <a:endParaRPr lang="en-US" altLang="en-US" dirty="0">
+              <a:solidFill>
+                <a:schemeClr val="accent1"/>
+              </a:solidFill>
+            </a:endParaRPr>
+          </a:p>
+        </p:txBody>
+      </p:sp>
+    </p:spTree>
+    <p:extLst>
+      <p:ext uri="{BB962C8B-B14F-4D97-AF65-F5344CB8AC3E}">
+        <p14:creationId xmlns:p14="http://schemas.microsoft.com/office/powerpoint/2010/main" val="3835451171"/>
+      </p:ext>
+    </p:extLst>
+  </p:cSld>
+  <p:clrMapOvr>
+    <a:masterClrMapping/>
+  </p:clrMapOvr>
+  <p:timing>
+    <p:tnLst>
+      <p:par>
+        <p:cTn id="1" dur="indefinite" restart="never" nodeType="tmRoot">
+          <p:childTnLst>
+            <p:seq concurrent="1" nextAc="seek">
+              <p:cTn id="2" dur="indefinite" nodeType="mainSeq">
+                <p:childTnLst>
+                  <p:par>
+                    <p:cTn id="3" fill="hold">
+                      <p:stCondLst>
+                        <p:cond delay="indefinite"/>
+                      </p:stCondLst>
+                      <p:childTnLst>
+                        <p:par>
+                          <p:cTn id="4" fill="hold">
+                            <p:stCondLst>
+                              <p:cond delay="0"/>
+                            </p:stCondLst>
+                            <p:childTnLst>
+                              <p:par>
+                                <p:cTn id="5" presetID="10" presetClass="entr" presetSubtype="0" fill="hold" nodeType="clickEffect">
+                                  <p:stCondLst>
+                                    <p:cond delay="0"/>
+                                  </p:stCondLst>
+                                  <p:childTnLst>
+                                    <p:set>
+                                      <p:cBhvr>
+                                        <p:cTn id="6" dur="1" fill="hold">
+                                          <p:stCondLst>
+                                            <p:cond delay="0"/>
+                                          </p:stCondLst>
+                                        </p:cTn>
+                                        <p:tgtEl>
+                                          <p:spTgt spid="11"/>
+                                        </p:tgtEl>
+                                        <p:attrNameLst>
+                                          <p:attrName>style.visibility</p:attrName>
+                                        </p:attrNameLst>
+                                      </p:cBhvr>
+                                      <p:to>
+                                        <p:strVal val="visible"/>
+                                      </p:to>
+                                    </p:set>
+                                    <p:animEffect transition="in" filter="fade">
+                                      <p:cBhvr>
+                                        <p:cTn id="7" dur="2000"/>
+                                        <p:tgtEl>
+                                          <p:spTgt spid="11"/>
+                                        </p:tgtEl>
+                                      </p:cBhvr>
+                                    </p:animEffect>
+                                  </p:childTnLst>
+                                </p:cTn>
+                              </p:par>
+                            </p:childTnLst>
+                          </p:cTn>
+                        </p:par>
+                      </p:childTnLst>
+                    </p:cTn>
+                  </p:par>
+                </p:childTnLst>
+              </p:cTn>
+              <p:prevCondLst>
+                <p:cond evt="onPrev" delay="0">
+                  <p:tgtEl>
+                    <p:sldTgt/>
+                  </p:tgtEl>
+                </p:cond>
+              </p:prevCondLst>
+              <p:nextCondLst>
+                <p:cond evt="onNext" delay="0">
+                  <p:tgtEl>
+                    <p:sldTgt/>
+                  </p:tgtEl>
+                </p:cond>
+              </p:nextCondLst>
+            </p:seq>
+          </p:childTnLst>
+        </p:cTn>
+      </p:par>
+    </p:tnLst>
+  </p:timing>
+</p:sld>
+</file>
+
+<file path=ppt/slides/slide8.xml><?xml version="1.0" encoding="utf-8"?>
+<p:sld xmlns:a="http://schemas.openxmlformats.org/drawingml/2006/main" xmlns:r="http://schemas.openxmlformats.org/officeDocument/2006/relationships" xmlns:p="http://schemas.openxmlformats.org/presentationml/2006/main">
+  <p:cSld>
+    <p:spTree>
+      <p:nvGrpSpPr>
+        <p:cNvPr id="1" name=""/>
+        <p:cNvGrpSpPr/>
+        <p:nvPr/>
+      </p:nvGrpSpPr>
+      <p:grpSpPr>
+        <a:xfrm>
+          <a:off x="0" y="0"/>
+          <a:ext cx="0" cy="0"/>
+          <a:chOff x="0" y="0"/>
+          <a:chExt cx="0" cy="0"/>
+        </a:xfrm>
+      </p:grpSpPr>
+      <p:sp>
+        <p:nvSpPr>
+          <p:cNvPr id="2" name="Title 1"/>
+          <p:cNvSpPr>
+            <a:spLocks noGrp="1"/>
+          </p:cNvSpPr>
+          <p:nvPr>
+            <p:ph type="title"/>
+          </p:nvPr>
+        </p:nvSpPr>
+        <p:spPr>
+          <a:xfrm>
+            <a:off x="1447800" y="2895600"/>
+            <a:ext cx="9144000" cy="685800"/>
+          </a:xfrm>
+        </p:spPr>
+        <p:txBody>
+          <a:bodyPr/>
+          <a:lstStyle/>
+          <a:p>
+            <a:pPr algn="ctr"/>
+            <a:r>
+              <a:rPr lang="en-US" dirty="0">
+                <a:solidFill>
+                  <a:schemeClr val="accent5"/>
+                </a:solidFill>
+              </a:rPr>
+              <a:t>f</a:t>
+            </a:r>
+            <a:r>
+              <a:rPr lang="en-US" dirty="0" smtClean="0">
+                <a:solidFill>
+                  <a:schemeClr val="accent5"/>
+                </a:solidFill>
+              </a:rPr>
+              <a:t>ree_or_opensource</a:t>
+            </a:r>
+            <a:endParaRPr lang="en-US" dirty="0">
+              <a:solidFill>
+                <a:schemeClr val="accent5"/>
+              </a:solidFill>
+            </a:endParaRPr>
+          </a:p>
+        </p:txBody>
+      </p:sp>
+    </p:spTree>
+    <p:extLst>
+      <p:ext uri="{BB962C8B-B14F-4D97-AF65-F5344CB8AC3E}">
+        <p14:creationId xmlns:p14="http://schemas.microsoft.com/office/powerpoint/2010/main" val="3971442849"/>
+      </p:ext>
+    </p:extLst>
+  </p:cSld>
+  <p:clrMapOvr>
+    <a:masterClrMapping/>
+  </p:clrMapOvr>
+  <p:timing>
+    <p:tnLst>
+      <p:par>
+        <p:cTn id="1" dur="indefinite" restart="never" nodeType="tmRoot"/>
+      </p:par>
+    </p:tnLst>
+  </p:timing>
+</p:sld>
+</file>
+
+<file path=ppt/slides/slide9.xml><?xml version="1.0" encoding="utf-8"?>
+<p:sld xmlns:a="http://schemas.openxmlformats.org/drawingml/2006/main" xmlns:r="http://schemas.openxmlformats.org/officeDocument/2006/relationships" xmlns:p="http://schemas.openxmlformats.org/presentationml/2006/main">
+  <p:cSld>
+    <p:spTree>
+      <p:nvGrpSpPr>
+        <p:cNvPr id="1" name=""/>
+        <p:cNvGrpSpPr/>
+        <p:nvPr/>
+      </p:nvGrpSpPr>
+      <p:grpSpPr>
+        <a:xfrm>
+          <a:off x="0" y="0"/>
+          <a:ext cx="0" cy="0"/>
+          <a:chOff x="0" y="0"/>
+          <a:chExt cx="0" cy="0"/>
+        </a:xfrm>
+      </p:grpSpPr>
+      <p:sp>
+        <p:nvSpPr>
+          <p:cNvPr id="5" name="Rectangle 4"/>
+          <p:cNvSpPr/>
+          <p:nvPr/>
+        </p:nvSpPr>
+        <p:spPr>
+          <a:xfrm>
+            <a:off x="457200" y="990600"/>
+            <a:ext cx="10057738" cy="2862322"/>
+          </a:xfrm>
+          <a:prstGeom prst="rect">
+            <a:avLst/>
+          </a:prstGeom>
+        </p:spPr>
+        <p:txBody>
+          <a:bodyPr wrap="square">
+            <a:spAutoFit/>
+          </a:bodyPr>
+          <a:lstStyle/>
+          <a:p>
+            <a:r>
+              <a:rPr lang="en-US" dirty="0" smtClean="0">
+                <a:latin typeface="Times New Roman" panose="02020603050405020304" pitchFamily="18" charset="0"/>
+              </a:rPr>
+              <a:t>A program is free software, for a particular user, if:</a:t>
+            </a:r>
+          </a:p>
+          <a:p>
+            <a:pPr marL="285750" indent="-285750">
+              <a:buFont typeface="Arial" panose="020B0604020202020204" pitchFamily="34" charset="0"/>
+              <a:buChar char="•"/>
+            </a:pPr>
+            <a:endParaRPr lang="en-US" dirty="0">
+              <a:solidFill>
+                <a:schemeClr val="accent1"/>
+              </a:solidFill>
+              <a:latin typeface="Times New Roman" panose="02020603050405020304" pitchFamily="18" charset="0"/>
+            </a:endParaRPr>
+          </a:p>
+          <a:p>
+            <a:pPr marL="742950" lvl="1" indent="-285750">
+              <a:buFont typeface="Arial" panose="020B0604020202020204" pitchFamily="34" charset="0"/>
+              <a:buChar char="•"/>
+            </a:pPr>
+            <a:r>
+              <a:rPr lang="en-US" dirty="0">
+                <a:solidFill>
+                  <a:schemeClr val="accent1"/>
+                </a:solidFill>
+                <a:latin typeface="Times New Roman" panose="02020603050405020304" pitchFamily="18" charset="0"/>
+              </a:rPr>
+              <a:t>You have the freedom to </a:t>
+            </a:r>
+            <a:r>
+              <a:rPr lang="en-US" dirty="0">
+                <a:solidFill>
+                  <a:schemeClr val="accent3"/>
+                </a:solidFill>
+                <a:latin typeface="Times New Roman" panose="02020603050405020304" pitchFamily="18" charset="0"/>
+              </a:rPr>
+              <a:t>run</a:t>
+            </a:r>
+            <a:r>
+              <a:rPr lang="en-US" dirty="0">
+                <a:solidFill>
+                  <a:schemeClr val="accent1"/>
+                </a:solidFill>
+                <a:latin typeface="Times New Roman" panose="02020603050405020304" pitchFamily="18" charset="0"/>
+              </a:rPr>
+              <a:t> the program </a:t>
+            </a:r>
+            <a:r>
+              <a:rPr lang="en-US" dirty="0">
+                <a:solidFill>
+                  <a:schemeClr val="accent3"/>
+                </a:solidFill>
+                <a:latin typeface="Times New Roman" panose="02020603050405020304" pitchFamily="18" charset="0"/>
+              </a:rPr>
+              <a:t>as you wish</a:t>
+            </a:r>
+            <a:r>
+              <a:rPr lang="en-US" dirty="0">
+                <a:solidFill>
+                  <a:schemeClr val="accent1"/>
+                </a:solidFill>
+                <a:latin typeface="Times New Roman" panose="02020603050405020304" pitchFamily="18" charset="0"/>
+              </a:rPr>
+              <a:t>, for </a:t>
+            </a:r>
+            <a:r>
+              <a:rPr lang="en-US" dirty="0">
+                <a:solidFill>
+                  <a:schemeClr val="accent3"/>
+                </a:solidFill>
+                <a:latin typeface="Times New Roman" panose="02020603050405020304" pitchFamily="18" charset="0"/>
+              </a:rPr>
+              <a:t>any purpose</a:t>
+            </a:r>
+            <a:r>
+              <a:rPr lang="en-US" dirty="0" smtClean="0">
+                <a:solidFill>
+                  <a:schemeClr val="accent1"/>
+                </a:solidFill>
+                <a:latin typeface="Times New Roman" panose="02020603050405020304" pitchFamily="18" charset="0"/>
+              </a:rPr>
+              <a:t>.</a:t>
+            </a:r>
+          </a:p>
+          <a:p>
+            <a:pPr marL="742950" lvl="1" indent="-285750">
+              <a:buFont typeface="Arial" panose="020B0604020202020204" pitchFamily="34" charset="0"/>
+              <a:buChar char="•"/>
+            </a:pPr>
+            <a:endParaRPr lang="en-US" dirty="0">
+              <a:solidFill>
+                <a:schemeClr val="accent1"/>
+              </a:solidFill>
+              <a:latin typeface="Times New Roman" panose="02020603050405020304" pitchFamily="18" charset="0"/>
+            </a:endParaRPr>
+          </a:p>
+          <a:p>
+            <a:pPr marL="742950" lvl="1" indent="-285750">
+              <a:buFont typeface="Arial" panose="020B0604020202020204" pitchFamily="34" charset="0"/>
+              <a:buChar char="•"/>
+            </a:pPr>
+            <a:r>
+              <a:rPr lang="en-US" dirty="0">
+                <a:solidFill>
+                  <a:schemeClr val="accent1"/>
+                </a:solidFill>
+                <a:latin typeface="Times New Roman" panose="02020603050405020304" pitchFamily="18" charset="0"/>
+              </a:rPr>
+              <a:t>You have the freedom to </a:t>
+            </a:r>
+            <a:r>
+              <a:rPr lang="en-US" dirty="0">
+                <a:solidFill>
+                  <a:schemeClr val="accent3"/>
+                </a:solidFill>
+                <a:latin typeface="Times New Roman" panose="02020603050405020304" pitchFamily="18" charset="0"/>
+              </a:rPr>
+              <a:t>modify the program</a:t>
+            </a:r>
+            <a:r>
+              <a:rPr lang="en-US" dirty="0">
+                <a:solidFill>
+                  <a:schemeClr val="accent1"/>
+                </a:solidFill>
+                <a:latin typeface="Times New Roman" panose="02020603050405020304" pitchFamily="18" charset="0"/>
+              </a:rPr>
+              <a:t> to suit your needs. </a:t>
+            </a:r>
+            <a:endParaRPr lang="en-US" dirty="0" smtClean="0">
+              <a:solidFill>
+                <a:schemeClr val="accent1"/>
+              </a:solidFill>
+              <a:latin typeface="Times New Roman" panose="02020603050405020304" pitchFamily="18" charset="0"/>
+            </a:endParaRPr>
+          </a:p>
+          <a:p>
+            <a:pPr lvl="1"/>
+            <a:endParaRPr lang="en-US" dirty="0">
+              <a:solidFill>
+                <a:schemeClr val="accent1"/>
+              </a:solidFill>
+              <a:latin typeface="Times New Roman" panose="02020603050405020304" pitchFamily="18" charset="0"/>
+            </a:endParaRPr>
+          </a:p>
+          <a:p>
+            <a:pPr marL="742950" lvl="1" indent="-285750">
+              <a:buFont typeface="Arial" panose="020B0604020202020204" pitchFamily="34" charset="0"/>
+              <a:buChar char="•"/>
+            </a:pPr>
+            <a:r>
+              <a:rPr lang="en-US" dirty="0">
+                <a:solidFill>
+                  <a:schemeClr val="accent1"/>
+                </a:solidFill>
+                <a:latin typeface="Times New Roman" panose="02020603050405020304" pitchFamily="18" charset="0"/>
+              </a:rPr>
+              <a:t>You have the freedom to redistribute copies, either </a:t>
+            </a:r>
+            <a:r>
+              <a:rPr lang="en-US" dirty="0">
+                <a:solidFill>
+                  <a:schemeClr val="accent3"/>
+                </a:solidFill>
+                <a:latin typeface="Times New Roman" panose="02020603050405020304" pitchFamily="18" charset="0"/>
+              </a:rPr>
+              <a:t>gratis</a:t>
+            </a:r>
+            <a:r>
+              <a:rPr lang="en-US" dirty="0">
+                <a:solidFill>
+                  <a:schemeClr val="accent1"/>
+                </a:solidFill>
+                <a:latin typeface="Times New Roman" panose="02020603050405020304" pitchFamily="18" charset="0"/>
+              </a:rPr>
+              <a:t> or </a:t>
+            </a:r>
+            <a:r>
+              <a:rPr lang="en-US" dirty="0">
+                <a:solidFill>
+                  <a:schemeClr val="accent3"/>
+                </a:solidFill>
+                <a:latin typeface="Times New Roman" panose="02020603050405020304" pitchFamily="18" charset="0"/>
+              </a:rPr>
+              <a:t>for a fee</a:t>
+            </a:r>
+            <a:r>
+              <a:rPr lang="en-US" dirty="0" smtClean="0">
+                <a:solidFill>
+                  <a:schemeClr val="accent1"/>
+                </a:solidFill>
+                <a:latin typeface="Times New Roman" panose="02020603050405020304" pitchFamily="18" charset="0"/>
+              </a:rPr>
+              <a:t>.</a:t>
+            </a:r>
+          </a:p>
+          <a:p>
+            <a:pPr marL="742950" lvl="1" indent="-285750">
+              <a:buFont typeface="Arial" panose="020B0604020202020204" pitchFamily="34" charset="0"/>
+              <a:buChar char="•"/>
+            </a:pPr>
+            <a:endParaRPr lang="en-US" dirty="0">
+              <a:solidFill>
+                <a:schemeClr val="accent1"/>
+              </a:solidFill>
+              <a:latin typeface="Times New Roman" panose="02020603050405020304" pitchFamily="18" charset="0"/>
+            </a:endParaRPr>
+          </a:p>
+          <a:p>
+            <a:pPr marL="742950" lvl="1" indent="-285750">
+              <a:buFont typeface="Arial" panose="020B0604020202020204" pitchFamily="34" charset="0"/>
+              <a:buChar char="•"/>
+            </a:pPr>
+            <a:r>
+              <a:rPr lang="en-US" dirty="0">
+                <a:solidFill>
+                  <a:schemeClr val="accent1"/>
+                </a:solidFill>
+                <a:latin typeface="Times New Roman" panose="02020603050405020304" pitchFamily="18" charset="0"/>
+              </a:rPr>
+              <a:t>You have the freedom to </a:t>
+            </a:r>
+            <a:r>
+              <a:rPr lang="en-US" dirty="0">
+                <a:solidFill>
+                  <a:schemeClr val="accent3"/>
+                </a:solidFill>
+                <a:latin typeface="Times New Roman" panose="02020603050405020304" pitchFamily="18" charset="0"/>
+              </a:rPr>
+              <a:t>distribute</a:t>
+            </a:r>
+            <a:r>
+              <a:rPr lang="en-US" dirty="0">
+                <a:solidFill>
+                  <a:schemeClr val="accent1"/>
+                </a:solidFill>
+                <a:latin typeface="Times New Roman" panose="02020603050405020304" pitchFamily="18" charset="0"/>
+              </a:rPr>
+              <a:t> </a:t>
+            </a:r>
+            <a:r>
+              <a:rPr lang="en-US" dirty="0">
+                <a:solidFill>
+                  <a:schemeClr val="accent3"/>
+                </a:solidFill>
+                <a:latin typeface="Times New Roman" panose="02020603050405020304" pitchFamily="18" charset="0"/>
+              </a:rPr>
+              <a:t>modified versions </a:t>
+            </a:r>
+            <a:r>
+              <a:rPr lang="en-US" dirty="0">
+                <a:solidFill>
+                  <a:schemeClr val="accent1"/>
+                </a:solidFill>
+                <a:latin typeface="Times New Roman" panose="02020603050405020304" pitchFamily="18" charset="0"/>
+              </a:rPr>
+              <a:t>of the program, so </a:t>
+            </a:r>
+            <a:r>
+              <a:rPr lang="en-US" dirty="0" smtClean="0">
+                <a:solidFill>
+                  <a:schemeClr val="accent1"/>
+                </a:solidFill>
+                <a:latin typeface="Times New Roman" panose="02020603050405020304" pitchFamily="18" charset="0"/>
+              </a:rPr>
+              <a:t>that </a:t>
+            </a:r>
+            <a:r>
+              <a:rPr lang="en-US" dirty="0">
+                <a:solidFill>
+                  <a:schemeClr val="accent1"/>
+                </a:solidFill>
+                <a:latin typeface="Times New Roman" panose="02020603050405020304" pitchFamily="18" charset="0"/>
+              </a:rPr>
+              <a:t>the community can benefit from your improvements.</a:t>
+            </a:r>
+            <a:endParaRPr lang="en-US" b="0" i="0" dirty="0">
+              <a:solidFill>
+                <a:schemeClr val="accent1"/>
+              </a:solidFill>
+              <a:effectLst/>
+              <a:latin typeface="Times New Roman" panose="02020603050405020304" pitchFamily="18" charset="0"/>
+            </a:endParaRPr>
+          </a:p>
+        </p:txBody>
+      </p:sp>
+    </p:spTree>
+    <p:extLst>
+      <p:ext uri="{BB962C8B-B14F-4D97-AF65-F5344CB8AC3E}">
+        <p14:creationId xmlns:p14="http://schemas.microsoft.com/office/powerpoint/2010/main" val="1981402462"/>
+      </p:ext>
+    </p:extLst>
+  </p:cSld>
+  <p:clrMapOvr>
+    <a:masterClrMapping/>
+  </p:clrMapOvr>
 </p:sld>
 </file>
 

</xml_diff>

<commit_message>
Linux slides added and added some to UNIX slides
</commit_message>
<xml_diff>
--- a/amirkabir_linux_festival.pptx
+++ b/amirkabir_linux_festival.pptx
@@ -5,10 +5,10 @@
     <p:sldMasterId id="2147483648" r:id="rId1"/>
   </p:sldMasterIdLst>
   <p:notesMasterIdLst>
-    <p:notesMasterId r:id="rId14"/>
+    <p:notesMasterId r:id="rId16"/>
   </p:notesMasterIdLst>
   <p:handoutMasterIdLst>
-    <p:handoutMasterId r:id="rId15"/>
+    <p:handoutMasterId r:id="rId17"/>
   </p:handoutMasterIdLst>
   <p:sldIdLst>
     <p:sldId id="256" r:id="rId2"/>
@@ -17,12 +17,14 @@
     <p:sldId id="264" r:id="rId5"/>
     <p:sldId id="258" r:id="rId6"/>
     <p:sldId id="260" r:id="rId7"/>
-    <p:sldId id="261" r:id="rId8"/>
-    <p:sldId id="262" r:id="rId9"/>
-    <p:sldId id="265" r:id="rId10"/>
-    <p:sldId id="263" r:id="rId11"/>
-    <p:sldId id="267" r:id="rId12"/>
-    <p:sldId id="268" r:id="rId13"/>
+    <p:sldId id="271" r:id="rId8"/>
+    <p:sldId id="261" r:id="rId9"/>
+    <p:sldId id="262" r:id="rId10"/>
+    <p:sldId id="265" r:id="rId11"/>
+    <p:sldId id="263" r:id="rId12"/>
+    <p:sldId id="267" r:id="rId13"/>
+    <p:sldId id="268" r:id="rId14"/>
+    <p:sldId id="272" r:id="rId15"/>
   </p:sldIdLst>
   <p:sldSz cx="12192000" cy="6858000"/>
   <p:notesSz cx="6858000" cy="9144000"/>
@@ -3829,313 +3831,45 @@
       </p:grpSpPr>
       <p:sp>
         <p:nvSpPr>
-          <p:cNvPr id="5" name="Rectangle 4"/>
-          <p:cNvSpPr/>
-          <p:nvPr/>
+          <p:cNvPr id="2" name="Title 1"/>
+          <p:cNvSpPr>
+            <a:spLocks noGrp="1"/>
+          </p:cNvSpPr>
+          <p:nvPr>
+            <p:ph type="title"/>
+          </p:nvPr>
         </p:nvSpPr>
         <p:spPr>
           <a:xfrm>
-            <a:off x="457200" y="990600"/>
-            <a:ext cx="10057738" cy="2862322"/>
+            <a:off x="1447800" y="2895600"/>
+            <a:ext cx="9144000" cy="685800"/>
           </a:xfrm>
-          <a:prstGeom prst="rect">
-            <a:avLst/>
-          </a:prstGeom>
         </p:spPr>
         <p:txBody>
-          <a:bodyPr wrap="square">
-            <a:spAutoFit/>
-          </a:bodyPr>
+          <a:bodyPr/>
           <a:lstStyle/>
           <a:p>
+            <a:pPr algn="ctr"/>
+            <a:r>
+              <a:rPr lang="en-US" dirty="0">
+                <a:solidFill>
+                  <a:schemeClr val="accent5"/>
+                </a:solidFill>
+              </a:rPr>
+              <a:t>f</a:t>
+            </a:r>
             <a:r>
               <a:rPr lang="en-US" dirty="0" smtClean="0">
                 <a:solidFill>
-                  <a:schemeClr val="accent6"/>
-                </a:solidFill>
-                <a:latin typeface="Times New Roman" panose="02020603050405020304" pitchFamily="18" charset="0"/>
-              </a:rPr>
-              <a:t>A program is free software, for a particular user, if:</a:t>
-            </a:r>
-          </a:p>
-          <a:p>
-            <a:pPr marL="285750" indent="-285750">
-              <a:buFont typeface="Arial" panose="020B0604020202020204" pitchFamily="34" charset="0"/>
-              <a:buChar char="•"/>
-            </a:pPr>
+                  <a:schemeClr val="accent5"/>
+                </a:solidFill>
+              </a:rPr>
+              <a:t>ree_or_opensource</a:t>
+            </a:r>
             <a:endParaRPr lang="en-US" dirty="0">
               <a:solidFill>
-                <a:schemeClr val="accent1"/>
+                <a:schemeClr val="accent5"/>
               </a:solidFill>
-              <a:latin typeface="Times New Roman" panose="02020603050405020304" pitchFamily="18" charset="0"/>
-            </a:endParaRPr>
-          </a:p>
-          <a:p>
-            <a:pPr marL="742950" lvl="1" indent="-285750">
-              <a:buFont typeface="Arial" panose="020B0604020202020204" pitchFamily="34" charset="0"/>
-              <a:buChar char="•"/>
-            </a:pPr>
-            <a:r>
-              <a:rPr lang="en-US" dirty="0">
-                <a:solidFill>
-                  <a:schemeClr val="accent1"/>
-                </a:solidFill>
-                <a:latin typeface="Times New Roman" panose="02020603050405020304" pitchFamily="18" charset="0"/>
-              </a:rPr>
-              <a:t>You have the freedom to </a:t>
-            </a:r>
-            <a:r>
-              <a:rPr lang="en-US" dirty="0">
-                <a:solidFill>
-                  <a:schemeClr val="accent3"/>
-                </a:solidFill>
-                <a:latin typeface="Times New Roman" panose="02020603050405020304" pitchFamily="18" charset="0"/>
-              </a:rPr>
-              <a:t>run</a:t>
-            </a:r>
-            <a:r>
-              <a:rPr lang="en-US" dirty="0">
-                <a:solidFill>
-                  <a:schemeClr val="accent1"/>
-                </a:solidFill>
-                <a:latin typeface="Times New Roman" panose="02020603050405020304" pitchFamily="18" charset="0"/>
-              </a:rPr>
-              <a:t> the program </a:t>
-            </a:r>
-            <a:r>
-              <a:rPr lang="en-US" dirty="0">
-                <a:solidFill>
-                  <a:schemeClr val="accent3"/>
-                </a:solidFill>
-                <a:latin typeface="Times New Roman" panose="02020603050405020304" pitchFamily="18" charset="0"/>
-              </a:rPr>
-              <a:t>as you wish</a:t>
-            </a:r>
-            <a:r>
-              <a:rPr lang="en-US" dirty="0">
-                <a:solidFill>
-                  <a:schemeClr val="accent1"/>
-                </a:solidFill>
-                <a:latin typeface="Times New Roman" panose="02020603050405020304" pitchFamily="18" charset="0"/>
-              </a:rPr>
-              <a:t>, for </a:t>
-            </a:r>
-            <a:r>
-              <a:rPr lang="en-US" dirty="0">
-                <a:solidFill>
-                  <a:schemeClr val="accent3"/>
-                </a:solidFill>
-                <a:latin typeface="Times New Roman" panose="02020603050405020304" pitchFamily="18" charset="0"/>
-              </a:rPr>
-              <a:t>any purpose</a:t>
-            </a:r>
-            <a:r>
-              <a:rPr lang="en-US" dirty="0" smtClean="0">
-                <a:solidFill>
-                  <a:schemeClr val="accent1"/>
-                </a:solidFill>
-                <a:latin typeface="Times New Roman" panose="02020603050405020304" pitchFamily="18" charset="0"/>
-              </a:rPr>
-              <a:t>.</a:t>
-            </a:r>
-          </a:p>
-          <a:p>
-            <a:pPr marL="742950" lvl="1" indent="-285750">
-              <a:buFont typeface="Arial" panose="020B0604020202020204" pitchFamily="34" charset="0"/>
-              <a:buChar char="•"/>
-            </a:pPr>
-            <a:endParaRPr lang="en-US" dirty="0">
-              <a:solidFill>
-                <a:schemeClr val="accent1"/>
-              </a:solidFill>
-              <a:latin typeface="Times New Roman" panose="02020603050405020304" pitchFamily="18" charset="0"/>
-            </a:endParaRPr>
-          </a:p>
-          <a:p>
-            <a:pPr marL="742950" lvl="1" indent="-285750">
-              <a:buFont typeface="Arial" panose="020B0604020202020204" pitchFamily="34" charset="0"/>
-              <a:buChar char="•"/>
-            </a:pPr>
-            <a:r>
-              <a:rPr lang="en-US" dirty="0">
-                <a:solidFill>
-                  <a:schemeClr val="accent1"/>
-                </a:solidFill>
-                <a:latin typeface="Times New Roman" panose="02020603050405020304" pitchFamily="18" charset="0"/>
-              </a:rPr>
-              <a:t>You have the freedom to </a:t>
-            </a:r>
-            <a:r>
-              <a:rPr lang="en-US" dirty="0">
-                <a:solidFill>
-                  <a:schemeClr val="accent3"/>
-                </a:solidFill>
-                <a:latin typeface="Times New Roman" panose="02020603050405020304" pitchFamily="18" charset="0"/>
-              </a:rPr>
-              <a:t>modify the program</a:t>
-            </a:r>
-            <a:r>
-              <a:rPr lang="en-US" dirty="0">
-                <a:solidFill>
-                  <a:schemeClr val="accent1"/>
-                </a:solidFill>
-                <a:latin typeface="Times New Roman" panose="02020603050405020304" pitchFamily="18" charset="0"/>
-              </a:rPr>
-              <a:t> to suit your needs. </a:t>
-            </a:r>
-            <a:endParaRPr lang="en-US" dirty="0" smtClean="0">
-              <a:solidFill>
-                <a:schemeClr val="accent1"/>
-              </a:solidFill>
-              <a:latin typeface="Times New Roman" panose="02020603050405020304" pitchFamily="18" charset="0"/>
-            </a:endParaRPr>
-          </a:p>
-          <a:p>
-            <a:pPr lvl="1"/>
-            <a:endParaRPr lang="en-US" dirty="0">
-              <a:solidFill>
-                <a:schemeClr val="accent1"/>
-              </a:solidFill>
-              <a:latin typeface="Times New Roman" panose="02020603050405020304" pitchFamily="18" charset="0"/>
-            </a:endParaRPr>
-          </a:p>
-          <a:p>
-            <a:pPr marL="742950" lvl="1" indent="-285750">
-              <a:buFont typeface="Arial" panose="020B0604020202020204" pitchFamily="34" charset="0"/>
-              <a:buChar char="•"/>
-            </a:pPr>
-            <a:r>
-              <a:rPr lang="en-US" dirty="0">
-                <a:solidFill>
-                  <a:schemeClr val="accent1"/>
-                </a:solidFill>
-                <a:latin typeface="Times New Roman" panose="02020603050405020304" pitchFamily="18" charset="0"/>
-              </a:rPr>
-              <a:t>You have the freedom to redistribute copies, either </a:t>
-            </a:r>
-            <a:r>
-              <a:rPr lang="en-US" dirty="0">
-                <a:solidFill>
-                  <a:schemeClr val="accent3"/>
-                </a:solidFill>
-                <a:latin typeface="Times New Roman" panose="02020603050405020304" pitchFamily="18" charset="0"/>
-              </a:rPr>
-              <a:t>gratis</a:t>
-            </a:r>
-            <a:r>
-              <a:rPr lang="en-US" dirty="0">
-                <a:solidFill>
-                  <a:schemeClr val="accent1"/>
-                </a:solidFill>
-                <a:latin typeface="Times New Roman" panose="02020603050405020304" pitchFamily="18" charset="0"/>
-              </a:rPr>
-              <a:t> or </a:t>
-            </a:r>
-            <a:r>
-              <a:rPr lang="en-US" dirty="0">
-                <a:solidFill>
-                  <a:schemeClr val="accent3"/>
-                </a:solidFill>
-                <a:latin typeface="Times New Roman" panose="02020603050405020304" pitchFamily="18" charset="0"/>
-              </a:rPr>
-              <a:t>for a fee</a:t>
-            </a:r>
-            <a:r>
-              <a:rPr lang="en-US" dirty="0" smtClean="0">
-                <a:solidFill>
-                  <a:schemeClr val="accent1"/>
-                </a:solidFill>
-                <a:latin typeface="Times New Roman" panose="02020603050405020304" pitchFamily="18" charset="0"/>
-              </a:rPr>
-              <a:t>.</a:t>
-            </a:r>
-          </a:p>
-          <a:p>
-            <a:pPr marL="742950" lvl="1" indent="-285750">
-              <a:buFont typeface="Arial" panose="020B0604020202020204" pitchFamily="34" charset="0"/>
-              <a:buChar char="•"/>
-            </a:pPr>
-            <a:endParaRPr lang="en-US" dirty="0">
-              <a:solidFill>
-                <a:schemeClr val="accent1"/>
-              </a:solidFill>
-              <a:latin typeface="Times New Roman" panose="02020603050405020304" pitchFamily="18" charset="0"/>
-            </a:endParaRPr>
-          </a:p>
-          <a:p>
-            <a:pPr marL="742950" lvl="1" indent="-285750">
-              <a:buFont typeface="Arial" panose="020B0604020202020204" pitchFamily="34" charset="0"/>
-              <a:buChar char="•"/>
-            </a:pPr>
-            <a:r>
-              <a:rPr lang="en-US" dirty="0">
-                <a:solidFill>
-                  <a:schemeClr val="accent1"/>
-                </a:solidFill>
-                <a:latin typeface="Times New Roman" panose="02020603050405020304" pitchFamily="18" charset="0"/>
-              </a:rPr>
-              <a:t>You have the freedom to </a:t>
-            </a:r>
-            <a:r>
-              <a:rPr lang="en-US" dirty="0">
-                <a:solidFill>
-                  <a:schemeClr val="accent3"/>
-                </a:solidFill>
-                <a:latin typeface="Times New Roman" panose="02020603050405020304" pitchFamily="18" charset="0"/>
-              </a:rPr>
-              <a:t>distribute</a:t>
-            </a:r>
-            <a:r>
-              <a:rPr lang="en-US" dirty="0">
-                <a:solidFill>
-                  <a:schemeClr val="accent1"/>
-                </a:solidFill>
-                <a:latin typeface="Times New Roman" panose="02020603050405020304" pitchFamily="18" charset="0"/>
-              </a:rPr>
-              <a:t> </a:t>
-            </a:r>
-            <a:r>
-              <a:rPr lang="en-US" dirty="0">
-                <a:solidFill>
-                  <a:schemeClr val="accent3"/>
-                </a:solidFill>
-                <a:latin typeface="Times New Roman" panose="02020603050405020304" pitchFamily="18" charset="0"/>
-              </a:rPr>
-              <a:t>modified versions </a:t>
-            </a:r>
-            <a:r>
-              <a:rPr lang="en-US" dirty="0">
-                <a:solidFill>
-                  <a:schemeClr val="accent1"/>
-                </a:solidFill>
-                <a:latin typeface="Times New Roman" panose="02020603050405020304" pitchFamily="18" charset="0"/>
-              </a:rPr>
-              <a:t>of the program, so </a:t>
-            </a:r>
-            <a:r>
-              <a:rPr lang="en-US" dirty="0" smtClean="0">
-                <a:solidFill>
-                  <a:schemeClr val="accent1"/>
-                </a:solidFill>
-                <a:latin typeface="Times New Roman" panose="02020603050405020304" pitchFamily="18" charset="0"/>
-              </a:rPr>
-              <a:t>that </a:t>
-            </a:r>
-            <a:r>
-              <a:rPr lang="en-US" dirty="0">
-                <a:solidFill>
-                  <a:schemeClr val="accent1"/>
-                </a:solidFill>
-                <a:latin typeface="Times New Roman" panose="02020603050405020304" pitchFamily="18" charset="0"/>
-              </a:rPr>
-              <a:t>the community can benefit from your improvements.</a:t>
-            </a:r>
-            <a:endParaRPr lang="en-US" b="0" i="0" dirty="0">
-              <a:solidFill>
-                <a:schemeClr val="accent1"/>
-              </a:solidFill>
-              <a:effectLst/>
-              <a:latin typeface="Times New Roman" panose="02020603050405020304" pitchFamily="18" charset="0"/>
             </a:endParaRPr>
           </a:p>
         </p:txBody>
@@ -4143,13 +3877,20 @@
     </p:spTree>
     <p:extLst>
       <p:ext uri="{BB962C8B-B14F-4D97-AF65-F5344CB8AC3E}">
-        <p14:creationId xmlns:p14="http://schemas.microsoft.com/office/powerpoint/2010/main" val="1981402462"/>
+        <p14:creationId xmlns:p14="http://schemas.microsoft.com/office/powerpoint/2010/main" val="3971442849"/>
       </p:ext>
     </p:extLst>
   </p:cSld>
   <p:clrMapOvr>
     <a:masterClrMapping/>
   </p:clrMapOvr>
+  <p:timing>
+    <p:tnLst>
+      <p:par>
+        <p:cTn id="1" dur="indefinite" restart="never" nodeType="tmRoot"/>
+      </p:par>
+    </p:tnLst>
+  </p:timing>
 </p:sld>
 </file>
 
@@ -4172,6 +3913,349 @@
       </p:grpSpPr>
       <p:sp>
         <p:nvSpPr>
+          <p:cNvPr id="5" name="Rectangle 4"/>
+          <p:cNvSpPr/>
+          <p:nvPr/>
+        </p:nvSpPr>
+        <p:spPr>
+          <a:xfrm>
+            <a:off x="457200" y="990600"/>
+            <a:ext cx="10057738" cy="2862322"/>
+          </a:xfrm>
+          <a:prstGeom prst="rect">
+            <a:avLst/>
+          </a:prstGeom>
+        </p:spPr>
+        <p:txBody>
+          <a:bodyPr wrap="square">
+            <a:spAutoFit/>
+          </a:bodyPr>
+          <a:lstStyle/>
+          <a:p>
+            <a:r>
+              <a:rPr lang="en-US" dirty="0" smtClean="0">
+                <a:solidFill>
+                  <a:schemeClr val="accent6"/>
+                </a:solidFill>
+                <a:latin typeface="Times New Roman" panose="02020603050405020304" pitchFamily="18" charset="0"/>
+              </a:rPr>
+              <a:t>A program is free software, for a particular user, if:</a:t>
+            </a:r>
+          </a:p>
+          <a:p>
+            <a:pPr marL="285750" indent="-285750">
+              <a:buFont typeface="Arial" panose="020B0604020202020204" pitchFamily="34" charset="0"/>
+              <a:buChar char="•"/>
+            </a:pPr>
+            <a:endParaRPr lang="en-US" dirty="0">
+              <a:solidFill>
+                <a:schemeClr val="accent1"/>
+              </a:solidFill>
+              <a:latin typeface="Times New Roman" panose="02020603050405020304" pitchFamily="18" charset="0"/>
+            </a:endParaRPr>
+          </a:p>
+          <a:p>
+            <a:pPr marL="742950" lvl="1" indent="-285750">
+              <a:buFont typeface="Arial" panose="020B0604020202020204" pitchFamily="34" charset="0"/>
+              <a:buChar char="•"/>
+            </a:pPr>
+            <a:r>
+              <a:rPr lang="en-US" dirty="0">
+                <a:solidFill>
+                  <a:schemeClr val="accent1"/>
+                </a:solidFill>
+                <a:latin typeface="Times New Roman" panose="02020603050405020304" pitchFamily="18" charset="0"/>
+              </a:rPr>
+              <a:t>You have the freedom to </a:t>
+            </a:r>
+            <a:r>
+              <a:rPr lang="en-US" dirty="0">
+                <a:solidFill>
+                  <a:schemeClr val="accent3"/>
+                </a:solidFill>
+                <a:latin typeface="Times New Roman" panose="02020603050405020304" pitchFamily="18" charset="0"/>
+              </a:rPr>
+              <a:t>run</a:t>
+            </a:r>
+            <a:r>
+              <a:rPr lang="en-US" dirty="0">
+                <a:solidFill>
+                  <a:schemeClr val="accent1"/>
+                </a:solidFill>
+                <a:latin typeface="Times New Roman" panose="02020603050405020304" pitchFamily="18" charset="0"/>
+              </a:rPr>
+              <a:t> the program </a:t>
+            </a:r>
+            <a:r>
+              <a:rPr lang="en-US" dirty="0">
+                <a:solidFill>
+                  <a:schemeClr val="accent3"/>
+                </a:solidFill>
+                <a:latin typeface="Times New Roman" panose="02020603050405020304" pitchFamily="18" charset="0"/>
+              </a:rPr>
+              <a:t>as you wish</a:t>
+            </a:r>
+            <a:r>
+              <a:rPr lang="en-US" dirty="0">
+                <a:solidFill>
+                  <a:schemeClr val="accent1"/>
+                </a:solidFill>
+                <a:latin typeface="Times New Roman" panose="02020603050405020304" pitchFamily="18" charset="0"/>
+              </a:rPr>
+              <a:t>, for </a:t>
+            </a:r>
+            <a:r>
+              <a:rPr lang="en-US" dirty="0">
+                <a:solidFill>
+                  <a:schemeClr val="accent3"/>
+                </a:solidFill>
+                <a:latin typeface="Times New Roman" panose="02020603050405020304" pitchFamily="18" charset="0"/>
+              </a:rPr>
+              <a:t>any purpose</a:t>
+            </a:r>
+            <a:r>
+              <a:rPr lang="en-US" dirty="0" smtClean="0">
+                <a:solidFill>
+                  <a:schemeClr val="accent1"/>
+                </a:solidFill>
+                <a:latin typeface="Times New Roman" panose="02020603050405020304" pitchFamily="18" charset="0"/>
+              </a:rPr>
+              <a:t>.</a:t>
+            </a:r>
+          </a:p>
+          <a:p>
+            <a:pPr marL="742950" lvl="1" indent="-285750">
+              <a:buFont typeface="Arial" panose="020B0604020202020204" pitchFamily="34" charset="0"/>
+              <a:buChar char="•"/>
+            </a:pPr>
+            <a:endParaRPr lang="en-US" dirty="0">
+              <a:solidFill>
+                <a:schemeClr val="accent1"/>
+              </a:solidFill>
+              <a:latin typeface="Times New Roman" panose="02020603050405020304" pitchFamily="18" charset="0"/>
+            </a:endParaRPr>
+          </a:p>
+          <a:p>
+            <a:pPr marL="742950" lvl="1" indent="-285750">
+              <a:buFont typeface="Arial" panose="020B0604020202020204" pitchFamily="34" charset="0"/>
+              <a:buChar char="•"/>
+            </a:pPr>
+            <a:r>
+              <a:rPr lang="en-US" dirty="0">
+                <a:solidFill>
+                  <a:schemeClr val="accent1"/>
+                </a:solidFill>
+                <a:latin typeface="Times New Roman" panose="02020603050405020304" pitchFamily="18" charset="0"/>
+              </a:rPr>
+              <a:t>You have the freedom to </a:t>
+            </a:r>
+            <a:r>
+              <a:rPr lang="en-US" dirty="0">
+                <a:solidFill>
+                  <a:schemeClr val="accent3"/>
+                </a:solidFill>
+                <a:latin typeface="Times New Roman" panose="02020603050405020304" pitchFamily="18" charset="0"/>
+              </a:rPr>
+              <a:t>modify the program</a:t>
+            </a:r>
+            <a:r>
+              <a:rPr lang="en-US" dirty="0">
+                <a:solidFill>
+                  <a:schemeClr val="accent1"/>
+                </a:solidFill>
+                <a:latin typeface="Times New Roman" panose="02020603050405020304" pitchFamily="18" charset="0"/>
+              </a:rPr>
+              <a:t> to suit your needs. </a:t>
+            </a:r>
+            <a:endParaRPr lang="en-US" dirty="0" smtClean="0">
+              <a:solidFill>
+                <a:schemeClr val="accent1"/>
+              </a:solidFill>
+              <a:latin typeface="Times New Roman" panose="02020603050405020304" pitchFamily="18" charset="0"/>
+            </a:endParaRPr>
+          </a:p>
+          <a:p>
+            <a:pPr lvl="1"/>
+            <a:endParaRPr lang="en-US" dirty="0">
+              <a:solidFill>
+                <a:schemeClr val="accent1"/>
+              </a:solidFill>
+              <a:latin typeface="Times New Roman" panose="02020603050405020304" pitchFamily="18" charset="0"/>
+            </a:endParaRPr>
+          </a:p>
+          <a:p>
+            <a:pPr marL="742950" lvl="1" indent="-285750">
+              <a:buFont typeface="Arial" panose="020B0604020202020204" pitchFamily="34" charset="0"/>
+              <a:buChar char="•"/>
+            </a:pPr>
+            <a:r>
+              <a:rPr lang="en-US" dirty="0">
+                <a:solidFill>
+                  <a:schemeClr val="accent1"/>
+                </a:solidFill>
+                <a:latin typeface="Times New Roman" panose="02020603050405020304" pitchFamily="18" charset="0"/>
+              </a:rPr>
+              <a:t>You have the freedom to redistribute copies, either </a:t>
+            </a:r>
+            <a:r>
+              <a:rPr lang="en-US" dirty="0">
+                <a:solidFill>
+                  <a:schemeClr val="accent3"/>
+                </a:solidFill>
+                <a:latin typeface="Times New Roman" panose="02020603050405020304" pitchFamily="18" charset="0"/>
+              </a:rPr>
+              <a:t>gratis</a:t>
+            </a:r>
+            <a:r>
+              <a:rPr lang="en-US" dirty="0">
+                <a:solidFill>
+                  <a:schemeClr val="accent1"/>
+                </a:solidFill>
+                <a:latin typeface="Times New Roman" panose="02020603050405020304" pitchFamily="18" charset="0"/>
+              </a:rPr>
+              <a:t> or </a:t>
+            </a:r>
+            <a:r>
+              <a:rPr lang="en-US" dirty="0">
+                <a:solidFill>
+                  <a:schemeClr val="accent3"/>
+                </a:solidFill>
+                <a:latin typeface="Times New Roman" panose="02020603050405020304" pitchFamily="18" charset="0"/>
+              </a:rPr>
+              <a:t>for a fee</a:t>
+            </a:r>
+            <a:r>
+              <a:rPr lang="en-US" dirty="0" smtClean="0">
+                <a:solidFill>
+                  <a:schemeClr val="accent1"/>
+                </a:solidFill>
+                <a:latin typeface="Times New Roman" panose="02020603050405020304" pitchFamily="18" charset="0"/>
+              </a:rPr>
+              <a:t>.</a:t>
+            </a:r>
+          </a:p>
+          <a:p>
+            <a:pPr marL="742950" lvl="1" indent="-285750">
+              <a:buFont typeface="Arial" panose="020B0604020202020204" pitchFamily="34" charset="0"/>
+              <a:buChar char="•"/>
+            </a:pPr>
+            <a:endParaRPr lang="en-US" dirty="0">
+              <a:solidFill>
+                <a:schemeClr val="accent1"/>
+              </a:solidFill>
+              <a:latin typeface="Times New Roman" panose="02020603050405020304" pitchFamily="18" charset="0"/>
+            </a:endParaRPr>
+          </a:p>
+          <a:p>
+            <a:pPr marL="742950" lvl="1" indent="-285750">
+              <a:buFont typeface="Arial" panose="020B0604020202020204" pitchFamily="34" charset="0"/>
+              <a:buChar char="•"/>
+            </a:pPr>
+            <a:r>
+              <a:rPr lang="en-US" dirty="0">
+                <a:solidFill>
+                  <a:schemeClr val="accent1"/>
+                </a:solidFill>
+                <a:latin typeface="Times New Roman" panose="02020603050405020304" pitchFamily="18" charset="0"/>
+              </a:rPr>
+              <a:t>You have the freedom to </a:t>
+            </a:r>
+            <a:r>
+              <a:rPr lang="en-US" dirty="0">
+                <a:solidFill>
+                  <a:schemeClr val="accent3"/>
+                </a:solidFill>
+                <a:latin typeface="Times New Roman" panose="02020603050405020304" pitchFamily="18" charset="0"/>
+              </a:rPr>
+              <a:t>distribute</a:t>
+            </a:r>
+            <a:r>
+              <a:rPr lang="en-US" dirty="0">
+                <a:solidFill>
+                  <a:schemeClr val="accent1"/>
+                </a:solidFill>
+                <a:latin typeface="Times New Roman" panose="02020603050405020304" pitchFamily="18" charset="0"/>
+              </a:rPr>
+              <a:t> </a:t>
+            </a:r>
+            <a:r>
+              <a:rPr lang="en-US" dirty="0">
+                <a:solidFill>
+                  <a:schemeClr val="accent3"/>
+                </a:solidFill>
+                <a:latin typeface="Times New Roman" panose="02020603050405020304" pitchFamily="18" charset="0"/>
+              </a:rPr>
+              <a:t>modified versions </a:t>
+            </a:r>
+            <a:r>
+              <a:rPr lang="en-US" dirty="0">
+                <a:solidFill>
+                  <a:schemeClr val="accent1"/>
+                </a:solidFill>
+                <a:latin typeface="Times New Roman" panose="02020603050405020304" pitchFamily="18" charset="0"/>
+              </a:rPr>
+              <a:t>of the program, so </a:t>
+            </a:r>
+            <a:r>
+              <a:rPr lang="en-US" dirty="0" smtClean="0">
+                <a:solidFill>
+                  <a:schemeClr val="accent1"/>
+                </a:solidFill>
+                <a:latin typeface="Times New Roman" panose="02020603050405020304" pitchFamily="18" charset="0"/>
+              </a:rPr>
+              <a:t>that </a:t>
+            </a:r>
+            <a:r>
+              <a:rPr lang="en-US" dirty="0">
+                <a:solidFill>
+                  <a:schemeClr val="accent1"/>
+                </a:solidFill>
+                <a:latin typeface="Times New Roman" panose="02020603050405020304" pitchFamily="18" charset="0"/>
+              </a:rPr>
+              <a:t>the community can benefit from your improvements.</a:t>
+            </a:r>
+            <a:endParaRPr lang="en-US" b="0" i="0" dirty="0">
+              <a:solidFill>
+                <a:schemeClr val="accent1"/>
+              </a:solidFill>
+              <a:effectLst/>
+              <a:latin typeface="Times New Roman" panose="02020603050405020304" pitchFamily="18" charset="0"/>
+            </a:endParaRPr>
+          </a:p>
+        </p:txBody>
+      </p:sp>
+    </p:spTree>
+    <p:extLst>
+      <p:ext uri="{BB962C8B-B14F-4D97-AF65-F5344CB8AC3E}">
+        <p14:creationId xmlns:p14="http://schemas.microsoft.com/office/powerpoint/2010/main" val="1981402462"/>
+      </p:ext>
+    </p:extLst>
+  </p:cSld>
+  <p:clrMapOvr>
+    <a:masterClrMapping/>
+  </p:clrMapOvr>
+</p:sld>
+</file>
+
+<file path=ppt/slides/slide12.xml><?xml version="1.0" encoding="utf-8"?>
+<p:sld xmlns:a="http://schemas.openxmlformats.org/drawingml/2006/main" xmlns:r="http://schemas.openxmlformats.org/officeDocument/2006/relationships" xmlns:p="http://schemas.openxmlformats.org/presentationml/2006/main">
+  <p:cSld>
+    <p:spTree>
+      <p:nvGrpSpPr>
+        <p:cNvPr id="1" name=""/>
+        <p:cNvGrpSpPr/>
+        <p:nvPr/>
+      </p:nvGrpSpPr>
+      <p:grpSpPr>
+        <a:xfrm>
+          <a:off x="0" y="0"/>
+          <a:ext cx="0" cy="0"/>
+          <a:chOff x="0" y="0"/>
+          <a:chExt cx="0" cy="0"/>
+        </a:xfrm>
+      </p:grpSpPr>
+      <p:sp>
+        <p:nvSpPr>
           <p:cNvPr id="6" name="TextBox 5"/>
           <p:cNvSpPr txBox="1"/>
           <p:nvPr/>
@@ -4871,7 +4955,7 @@
 </p:sld>
 </file>
 
-<file path=ppt/slides/slide12.xml><?xml version="1.0" encoding="utf-8"?>
+<file path=ppt/slides/slide13.xml><?xml version="1.0" encoding="utf-8"?>
 <p:sld xmlns:a="http://schemas.openxmlformats.org/drawingml/2006/main" xmlns:r="http://schemas.openxmlformats.org/officeDocument/2006/relationships" xmlns:p="http://schemas.openxmlformats.org/presentationml/2006/main">
   <p:cSld>
     <p:spTree>
@@ -5260,6 +5344,74 @@
 </p:sld>
 </file>
 
+<file path=ppt/slides/slide14.xml><?xml version="1.0" encoding="utf-8"?>
+<p:sld xmlns:a="http://schemas.openxmlformats.org/drawingml/2006/main" xmlns:r="http://schemas.openxmlformats.org/officeDocument/2006/relationships" xmlns:p="http://schemas.openxmlformats.org/presentationml/2006/main">
+  <p:cSld>
+    <p:spTree>
+      <p:nvGrpSpPr>
+        <p:cNvPr id="1" name=""/>
+        <p:cNvGrpSpPr/>
+        <p:nvPr/>
+      </p:nvGrpSpPr>
+      <p:grpSpPr>
+        <a:xfrm>
+          <a:off x="0" y="0"/>
+          <a:ext cx="0" cy="0"/>
+          <a:chOff x="0" y="0"/>
+          <a:chExt cx="0" cy="0"/>
+        </a:xfrm>
+      </p:grpSpPr>
+      <p:sp>
+        <p:nvSpPr>
+          <p:cNvPr id="2" name="Title 1"/>
+          <p:cNvSpPr>
+            <a:spLocks noGrp="1"/>
+          </p:cNvSpPr>
+          <p:nvPr>
+            <p:ph type="title"/>
+          </p:nvPr>
+        </p:nvSpPr>
+        <p:spPr/>
+        <p:txBody>
+          <a:bodyPr/>
+          <a:lstStyle/>
+          <a:p>
+            <a:endParaRPr lang="en-US"/>
+          </a:p>
+        </p:txBody>
+      </p:sp>
+      <p:sp>
+        <p:nvSpPr>
+          <p:cNvPr id="3" name="Text Placeholder 2"/>
+          <p:cNvSpPr>
+            <a:spLocks noGrp="1"/>
+          </p:cNvSpPr>
+          <p:nvPr>
+            <p:ph type="body" idx="1"/>
+          </p:nvPr>
+        </p:nvSpPr>
+        <p:spPr/>
+        <p:txBody>
+          <a:bodyPr/>
+          <a:lstStyle/>
+          <a:p>
+            <a:endParaRPr lang="en-US"/>
+          </a:p>
+        </p:txBody>
+      </p:sp>
+    </p:spTree>
+    <p:extLst>
+      <p:ext uri="{BB962C8B-B14F-4D97-AF65-F5344CB8AC3E}">
+        <p14:creationId xmlns:p14="http://schemas.microsoft.com/office/powerpoint/2010/main" val="3930088505"/>
+      </p:ext>
+    </p:extLst>
+  </p:cSld>
+  <p:clrMapOvr>
+    <a:masterClrMapping/>
+  </p:clrMapOvr>
+</p:sld>
+</file>
+
 <file path=ppt/slides/slide2.xml><?xml version="1.0" encoding="utf-8"?>
 <p:sld xmlns:a="http://schemas.openxmlformats.org/drawingml/2006/main" xmlns:r="http://schemas.openxmlformats.org/officeDocument/2006/relationships" xmlns:p="http://schemas.openxmlformats.org/presentationml/2006/main">
   <p:cSld>
@@ -6051,11 +6203,47 @@
             </a:pPr>
             <a:r>
               <a:rPr lang="en-US" dirty="0"/>
-              <a:t>By 1970, Bell Labs had withdrawn from </a:t>
+              <a:t>By 1970, </a:t>
+            </a:r>
+            <a:r>
+              <a:rPr lang="en-US" dirty="0">
+                <a:solidFill>
+                  <a:schemeClr val="accent3"/>
+                </a:solidFill>
+              </a:rPr>
+              <a:t>Bell Labs </a:t>
+            </a:r>
+            <a:r>
+              <a:rPr lang="en-US" dirty="0"/>
+              <a:t>had </a:t>
+            </a:r>
+            <a:r>
+              <a:rPr lang="en-US" dirty="0">
+                <a:solidFill>
+                  <a:schemeClr val="accent3"/>
+                </a:solidFill>
+              </a:rPr>
+              <a:t>withdrawn</a:t>
+            </a:r>
+            <a:r>
+              <a:rPr lang="en-US" dirty="0"/>
+              <a:t> from </a:t>
             </a:r>
             <a:r>
               <a:rPr lang="en-US" dirty="0" smtClean="0"/>
-              <a:t>the Multics project.</a:t>
+              <a:t>the </a:t>
+            </a:r>
+            <a:r>
+              <a:rPr lang="en-US" dirty="0" smtClean="0">
+                <a:solidFill>
+                  <a:schemeClr val="accent3"/>
+                </a:solidFill>
+              </a:rPr>
+              <a:t>Multics</a:t>
+            </a:r>
+            <a:r>
+              <a:rPr lang="en-US" dirty="0" smtClean="0"/>
+              <a:t> project.</a:t>
             </a:r>
           </a:p>
           <a:p>
@@ -6152,20 +6340,132 @@
             <a:r>
               <a:rPr lang="en-US" dirty="0">
                 <a:solidFill>
-                  <a:schemeClr val="accent1"/>
-                </a:solidFill>
-              </a:rPr>
-              <a:t>Ken Thompson:</a:t>
-            </a:r>
-          </a:p>
-          <a:p>
-            <a:r>
-              <a:rPr lang="en-US" dirty="0">
-                <a:solidFill>
-                  <a:schemeClr val="accent1"/>
-                </a:solidFill>
-              </a:rPr>
-              <a:t>	“I did the first of two or three versions of UNIX all alone. And Dennis 	became an evangelist. Then there was a rewrite in a higher-level 	language that would come to be called C. He worked mostly on the 	language and on the I/O system, and I worked on all the rest of the 	operating system. That was for the </a:t>
+                  <a:schemeClr val="accent2"/>
+                </a:solidFill>
+              </a:rPr>
+              <a:t>Ken Thompson</a:t>
+            </a:r>
+            <a:r>
+              <a:rPr lang="en-US" dirty="0">
+                <a:solidFill>
+                  <a:schemeClr val="accent1"/>
+                </a:solidFill>
+              </a:rPr>
+              <a:t>:</a:t>
+            </a:r>
+          </a:p>
+          <a:p>
+            <a:r>
+              <a:rPr lang="en-US" dirty="0" smtClean="0">
+                <a:solidFill>
+                  <a:schemeClr val="accent1"/>
+                </a:solidFill>
+              </a:rPr>
+              <a:t>	“</a:t>
+            </a:r>
+            <a:r>
+              <a:rPr lang="en-US" dirty="0">
+                <a:solidFill>
+                  <a:schemeClr val="accent1"/>
+                </a:solidFill>
+              </a:rPr>
+              <a:t>I did the first of two or three versions of UNIX all alone. And Dennis 	became an evangelist. Then there was a rewrite in a </a:t>
+            </a:r>
+            <a:r>
+              <a:rPr lang="en-US" dirty="0">
+                <a:solidFill>
+                  <a:schemeClr val="accent3"/>
+                </a:solidFill>
+              </a:rPr>
+              <a:t>higher-level 	language</a:t>
+            </a:r>
+            <a:r>
+              <a:rPr lang="en-US" dirty="0">
+                <a:solidFill>
+                  <a:schemeClr val="accent1"/>
+                </a:solidFill>
+              </a:rPr>
+              <a:t> that would come to be called </a:t>
+            </a:r>
+            <a:r>
+              <a:rPr lang="en-US" dirty="0">
+                <a:solidFill>
+                  <a:schemeClr val="accent3"/>
+                </a:solidFill>
+              </a:rPr>
+              <a:t>C</a:t>
+            </a:r>
+            <a:r>
+              <a:rPr lang="en-US" dirty="0">
+                <a:solidFill>
+                  <a:schemeClr val="accent1"/>
+                </a:solidFill>
+              </a:rPr>
+              <a:t>. He worked mostly on the 	</a:t>
+            </a:r>
+            <a:r>
+              <a:rPr lang="en-US" dirty="0">
+                <a:solidFill>
+                  <a:schemeClr val="accent3"/>
+                </a:solidFill>
+              </a:rPr>
+              <a:t>language</a:t>
+            </a:r>
+            <a:r>
+              <a:rPr lang="en-US" dirty="0">
+                <a:solidFill>
+                  <a:schemeClr val="accent1"/>
+                </a:solidFill>
+              </a:rPr>
+              <a:t> and on the </a:t>
+            </a:r>
+            <a:r>
+              <a:rPr lang="en-US" dirty="0">
+                <a:solidFill>
+                  <a:schemeClr val="accent3"/>
+                </a:solidFill>
+              </a:rPr>
+              <a:t>I/O system</a:t>
+            </a:r>
+            <a:r>
+              <a:rPr lang="en-US" dirty="0">
+                <a:solidFill>
+                  <a:schemeClr val="accent1"/>
+                </a:solidFill>
+              </a:rPr>
+              <a:t>, and I worked on all the </a:t>
+            </a:r>
+            <a:r>
+              <a:rPr lang="en-US" dirty="0">
+                <a:solidFill>
+                  <a:schemeClr val="accent3"/>
+                </a:solidFill>
+              </a:rPr>
+              <a:t>rest</a:t>
+            </a:r>
+            <a:r>
+              <a:rPr lang="en-US" dirty="0">
+                <a:solidFill>
+                  <a:schemeClr val="accent1"/>
+                </a:solidFill>
+              </a:rPr>
+              <a:t> </a:t>
+            </a:r>
+            <a:r>
+              <a:rPr lang="en-US" dirty="0">
+                <a:solidFill>
+                  <a:schemeClr val="accent3"/>
+                </a:solidFill>
+              </a:rPr>
+              <a:t>of the 	operating system</a:t>
+            </a:r>
+            <a:r>
+              <a:rPr lang="en-US" dirty="0">
+                <a:solidFill>
+                  <a:schemeClr val="accent1"/>
+                </a:solidFill>
+              </a:rPr>
+              <a:t>. That was for the </a:t>
             </a:r>
             <a:r>
               <a:rPr lang="en-US" dirty="0" smtClean="0">
@@ -6250,6 +6550,447 @@
 </file>
 
 <file path=ppt/slides/slide7.xml><?xml version="1.0" encoding="utf-8"?>
+<p:sld xmlns:a="http://schemas.openxmlformats.org/drawingml/2006/main" xmlns:r="http://schemas.openxmlformats.org/officeDocument/2006/relationships" xmlns:p="http://schemas.openxmlformats.org/presentationml/2006/main">
+  <p:cSld>
+    <p:spTree>
+      <p:nvGrpSpPr>
+        <p:cNvPr id="1" name=""/>
+        <p:cNvGrpSpPr/>
+        <p:nvPr/>
+      </p:nvGrpSpPr>
+      <p:grpSpPr>
+        <a:xfrm>
+          <a:off x="0" y="0"/>
+          <a:ext cx="0" cy="0"/>
+          <a:chOff x="0" y="0"/>
+          <a:chExt cx="0" cy="0"/>
+        </a:xfrm>
+      </p:grpSpPr>
+      <p:sp>
+        <p:nvSpPr>
+          <p:cNvPr id="4" name="Rectangle 3"/>
+          <p:cNvSpPr/>
+          <p:nvPr/>
+        </p:nvSpPr>
+        <p:spPr>
+          <a:xfrm>
+            <a:off x="533400" y="381000"/>
+            <a:ext cx="11353800" cy="2862322"/>
+          </a:xfrm>
+          <a:prstGeom prst="rect">
+            <a:avLst/>
+          </a:prstGeom>
+        </p:spPr>
+        <p:txBody>
+          <a:bodyPr wrap="square">
+            <a:spAutoFit/>
+          </a:bodyPr>
+          <a:lstStyle/>
+          <a:p>
+            <a:endParaRPr lang="en-US" dirty="0">
+              <a:solidFill>
+                <a:schemeClr val="accent1"/>
+              </a:solidFill>
+            </a:endParaRPr>
+          </a:p>
+          <a:p>
+            <a:pPr marL="285750" indent="-285750">
+              <a:buFont typeface="Arial" panose="020B0604020202020204" pitchFamily="34" charset="0"/>
+              <a:buChar char="•"/>
+            </a:pPr>
+            <a:r>
+              <a:rPr lang="en-US" dirty="0">
+                <a:solidFill>
+                  <a:schemeClr val="accent1"/>
+                </a:solidFill>
+              </a:rPr>
+              <a:t>Written in the </a:t>
+            </a:r>
+            <a:r>
+              <a:rPr lang="en-US" dirty="0">
+                <a:solidFill>
+                  <a:schemeClr val="accent3"/>
+                </a:solidFill>
+              </a:rPr>
+              <a:t>C</a:t>
+            </a:r>
+            <a:r>
+              <a:rPr lang="en-US" dirty="0">
+                <a:solidFill>
+                  <a:schemeClr val="accent1"/>
+                </a:solidFill>
+              </a:rPr>
+              <a:t> </a:t>
+            </a:r>
+            <a:r>
+              <a:rPr lang="en-US" dirty="0">
+                <a:solidFill>
+                  <a:schemeClr val="accent3"/>
+                </a:solidFill>
+              </a:rPr>
+              <a:t>programming language </a:t>
+            </a:r>
+            <a:r>
+              <a:rPr lang="en-US" dirty="0">
+                <a:solidFill>
+                  <a:schemeClr val="accent1"/>
+                </a:solidFill>
+              </a:rPr>
+              <a:t>instead of in </a:t>
+            </a:r>
+            <a:r>
+              <a:rPr lang="en-US" dirty="0">
+                <a:solidFill>
+                  <a:schemeClr val="accent3"/>
+                </a:solidFill>
+              </a:rPr>
+              <a:t>assembly </a:t>
+            </a:r>
+            <a:r>
+              <a:rPr lang="en-US" dirty="0">
+                <a:solidFill>
+                  <a:schemeClr val="accent1"/>
+                </a:solidFill>
+              </a:rPr>
+              <a:t>code</a:t>
+            </a:r>
+            <a:r>
+              <a:rPr lang="en-US" dirty="0" smtClean="0">
+                <a:solidFill>
+                  <a:schemeClr val="accent1"/>
+                </a:solidFill>
+              </a:rPr>
+              <a:t>.</a:t>
+            </a:r>
+          </a:p>
+          <a:p>
+            <a:pPr marL="285750" indent="-285750">
+              <a:buFont typeface="Arial" panose="020B0604020202020204" pitchFamily="34" charset="0"/>
+              <a:buChar char="•"/>
+            </a:pPr>
+            <a:endParaRPr lang="en-US" dirty="0">
+              <a:solidFill>
+                <a:schemeClr val="accent1"/>
+              </a:solidFill>
+            </a:endParaRPr>
+          </a:p>
+          <a:p>
+            <a:pPr marL="285750" indent="-285750">
+              <a:buFont typeface="Arial" panose="020B0604020202020204" pitchFamily="34" charset="0"/>
+              <a:buChar char="•"/>
+            </a:pPr>
+            <a:r>
+              <a:rPr lang="en-US" dirty="0">
+                <a:solidFill>
+                  <a:schemeClr val="accent3"/>
+                </a:solidFill>
+              </a:rPr>
+              <a:t>Simple</a:t>
+            </a:r>
+            <a:r>
+              <a:rPr lang="en-US" dirty="0">
+                <a:solidFill>
+                  <a:schemeClr val="accent1"/>
+                </a:solidFill>
+              </a:rPr>
+              <a:t> and </a:t>
+            </a:r>
+            <a:r>
+              <a:rPr lang="en-US" dirty="0">
+                <a:solidFill>
+                  <a:schemeClr val="accent3"/>
+                </a:solidFill>
+              </a:rPr>
+              <a:t>elegant</a:t>
+            </a:r>
+            <a:r>
+              <a:rPr lang="en-US" dirty="0" smtClean="0">
+                <a:solidFill>
+                  <a:schemeClr val="accent1"/>
+                </a:solidFill>
+              </a:rPr>
+              <a:t>.</a:t>
+            </a:r>
+          </a:p>
+          <a:p>
+            <a:pPr marL="285750" indent="-285750">
+              <a:buFont typeface="Arial" panose="020B0604020202020204" pitchFamily="34" charset="0"/>
+              <a:buChar char="•"/>
+            </a:pPr>
+            <a:endParaRPr lang="en-US" dirty="0">
+              <a:solidFill>
+                <a:schemeClr val="accent1"/>
+              </a:solidFill>
+            </a:endParaRPr>
+          </a:p>
+          <a:p>
+            <a:pPr marL="285750" indent="-285750">
+              <a:buFont typeface="Arial" panose="020B0604020202020204" pitchFamily="34" charset="0"/>
+              <a:buChar char="•"/>
+            </a:pPr>
+            <a:r>
+              <a:rPr lang="en-US" dirty="0">
+                <a:solidFill>
+                  <a:schemeClr val="accent1"/>
+                </a:solidFill>
+              </a:rPr>
+              <a:t>Able to </a:t>
+            </a:r>
+            <a:r>
+              <a:rPr lang="en-US" dirty="0">
+                <a:solidFill>
+                  <a:schemeClr val="accent3"/>
+                </a:solidFill>
+              </a:rPr>
+              <a:t>recycle code</a:t>
+            </a:r>
+            <a:r>
+              <a:rPr lang="en-US" dirty="0" smtClean="0">
+                <a:solidFill>
+                  <a:schemeClr val="accent1"/>
+                </a:solidFill>
+              </a:rPr>
+              <a:t>.</a:t>
+            </a:r>
+          </a:p>
+          <a:p>
+            <a:pPr marL="285750" indent="-285750">
+              <a:buFont typeface="Arial" panose="020B0604020202020204" pitchFamily="34" charset="0"/>
+              <a:buChar char="•"/>
+            </a:pPr>
+            <a:endParaRPr lang="en-US" dirty="0">
+              <a:solidFill>
+                <a:schemeClr val="accent1"/>
+              </a:solidFill>
+            </a:endParaRPr>
+          </a:p>
+          <a:p>
+            <a:pPr marL="285750" indent="-285750">
+              <a:buFont typeface="Arial" panose="020B0604020202020204" pitchFamily="34" charset="0"/>
+              <a:buChar char="•"/>
+            </a:pPr>
+            <a:r>
+              <a:rPr lang="en-US" dirty="0">
+                <a:solidFill>
+                  <a:schemeClr val="accent1"/>
+                </a:solidFill>
+              </a:rPr>
+              <a:t>UNIX on the other hand needed only a </a:t>
+            </a:r>
+            <a:r>
+              <a:rPr lang="en-US" dirty="0" smtClean="0">
+                <a:solidFill>
+                  <a:schemeClr val="accent3"/>
+                </a:solidFill>
+              </a:rPr>
+              <a:t>small piece </a:t>
+            </a:r>
+            <a:r>
+              <a:rPr lang="en-US" dirty="0">
+                <a:solidFill>
+                  <a:schemeClr val="accent1"/>
+                </a:solidFill>
+              </a:rPr>
+              <a:t>of that special code, which is now </a:t>
+            </a:r>
+            <a:r>
+              <a:rPr lang="en-US" dirty="0">
+                <a:solidFill>
+                  <a:schemeClr val="accent3"/>
+                </a:solidFill>
+              </a:rPr>
+              <a:t>commonly named </a:t>
+            </a:r>
+            <a:r>
+              <a:rPr lang="en-US" dirty="0">
+                <a:solidFill>
+                  <a:schemeClr val="accent1"/>
+                </a:solidFill>
+              </a:rPr>
+              <a:t>the </a:t>
+            </a:r>
+            <a:r>
+              <a:rPr lang="en-US" dirty="0">
+                <a:solidFill>
+                  <a:schemeClr val="accent3"/>
+                </a:solidFill>
+              </a:rPr>
+              <a:t>kernel</a:t>
+            </a:r>
+          </a:p>
+          <a:p>
+            <a:r>
+              <a:rPr lang="en-US" dirty="0" smtClean="0">
+                <a:solidFill>
+                  <a:schemeClr val="accent1"/>
+                </a:solidFill>
+              </a:rPr>
+              <a:t> </a:t>
+            </a:r>
+            <a:endParaRPr lang="en-US" dirty="0">
+              <a:solidFill>
+                <a:schemeClr val="accent1"/>
+              </a:solidFill>
+            </a:endParaRPr>
+          </a:p>
+        </p:txBody>
+      </p:sp>
+      <p:sp>
+        <p:nvSpPr>
+          <p:cNvPr id="5" name="Rectangle 4"/>
+          <p:cNvSpPr/>
+          <p:nvPr/>
+        </p:nvSpPr>
+        <p:spPr>
+          <a:xfrm>
+            <a:off x="555928" y="3124200"/>
+            <a:ext cx="10721671" cy="369332"/>
+          </a:xfrm>
+          <a:prstGeom prst="rect">
+            <a:avLst/>
+          </a:prstGeom>
+        </p:spPr>
+        <p:txBody>
+          <a:bodyPr wrap="square">
+            <a:spAutoFit/>
+          </a:bodyPr>
+          <a:lstStyle/>
+          <a:p>
+            <a:pPr marL="285750" indent="-285750">
+              <a:buFont typeface="Arial" panose="020B0604020202020204" pitchFamily="34" charset="0"/>
+              <a:buChar char="•"/>
+            </a:pPr>
+            <a:r>
+              <a:rPr lang="en-US" dirty="0">
+                <a:solidFill>
+                  <a:schemeClr val="accent1"/>
+                </a:solidFill>
+                <a:latin typeface="NimbusRomNo9L"/>
+              </a:rPr>
+              <a:t>software vendors were quick to adapt, </a:t>
+            </a:r>
+            <a:r>
+              <a:rPr lang="en-US" dirty="0" smtClean="0">
+                <a:solidFill>
+                  <a:schemeClr val="accent1"/>
+                </a:solidFill>
+              </a:rPr>
+              <a:t>since </a:t>
+            </a:r>
+            <a:r>
+              <a:rPr lang="en-US" dirty="0">
+                <a:solidFill>
+                  <a:schemeClr val="accent1"/>
+                </a:solidFill>
+              </a:rPr>
+              <a:t>they could </a:t>
+            </a:r>
+            <a:r>
+              <a:rPr lang="en-US" dirty="0">
+                <a:solidFill>
+                  <a:schemeClr val="accent3"/>
+                </a:solidFill>
+              </a:rPr>
+              <a:t>sell ten times more software </a:t>
+            </a:r>
+            <a:r>
+              <a:rPr lang="en-US" dirty="0">
+                <a:solidFill>
+                  <a:schemeClr val="accent1"/>
+                </a:solidFill>
+              </a:rPr>
+              <a:t>almost </a:t>
+            </a:r>
+            <a:r>
+              <a:rPr lang="en-US" dirty="0" smtClean="0">
+                <a:solidFill>
+                  <a:schemeClr val="accent1"/>
+                </a:solidFill>
+              </a:rPr>
+              <a:t>effortlessly</a:t>
+            </a:r>
+          </a:p>
+        </p:txBody>
+      </p:sp>
+      <p:sp>
+        <p:nvSpPr>
+          <p:cNvPr id="6" name="Rectangle 5"/>
+          <p:cNvSpPr/>
+          <p:nvPr/>
+        </p:nvSpPr>
+        <p:spPr>
+          <a:xfrm>
+            <a:off x="547977" y="3886200"/>
+            <a:ext cx="10515600" cy="369332"/>
+          </a:xfrm>
+          <a:prstGeom prst="rect">
+            <a:avLst/>
+          </a:prstGeom>
+        </p:spPr>
+        <p:txBody>
+          <a:bodyPr wrap="square">
+            <a:spAutoFit/>
+          </a:bodyPr>
+          <a:lstStyle/>
+          <a:p>
+            <a:pPr marL="285750" indent="-285750">
+              <a:buFont typeface="Arial" panose="020B0604020202020204" pitchFamily="34" charset="0"/>
+              <a:buChar char="•"/>
+            </a:pPr>
+            <a:r>
+              <a:rPr lang="en-US" dirty="0">
+                <a:solidFill>
+                  <a:schemeClr val="accent1"/>
+                </a:solidFill>
+              </a:rPr>
+              <a:t> users working on different systems without the </a:t>
+            </a:r>
+            <a:r>
+              <a:rPr lang="en-US" dirty="0">
+                <a:solidFill>
+                  <a:schemeClr val="accent3"/>
+                </a:solidFill>
+              </a:rPr>
+              <a:t>need for </a:t>
+            </a:r>
+            <a:r>
+              <a:rPr lang="en-US" dirty="0" smtClean="0">
+                <a:solidFill>
+                  <a:schemeClr val="accent3"/>
+                </a:solidFill>
+              </a:rPr>
+              <a:t>extra education </a:t>
+            </a:r>
+            <a:r>
+              <a:rPr lang="en-US" dirty="0">
+                <a:solidFill>
+                  <a:schemeClr val="accent1"/>
+                </a:solidFill>
+              </a:rPr>
+              <a:t>to use another computer</a:t>
+            </a:r>
+            <a:endParaRPr lang="en-US" dirty="0">
+              <a:solidFill>
+                <a:schemeClr val="accent1"/>
+              </a:solidFill>
+            </a:endParaRPr>
+          </a:p>
+        </p:txBody>
+      </p:sp>
+    </p:spTree>
+    <p:extLst>
+      <p:ext uri="{BB962C8B-B14F-4D97-AF65-F5344CB8AC3E}">
+        <p14:creationId xmlns:p14="http://schemas.microsoft.com/office/powerpoint/2010/main" val="3626804957"/>
+      </p:ext>
+    </p:extLst>
+  </p:cSld>
+  <p:clrMapOvr>
+    <a:masterClrMapping/>
+  </p:clrMapOvr>
+</p:sld>
+</file>
+
+<file path=ppt/slides/slide8.xml><?xml version="1.0" encoding="utf-8"?>
 <p:sld xmlns:a="http://schemas.openxmlformats.org/drawingml/2006/main" xmlns:r="http://schemas.openxmlformats.org/officeDocument/2006/relationships" xmlns:p="http://schemas.openxmlformats.org/presentationml/2006/main">
   <p:cSld>
     <p:spTree>
@@ -6556,7 +7297,7 @@
 </p:sld>
 </file>
 
-<file path=ppt/slides/slide8.xml><?xml version="1.0" encoding="utf-8"?>
+<file path=ppt/slides/slide9.xml><?xml version="1.0" encoding="utf-8"?>
 <p:sld xmlns:a="http://schemas.openxmlformats.org/drawingml/2006/main" xmlns:r="http://schemas.openxmlformats.org/officeDocument/2006/relationships" xmlns:p="http://schemas.openxmlformats.org/presentationml/2006/main">
   <p:cSld>
     <p:spTree>
@@ -7131,88 +7872,6 @@
             </p:seq>
           </p:childTnLst>
         </p:cTn>
-      </p:par>
-    </p:tnLst>
-  </p:timing>
-</p:sld>
-</file>
-
-<file path=ppt/slides/slide9.xml><?xml version="1.0" encoding="utf-8"?>
-<p:sld xmlns:a="http://schemas.openxmlformats.org/drawingml/2006/main" xmlns:r="http://schemas.openxmlformats.org/officeDocument/2006/relationships" xmlns:p="http://schemas.openxmlformats.org/presentationml/2006/main">
-  <p:cSld>
-    <p:spTree>
-      <p:nvGrpSpPr>
-        <p:cNvPr id="1" name=""/>
-        <p:cNvGrpSpPr/>
-        <p:nvPr/>
-      </p:nvGrpSpPr>
-      <p:grpSpPr>
-        <a:xfrm>
-          <a:off x="0" y="0"/>
-          <a:ext cx="0" cy="0"/>
-          <a:chOff x="0" y="0"/>
-          <a:chExt cx="0" cy="0"/>
-        </a:xfrm>
-      </p:grpSpPr>
-      <p:sp>
-        <p:nvSpPr>
-          <p:cNvPr id="2" name="Title 1"/>
-          <p:cNvSpPr>
-            <a:spLocks noGrp="1"/>
-          </p:cNvSpPr>
-          <p:nvPr>
-            <p:ph type="title"/>
-          </p:nvPr>
-        </p:nvSpPr>
-        <p:spPr>
-          <a:xfrm>
-            <a:off x="1447800" y="2895600"/>
-            <a:ext cx="9144000" cy="685800"/>
-          </a:xfrm>
-        </p:spPr>
-        <p:txBody>
-          <a:bodyPr/>
-          <a:lstStyle/>
-          <a:p>
-            <a:pPr algn="ctr"/>
-            <a:r>
-              <a:rPr lang="en-US" dirty="0">
-                <a:solidFill>
-                  <a:schemeClr val="accent5"/>
-                </a:solidFill>
-              </a:rPr>
-              <a:t>f</a:t>
-            </a:r>
-            <a:r>
-              <a:rPr lang="en-US" dirty="0" smtClean="0">
-                <a:solidFill>
-                  <a:schemeClr val="accent5"/>
-                </a:solidFill>
-              </a:rPr>
-              <a:t>ree_or_opensource</a:t>
-            </a:r>
-            <a:endParaRPr lang="en-US" dirty="0">
-              <a:solidFill>
-                <a:schemeClr val="accent5"/>
-              </a:solidFill>
-            </a:endParaRPr>
-          </a:p>
-        </p:txBody>
-      </p:sp>
-    </p:spTree>
-    <p:extLst>
-      <p:ext uri="{BB962C8B-B14F-4D97-AF65-F5344CB8AC3E}">
-        <p14:creationId xmlns:p14="http://schemas.microsoft.com/office/powerpoint/2010/main" val="3971442849"/>
-      </p:ext>
-    </p:extLst>
-  </p:cSld>
-  <p:clrMapOvr>
-    <a:masterClrMapping/>
-  </p:clrMapOvr>
-  <p:timing>
-    <p:tnLst>
-      <p:par>
-        <p:cTn id="1" dur="indefinite" restart="never" nodeType="tmRoot"/>
       </p:par>
     </p:tnLst>
   </p:timing>

</xml_diff>

<commit_message>
completion of the last commit
</commit_message>
<xml_diff>
--- a/amirkabir_linux_festival.pptx
+++ b/amirkabir_linux_festival.pptx
@@ -5,10 +5,10 @@
     <p:sldMasterId id="2147483648" r:id="rId1"/>
   </p:sldMasterIdLst>
   <p:notesMasterIdLst>
-    <p:notesMasterId r:id="rId16"/>
+    <p:notesMasterId r:id="rId18"/>
   </p:notesMasterIdLst>
   <p:handoutMasterIdLst>
-    <p:handoutMasterId r:id="rId17"/>
+    <p:handoutMasterId r:id="rId19"/>
   </p:handoutMasterIdLst>
   <p:sldIdLst>
     <p:sldId id="256" r:id="rId2"/>
@@ -24,7 +24,9 @@
     <p:sldId id="263" r:id="rId12"/>
     <p:sldId id="267" r:id="rId13"/>
     <p:sldId id="268" r:id="rId14"/>
-    <p:sldId id="272" r:id="rId15"/>
+    <p:sldId id="273" r:id="rId15"/>
+    <p:sldId id="272" r:id="rId16"/>
+    <p:sldId id="274" r:id="rId17"/>
   </p:sldIdLst>
   <p:sldSz cx="12192000" cy="6858000"/>
   <p:notesSz cx="6858000" cy="9144000"/>
@@ -5371,18 +5373,581 @@
             <p:ph type="title"/>
           </p:nvPr>
         </p:nvSpPr>
-        <p:spPr/>
-        <p:txBody>
-          <a:bodyPr/>
+        <p:spPr>
+          <a:xfrm>
+            <a:off x="533400" y="838200"/>
+            <a:ext cx="4495800" cy="457200"/>
+          </a:xfrm>
+        </p:spPr>
+        <p:txBody>
+          <a:bodyPr>
+            <a:normAutofit fontScale="90000"/>
+          </a:bodyPr>
           <a:lstStyle/>
           <a:p>
+            <a:r>
+              <a:rPr lang="en-US" sz="2800" dirty="0" smtClean="0"/>
+              <a:t>linux:</a:t>
+            </a:r>
+            <a:endParaRPr lang="en-US" sz="2800" dirty="0"/>
+          </a:p>
+        </p:txBody>
+      </p:sp>
+      <p:sp>
+        <p:nvSpPr>
+          <p:cNvPr id="10" name="Rectangle 9"/>
+          <p:cNvSpPr/>
+          <p:nvPr/>
+        </p:nvSpPr>
+        <p:spPr>
+          <a:xfrm>
+            <a:off x="9982200" y="533400"/>
+            <a:ext cx="1295400" cy="1066800"/>
+          </a:xfrm>
+          <a:prstGeom prst="rect">
+            <a:avLst/>
+          </a:prstGeom>
+          <a:solidFill>
+            <a:schemeClr val="tx1"/>
+          </a:solidFill>
+          <a:ln>
+            <a:solidFill>
+              <a:schemeClr val="tx1"/>
+            </a:solidFill>
+          </a:ln>
+        </p:spPr>
+        <p:style>
+          <a:lnRef idx="2">
+            <a:schemeClr val="accent1">
+              <a:shade val="50000"/>
+            </a:schemeClr>
+          </a:lnRef>
+          <a:fillRef idx="1">
+            <a:schemeClr val="accent1"/>
+          </a:fillRef>
+          <a:effectRef idx="0">
+            <a:schemeClr val="accent1"/>
+          </a:effectRef>
+          <a:fontRef idx="minor">
+            <a:schemeClr val="lt1"/>
+          </a:fontRef>
+        </p:style>
+        <p:txBody>
+          <a:bodyPr rtlCol="0" anchor="ctr"/>
+          <a:lstStyle/>
+          <a:p>
+            <a:pPr algn="ctr"/>
             <a:endParaRPr lang="en-US"/>
           </a:p>
         </p:txBody>
       </p:sp>
-      <p:sp>
-        <p:nvSpPr>
-          <p:cNvPr id="3" name="Text Placeholder 2"/>
+      <p:pic>
+        <p:nvPicPr>
+          <p:cNvPr id="9" name="Picture 8"/>
+          <p:cNvPicPr>
+            <a:picLocks noChangeAspect="1"/>
+          </p:cNvPicPr>
+          <p:nvPr/>
+        </p:nvPicPr>
+        <p:blipFill>
+          <a:blip r:embed="rId2">
+            <a:extLst>
+              <a:ext uri="{28A0092B-C50C-407E-A947-70E740481C1C}">
+                <a14:useLocalDpi xmlns:a14="http://schemas.microsoft.com/office/drawing/2010/main" val="0"/>
+              </a:ext>
+            </a:extLst>
+          </a:blip>
+          <a:stretch>
+            <a:fillRect/>
+          </a:stretch>
+        </p:blipFill>
+        <p:spPr>
+          <a:xfrm>
+            <a:off x="9982200" y="533400"/>
+            <a:ext cx="1295567" cy="1114425"/>
+          </a:xfrm>
+          <a:prstGeom prst="rect">
+            <a:avLst/>
+          </a:prstGeom>
+        </p:spPr>
+      </p:pic>
+      <p:sp>
+        <p:nvSpPr>
+          <p:cNvPr id="18" name="Rectangle 17"/>
+          <p:cNvSpPr/>
+          <p:nvPr/>
+        </p:nvSpPr>
+        <p:spPr>
+          <a:xfrm>
+            <a:off x="533400" y="2177534"/>
+            <a:ext cx="9525000" cy="369332"/>
+          </a:xfrm>
+          <a:prstGeom prst="rect">
+            <a:avLst/>
+          </a:prstGeom>
+        </p:spPr>
+        <p:txBody>
+          <a:bodyPr wrap="square">
+            <a:spAutoFit/>
+          </a:bodyPr>
+          <a:lstStyle/>
+          <a:p>
+            <a:pPr marL="285750" indent="-285750">
+              <a:buFont typeface="Arial" panose="020B0604020202020204" pitchFamily="34" charset="0"/>
+              <a:buChar char="•"/>
+            </a:pPr>
+            <a:r>
+              <a:rPr lang="en-US" dirty="0" smtClean="0">
+                <a:solidFill>
+                  <a:schemeClr val="accent1"/>
+                </a:solidFill>
+              </a:rPr>
+              <a:t>By the beginning of the 90s home </a:t>
+            </a:r>
+            <a:r>
+              <a:rPr lang="en-US" dirty="0" smtClean="0">
+                <a:solidFill>
+                  <a:schemeClr val="accent3"/>
+                </a:solidFill>
+              </a:rPr>
+              <a:t>PCs</a:t>
+            </a:r>
+            <a:r>
+              <a:rPr lang="en-US" dirty="0" smtClean="0">
+                <a:solidFill>
+                  <a:schemeClr val="accent1"/>
+                </a:solidFill>
+              </a:rPr>
+              <a:t> were finally </a:t>
+            </a:r>
+            <a:r>
+              <a:rPr lang="en-US" dirty="0" smtClean="0">
+                <a:solidFill>
+                  <a:schemeClr val="accent3"/>
+                </a:solidFill>
+              </a:rPr>
+              <a:t>powerful enough </a:t>
+            </a:r>
+            <a:r>
+              <a:rPr lang="en-US" dirty="0" smtClean="0">
+                <a:solidFill>
+                  <a:schemeClr val="accent1"/>
+                </a:solidFill>
+              </a:rPr>
+              <a:t>to </a:t>
+            </a:r>
+            <a:r>
+              <a:rPr lang="en-US" dirty="0" smtClean="0">
+                <a:solidFill>
+                  <a:schemeClr val="accent3"/>
+                </a:solidFill>
+              </a:rPr>
+              <a:t>run a full blown UNIX</a:t>
+            </a:r>
+            <a:r>
+              <a:rPr lang="en-US" dirty="0" smtClean="0">
+                <a:solidFill>
+                  <a:schemeClr val="accent1"/>
+                </a:solidFill>
+              </a:rPr>
+              <a:t>. </a:t>
+            </a:r>
+            <a:endParaRPr lang="en-US" dirty="0">
+              <a:solidFill>
+                <a:schemeClr val="accent1"/>
+              </a:solidFill>
+            </a:endParaRPr>
+          </a:p>
+        </p:txBody>
+      </p:sp>
+      <p:sp>
+        <p:nvSpPr>
+          <p:cNvPr id="20" name="Rectangle 19"/>
+          <p:cNvSpPr/>
+          <p:nvPr/>
+        </p:nvSpPr>
+        <p:spPr>
+          <a:xfrm>
+            <a:off x="533400" y="2977965"/>
+            <a:ext cx="9067800" cy="1477328"/>
+          </a:xfrm>
+          <a:prstGeom prst="rect">
+            <a:avLst/>
+          </a:prstGeom>
+        </p:spPr>
+        <p:txBody>
+          <a:bodyPr wrap="square">
+            <a:spAutoFit/>
+          </a:bodyPr>
+          <a:lstStyle/>
+          <a:p>
+            <a:pPr marL="285750" indent="-285750">
+              <a:buFont typeface="Arial" panose="020B0604020202020204" pitchFamily="34" charset="0"/>
+              <a:buChar char="•"/>
+            </a:pPr>
+            <a:r>
+              <a:rPr lang="en-US" dirty="0">
+                <a:solidFill>
+                  <a:schemeClr val="accent1"/>
+                </a:solidFill>
+                <a:latin typeface="Arial" panose="020B0604020202020204" pitchFamily="34" charset="0"/>
+              </a:rPr>
+              <a:t>In 1991, while attending the University of </a:t>
+            </a:r>
+            <a:r>
+              <a:rPr lang="en-US" dirty="0" smtClean="0">
+                <a:solidFill>
+                  <a:schemeClr val="accent1"/>
+                </a:solidFill>
+                <a:latin typeface="Arial" panose="020B0604020202020204" pitchFamily="34" charset="0"/>
+              </a:rPr>
+              <a:t>Helsinki, </a:t>
+            </a:r>
+            <a:r>
+              <a:rPr lang="en-US" dirty="0">
+                <a:solidFill>
+                  <a:schemeClr val="accent1"/>
+                </a:solidFill>
+                <a:latin typeface="Arial" panose="020B0604020202020204" pitchFamily="34" charset="0"/>
+              </a:rPr>
+              <a:t>Torvalds became curious about operating systems</a:t>
+            </a:r>
+            <a:r>
+              <a:rPr lang="en-US" dirty="0" smtClean="0">
+                <a:solidFill>
+                  <a:schemeClr val="accent1"/>
+                </a:solidFill>
+                <a:latin typeface="Arial" panose="020B0604020202020204" pitchFamily="34" charset="0"/>
+              </a:rPr>
+              <a:t>.</a:t>
+            </a:r>
+            <a:r>
+              <a:rPr lang="en-US" dirty="0">
+                <a:solidFill>
+                  <a:schemeClr val="accent1"/>
+                </a:solidFill>
+                <a:latin typeface="Arial" panose="020B0604020202020204" pitchFamily="34" charset="0"/>
+              </a:rPr>
+              <a:t> </a:t>
+            </a:r>
+            <a:r>
+              <a:rPr lang="en-US" dirty="0">
+                <a:solidFill>
+                  <a:schemeClr val="accent3"/>
+                </a:solidFill>
+                <a:latin typeface="Arial" panose="020B0604020202020204" pitchFamily="34" charset="0"/>
+              </a:rPr>
+              <a:t>Frustrated by the licensing of MINIX</a:t>
+            </a:r>
+            <a:r>
+              <a:rPr lang="en-US" dirty="0">
+                <a:solidFill>
+                  <a:schemeClr val="accent1"/>
+                </a:solidFill>
+                <a:latin typeface="Arial" panose="020B0604020202020204" pitchFamily="34" charset="0"/>
+              </a:rPr>
+              <a:t>, which at the time limited it to </a:t>
+            </a:r>
+            <a:r>
+              <a:rPr lang="en-US" dirty="0">
+                <a:solidFill>
+                  <a:schemeClr val="accent3"/>
+                </a:solidFill>
+                <a:latin typeface="Arial" panose="020B0604020202020204" pitchFamily="34" charset="0"/>
+              </a:rPr>
+              <a:t>educational use </a:t>
+            </a:r>
+            <a:r>
+              <a:rPr lang="en-US" dirty="0" smtClean="0">
+                <a:solidFill>
+                  <a:schemeClr val="accent3"/>
+                </a:solidFill>
+                <a:latin typeface="Arial" panose="020B0604020202020204" pitchFamily="34" charset="0"/>
+              </a:rPr>
+              <a:t>only</a:t>
+            </a:r>
+            <a:r>
+              <a:rPr lang="en-US" dirty="0" smtClean="0">
+                <a:solidFill>
+                  <a:schemeClr val="accent1"/>
+                </a:solidFill>
+                <a:latin typeface="Arial" panose="020B0604020202020204" pitchFamily="34" charset="0"/>
+              </a:rPr>
+              <a:t>. He</a:t>
+            </a:r>
+            <a:r>
+              <a:rPr lang="fa-IR" dirty="0" smtClean="0">
+                <a:solidFill>
+                  <a:schemeClr val="accent1"/>
+                </a:solidFill>
+                <a:latin typeface="Arial" panose="020B0604020202020204" pitchFamily="34" charset="0"/>
+              </a:rPr>
+              <a:t> </a:t>
+            </a:r>
+            <a:r>
+              <a:rPr lang="en-US" dirty="0">
+                <a:solidFill>
+                  <a:schemeClr val="accent1"/>
+                </a:solidFill>
+              </a:rPr>
+              <a:t>thought it would be a good idea to have some sort of </a:t>
+            </a:r>
+            <a:r>
+              <a:rPr lang="en-US" dirty="0">
+                <a:solidFill>
+                  <a:schemeClr val="accent3"/>
+                </a:solidFill>
+              </a:rPr>
+              <a:t>freely </a:t>
+            </a:r>
+            <a:r>
+              <a:rPr lang="en-US" dirty="0">
+                <a:solidFill>
+                  <a:schemeClr val="accent1"/>
+                </a:solidFill>
+              </a:rPr>
+              <a:t>available academic </a:t>
+            </a:r>
+            <a:r>
+              <a:rPr lang="en-US" dirty="0">
+                <a:solidFill>
+                  <a:schemeClr val="accent3"/>
+                </a:solidFill>
+              </a:rPr>
+              <a:t>version of UNIX </a:t>
+            </a:r>
+            <a:r>
+              <a:rPr lang="en-US" dirty="0" smtClean="0">
+                <a:solidFill>
+                  <a:schemeClr val="accent3"/>
+                </a:solidFill>
+              </a:rPr>
+              <a:t> </a:t>
+            </a:r>
+            <a:r>
+              <a:rPr lang="en-US" dirty="0" smtClean="0">
+                <a:solidFill>
+                  <a:schemeClr val="accent1"/>
+                </a:solidFill>
+              </a:rPr>
+              <a:t>so</a:t>
+            </a:r>
+            <a:r>
+              <a:rPr lang="en-US" dirty="0">
+                <a:solidFill>
+                  <a:schemeClr val="accent1"/>
+                </a:solidFill>
+                <a:latin typeface="Arial" panose="020B0604020202020204" pitchFamily="34" charset="0"/>
+              </a:rPr>
+              <a:t> he began to work on his own </a:t>
+            </a:r>
+            <a:r>
+              <a:rPr lang="en-US" dirty="0">
+                <a:solidFill>
+                  <a:schemeClr val="accent3"/>
+                </a:solidFill>
+                <a:latin typeface="Arial" panose="020B0604020202020204" pitchFamily="34" charset="0"/>
+              </a:rPr>
+              <a:t>operating system kernel</a:t>
+            </a:r>
+            <a:r>
+              <a:rPr lang="en-US" dirty="0">
+                <a:solidFill>
+                  <a:schemeClr val="accent1"/>
+                </a:solidFill>
+                <a:latin typeface="Arial" panose="020B0604020202020204" pitchFamily="34" charset="0"/>
+              </a:rPr>
+              <a:t>, which eventually became the Linux </a:t>
+            </a:r>
+            <a:r>
+              <a:rPr lang="en-US" dirty="0" smtClean="0">
+                <a:solidFill>
+                  <a:schemeClr val="accent1"/>
+                </a:solidFill>
+                <a:latin typeface="Arial" panose="020B0604020202020204" pitchFamily="34" charset="0"/>
+              </a:rPr>
+              <a:t>kernel.</a:t>
+            </a:r>
+            <a:endParaRPr lang="en-US" dirty="0">
+              <a:solidFill>
+                <a:schemeClr val="accent1"/>
+              </a:solidFill>
+            </a:endParaRPr>
+          </a:p>
+        </p:txBody>
+      </p:sp>
+      <p:sp>
+        <p:nvSpPr>
+          <p:cNvPr id="21" name="Rectangle 20"/>
+          <p:cNvSpPr/>
+          <p:nvPr/>
+        </p:nvSpPr>
+        <p:spPr>
+          <a:xfrm>
+            <a:off x="533400" y="4867839"/>
+            <a:ext cx="9372600" cy="646331"/>
+          </a:xfrm>
+          <a:prstGeom prst="rect">
+            <a:avLst/>
+          </a:prstGeom>
+        </p:spPr>
+        <p:txBody>
+          <a:bodyPr wrap="square">
+            <a:spAutoFit/>
+          </a:bodyPr>
+          <a:lstStyle/>
+          <a:p>
+            <a:pPr marL="285750" indent="-285750">
+              <a:buFont typeface="Arial" panose="020B0604020202020204" pitchFamily="34" charset="0"/>
+              <a:buChar char="•"/>
+            </a:pPr>
+            <a:r>
+              <a:rPr lang="en-US" dirty="0">
+                <a:solidFill>
+                  <a:schemeClr val="accent1"/>
+                </a:solidFill>
+                <a:latin typeface="Arial" panose="020B0604020202020204" pitchFamily="34" charset="0"/>
+              </a:rPr>
+              <a:t>Torvalds began the </a:t>
+            </a:r>
+            <a:r>
+              <a:rPr lang="en-US" dirty="0">
+                <a:solidFill>
+                  <a:schemeClr val="accent3"/>
+                </a:solidFill>
+                <a:latin typeface="Arial" panose="020B0604020202020204" pitchFamily="34" charset="0"/>
+              </a:rPr>
+              <a:t>development</a:t>
+            </a:r>
+            <a:r>
+              <a:rPr lang="en-US" dirty="0">
+                <a:solidFill>
+                  <a:schemeClr val="accent1"/>
+                </a:solidFill>
+                <a:latin typeface="Arial" panose="020B0604020202020204" pitchFamily="34" charset="0"/>
+              </a:rPr>
+              <a:t> of the Linux kernel on </a:t>
+            </a:r>
+            <a:r>
+              <a:rPr lang="en-US" dirty="0">
+                <a:solidFill>
+                  <a:schemeClr val="accent3"/>
+                </a:solidFill>
+                <a:latin typeface="Arial" panose="020B0604020202020204" pitchFamily="34" charset="0"/>
+              </a:rPr>
+              <a:t>MINIX</a:t>
+            </a:r>
+            <a:r>
+              <a:rPr lang="en-US" dirty="0">
+                <a:solidFill>
+                  <a:schemeClr val="accent1"/>
+                </a:solidFill>
+                <a:latin typeface="Arial" panose="020B0604020202020204" pitchFamily="34" charset="0"/>
+              </a:rPr>
+              <a:t> and </a:t>
+            </a:r>
+            <a:r>
+              <a:rPr lang="en-US" dirty="0">
+                <a:solidFill>
+                  <a:schemeClr val="accent3"/>
+                </a:solidFill>
+                <a:latin typeface="Arial" panose="020B0604020202020204" pitchFamily="34" charset="0"/>
+              </a:rPr>
+              <a:t>applications</a:t>
+            </a:r>
+            <a:r>
+              <a:rPr lang="en-US" dirty="0">
+                <a:solidFill>
+                  <a:schemeClr val="accent1"/>
+                </a:solidFill>
+                <a:latin typeface="Arial" panose="020B0604020202020204" pitchFamily="34" charset="0"/>
+              </a:rPr>
+              <a:t> written for </a:t>
+            </a:r>
+            <a:r>
+              <a:rPr lang="en-US" dirty="0">
+                <a:solidFill>
+                  <a:schemeClr val="accent3"/>
+                </a:solidFill>
+                <a:latin typeface="Arial" panose="020B0604020202020204" pitchFamily="34" charset="0"/>
+              </a:rPr>
+              <a:t>MINIX</a:t>
+            </a:r>
+            <a:r>
+              <a:rPr lang="en-US" dirty="0">
+                <a:solidFill>
+                  <a:schemeClr val="accent1"/>
+                </a:solidFill>
+                <a:latin typeface="Arial" panose="020B0604020202020204" pitchFamily="34" charset="0"/>
+              </a:rPr>
+              <a:t> were also used on </a:t>
+            </a:r>
+            <a:r>
+              <a:rPr lang="en-US" dirty="0" smtClean="0">
+                <a:solidFill>
+                  <a:schemeClr val="accent1"/>
+                </a:solidFill>
+                <a:latin typeface="Arial" panose="020B0604020202020204" pitchFamily="34" charset="0"/>
+              </a:rPr>
+              <a:t>Linux</a:t>
+            </a:r>
+            <a:r>
+              <a:rPr lang="fa-IR" dirty="0" smtClean="0">
+                <a:solidFill>
+                  <a:schemeClr val="accent1"/>
+                </a:solidFill>
+                <a:latin typeface="Arial" panose="020B0604020202020204" pitchFamily="34" charset="0"/>
+              </a:rPr>
+              <a:t>.</a:t>
+            </a:r>
+            <a:endParaRPr lang="en-US" dirty="0">
+              <a:solidFill>
+                <a:schemeClr val="accent1"/>
+              </a:solidFill>
+            </a:endParaRPr>
+          </a:p>
+        </p:txBody>
+      </p:sp>
+    </p:spTree>
+    <p:extLst>
+      <p:ext uri="{BB962C8B-B14F-4D97-AF65-F5344CB8AC3E}">
+        <p14:creationId xmlns:p14="http://schemas.microsoft.com/office/powerpoint/2010/main" val="423495024"/>
+      </p:ext>
+    </p:extLst>
+  </p:cSld>
+  <p:clrMapOvr>
+    <a:masterClrMapping/>
+  </p:clrMapOvr>
+  <p:timing>
+    <p:tnLst>
+      <p:par>
+        <p:cTn id="1" dur="indefinite" restart="never" nodeType="tmRoot"/>
+      </p:par>
+    </p:tnLst>
+  </p:timing>
+</p:sld>
+</file>
+
+<file path=ppt/slides/slide15.xml><?xml version="1.0" encoding="utf-8"?>
+<p:sld xmlns:a="http://schemas.openxmlformats.org/drawingml/2006/main" xmlns:r="http://schemas.openxmlformats.org/officeDocument/2006/relationships" xmlns:p="http://schemas.openxmlformats.org/presentationml/2006/main">
+  <p:cSld>
+    <p:spTree>
+      <p:nvGrpSpPr>
+        <p:cNvPr id="1" name=""/>
+        <p:cNvGrpSpPr/>
+        <p:nvPr/>
+      </p:nvGrpSpPr>
+      <p:grpSpPr>
+        <a:xfrm>
+          <a:off x="0" y="0"/>
+          <a:ext cx="0" cy="0"/>
+          <a:chOff x="0" y="0"/>
+          <a:chExt cx="0" cy="0"/>
+        </a:xfrm>
+      </p:grpSpPr>
+      <p:sp>
+        <p:nvSpPr>
+          <p:cNvPr id="4" name="Text Placeholder 2"/>
           <p:cNvSpPr>
             <a:spLocks noGrp="1"/>
           </p:cNvSpPr>
@@ -5390,12 +5955,99 @@
             <p:ph type="body" idx="1"/>
           </p:nvPr>
         </p:nvSpPr>
-        <p:spPr/>
-        <p:txBody>
-          <a:bodyPr/>
+        <p:spPr>
+          <a:xfrm>
+            <a:off x="381000" y="1724025"/>
+            <a:ext cx="10744200" cy="3609975"/>
+          </a:xfrm>
+        </p:spPr>
+        <p:txBody>
+          <a:bodyPr>
+            <a:noAutofit/>
+          </a:bodyPr>
           <a:lstStyle/>
           <a:p>
-            <a:endParaRPr lang="en-US"/>
+            <a:r>
+              <a:rPr lang="en-US" dirty="0"/>
+              <a:t> </a:t>
+            </a:r>
+            <a:r>
+              <a:rPr lang="en-US" dirty="0" smtClean="0"/>
+              <a:t> From</a:t>
+            </a:r>
+            <a:r>
+              <a:rPr lang="en-US" dirty="0"/>
+              <a:t>: torvalds@klaava.Helsinki.FI </a:t>
+            </a:r>
+            <a:r>
+              <a:rPr lang="en-US" dirty="0" smtClean="0"/>
+              <a:t>(Linus Benedict Torvalds)</a:t>
+            </a:r>
+          </a:p>
+          <a:p>
+            <a:r>
+              <a:rPr lang="en-US" dirty="0" smtClean="0"/>
+              <a:t>  Newsgroups: comp.os.minix</a:t>
+            </a:r>
+          </a:p>
+          <a:p>
+            <a:r>
+              <a:rPr lang="en-US" dirty="0" smtClean="0"/>
+              <a:t>  </a:t>
+            </a:r>
+            <a:r>
+              <a:rPr lang="en-US" dirty="0"/>
+              <a:t>Subject: Gcc-1.40 and a posix-question</a:t>
+            </a:r>
+          </a:p>
+          <a:p>
+            <a:r>
+              <a:rPr lang="en-US" dirty="0"/>
+              <a:t>  Message-ID:</a:t>
+            </a:r>
+          </a:p>
+          <a:p>
+            <a:r>
+              <a:rPr lang="en-US" dirty="0"/>
+              <a:t>  Date: 3 Jul 91 10:00:50 GMT</a:t>
+            </a:r>
+          </a:p>
+          <a:p>
+            <a:endParaRPr lang="en-US" dirty="0"/>
+          </a:p>
+          <a:p>
+            <a:r>
+              <a:rPr lang="en-US" dirty="0"/>
+              <a:t>  Hello netlanders,</a:t>
+            </a:r>
+          </a:p>
+          <a:p>
+            <a:endParaRPr lang="en-US" dirty="0"/>
+          </a:p>
+          <a:p>
+            <a:r>
+              <a:rPr lang="en-US" dirty="0"/>
+              <a:t>  Due to a project I'm working on (in minix), I'm interested in the posix</a:t>
+            </a:r>
+          </a:p>
+          <a:p>
+            <a:r>
+              <a:rPr lang="en-US" dirty="0"/>
+              <a:t>  standard definition. Could somebody please point me to a (preferably)</a:t>
+            </a:r>
+          </a:p>
+          <a:p>
+            <a:r>
+              <a:rPr lang="en-US" dirty="0"/>
+              <a:t>  machine-readable format of the latest posix rules? Ftp-sites would be</a:t>
+            </a:r>
+          </a:p>
+          <a:p>
+            <a:r>
+              <a:rPr lang="en-US" dirty="0"/>
+              <a:t>  nice.</a:t>
+            </a:r>
+            <a:endParaRPr lang="en-US" dirty="0"/>
           </a:p>
         </p:txBody>
       </p:sp>
@@ -5403,6 +6055,243 @@
     <p:extLst>
       <p:ext uri="{BB962C8B-B14F-4D97-AF65-F5344CB8AC3E}">
         <p14:creationId xmlns:p14="http://schemas.microsoft.com/office/powerpoint/2010/main" val="3930088505"/>
+      </p:ext>
+    </p:extLst>
+  </p:cSld>
+  <p:clrMapOvr>
+    <a:masterClrMapping/>
+  </p:clrMapOvr>
+</p:sld>
+</file>
+
+<file path=ppt/slides/slide16.xml><?xml version="1.0" encoding="utf-8"?>
+<p:sld xmlns:a="http://schemas.openxmlformats.org/drawingml/2006/main" xmlns:r="http://schemas.openxmlformats.org/officeDocument/2006/relationships" xmlns:p="http://schemas.openxmlformats.org/presentationml/2006/main">
+  <p:cSld>
+    <p:spTree>
+      <p:nvGrpSpPr>
+        <p:cNvPr id="1" name=""/>
+        <p:cNvGrpSpPr/>
+        <p:nvPr/>
+      </p:nvGrpSpPr>
+      <p:grpSpPr>
+        <a:xfrm>
+          <a:off x="0" y="0"/>
+          <a:ext cx="0" cy="0"/>
+          <a:chOff x="0" y="0"/>
+          <a:chExt cx="0" cy="0"/>
+        </a:xfrm>
+      </p:grpSpPr>
+      <p:sp>
+        <p:nvSpPr>
+          <p:cNvPr id="5" name="Rectangle 4"/>
+          <p:cNvSpPr/>
+          <p:nvPr/>
+        </p:nvSpPr>
+        <p:spPr>
+          <a:xfrm>
+            <a:off x="381000" y="533400"/>
+            <a:ext cx="11201400" cy="5632311"/>
+          </a:xfrm>
+          <a:prstGeom prst="rect">
+            <a:avLst/>
+          </a:prstGeom>
+        </p:spPr>
+        <p:txBody>
+          <a:bodyPr wrap="square">
+            <a:spAutoFit/>
+          </a:bodyPr>
+          <a:lstStyle/>
+          <a:p>
+            <a:endParaRPr lang="en-US" dirty="0">
+              <a:solidFill>
+                <a:schemeClr val="accent1"/>
+              </a:solidFill>
+            </a:endParaRPr>
+          </a:p>
+          <a:p>
+            <a:r>
+              <a:rPr lang="en-US" dirty="0">
+                <a:solidFill>
+                  <a:schemeClr val="accent1"/>
+                </a:solidFill>
+              </a:rPr>
+              <a:t>  Hello everybody out there using minix -</a:t>
+            </a:r>
+          </a:p>
+          <a:p>
+            <a:endParaRPr lang="en-US" dirty="0">
+              <a:solidFill>
+                <a:schemeClr val="accent1"/>
+              </a:solidFill>
+            </a:endParaRPr>
+          </a:p>
+          <a:p>
+            <a:r>
+              <a:rPr lang="en-US" dirty="0">
+                <a:solidFill>
+                  <a:schemeClr val="accent1"/>
+                </a:solidFill>
+              </a:rPr>
+              <a:t>  I'm doing a (free) operating system (just a hobby, won't be big and</a:t>
+            </a:r>
+          </a:p>
+          <a:p>
+            <a:r>
+              <a:rPr lang="en-US" dirty="0">
+                <a:solidFill>
+                  <a:schemeClr val="accent1"/>
+                </a:solidFill>
+              </a:rPr>
+              <a:t>  professional like gnu) for 386(486) AT clones.  This has been brewing</a:t>
+            </a:r>
+          </a:p>
+          <a:p>
+            <a:r>
+              <a:rPr lang="en-US" dirty="0">
+                <a:solidFill>
+                  <a:schemeClr val="accent1"/>
+                </a:solidFill>
+              </a:rPr>
+              <a:t>  since april, and is starting to get ready.  I'd like any feedback on</a:t>
+            </a:r>
+          </a:p>
+          <a:p>
+            <a:r>
+              <a:rPr lang="en-US" dirty="0">
+                <a:solidFill>
+                  <a:schemeClr val="accent1"/>
+                </a:solidFill>
+              </a:rPr>
+              <a:t>  things people like/dislike in minix, as my OS resembles it somewhat</a:t>
+            </a:r>
+          </a:p>
+          <a:p>
+            <a:r>
+              <a:rPr lang="en-US" dirty="0">
+                <a:solidFill>
+                  <a:schemeClr val="accent1"/>
+                </a:solidFill>
+              </a:rPr>
+              <a:t>  (same physical layout of the file-system (due to practical reasons)</a:t>
+            </a:r>
+          </a:p>
+          <a:p>
+            <a:r>
+              <a:rPr lang="en-US" dirty="0">
+                <a:solidFill>
+                  <a:schemeClr val="accent1"/>
+                </a:solidFill>
+              </a:rPr>
+              <a:t>  among other things).</a:t>
+            </a:r>
+          </a:p>
+          <a:p>
+            <a:endParaRPr lang="en-US" dirty="0">
+              <a:solidFill>
+                <a:schemeClr val="accent1"/>
+              </a:solidFill>
+            </a:endParaRPr>
+          </a:p>
+          <a:p>
+            <a:r>
+              <a:rPr lang="en-US" dirty="0">
+                <a:solidFill>
+                  <a:schemeClr val="accent1"/>
+                </a:solidFill>
+              </a:rPr>
+              <a:t>  I've currently ported bash(1.08) and gcc(1.40), and things seem to work.</a:t>
+            </a:r>
+          </a:p>
+          <a:p>
+            <a:r>
+              <a:rPr lang="en-US" dirty="0">
+                <a:solidFill>
+                  <a:schemeClr val="accent1"/>
+                </a:solidFill>
+              </a:rPr>
+              <a:t>  This implies that I'll get something practical within a few months, and</a:t>
+            </a:r>
+          </a:p>
+          <a:p>
+            <a:r>
+              <a:rPr lang="en-US" dirty="0">
+                <a:solidFill>
+                  <a:schemeClr val="accent1"/>
+                </a:solidFill>
+              </a:rPr>
+              <a:t>  I'd like to know what features most people would want.  Any suggestions</a:t>
+            </a:r>
+          </a:p>
+          <a:p>
+            <a:r>
+              <a:rPr lang="en-US" dirty="0">
+                <a:solidFill>
+                  <a:schemeClr val="accent1"/>
+                </a:solidFill>
+              </a:rPr>
+              <a:t>  are welcome, but I won't promise I'll implement them :-)</a:t>
+            </a:r>
+          </a:p>
+          <a:p>
+            <a:endParaRPr lang="en-US" dirty="0">
+              <a:solidFill>
+                <a:schemeClr val="accent1"/>
+              </a:solidFill>
+            </a:endParaRPr>
+          </a:p>
+          <a:p>
+            <a:r>
+              <a:rPr lang="en-US" dirty="0">
+                <a:solidFill>
+                  <a:schemeClr val="accent1"/>
+                </a:solidFill>
+              </a:rPr>
+              <a:t>                Linus (torvalds@kruuna.helsinki.fi)</a:t>
+            </a:r>
+          </a:p>
+          <a:p>
+            <a:endParaRPr lang="en-US" dirty="0">
+              <a:solidFill>
+                <a:schemeClr val="accent1"/>
+              </a:solidFill>
+            </a:endParaRPr>
+          </a:p>
+          <a:p>
+            <a:r>
+              <a:rPr lang="en-US" dirty="0">
+                <a:solidFill>
+                  <a:schemeClr val="accent1"/>
+                </a:solidFill>
+              </a:rPr>
+              <a:t>  PS.  Yes - it's free of any minix code, and it has a multi-threaded fs.</a:t>
+            </a:r>
+          </a:p>
+          <a:p>
+            <a:r>
+              <a:rPr lang="en-US" dirty="0">
+                <a:solidFill>
+                  <a:schemeClr val="accent1"/>
+                </a:solidFill>
+              </a:rPr>
+              <a:t>  It is NOT protable (uses 386 task switching etc), and it probably never</a:t>
+            </a:r>
+          </a:p>
+          <a:p>
+            <a:r>
+              <a:rPr lang="en-US" dirty="0">
+                <a:solidFill>
+                  <a:schemeClr val="accent1"/>
+                </a:solidFill>
+              </a:rPr>
+              <a:t>  will support anything other than AT-harddisks, as that's all I have :-(.</a:t>
+            </a:r>
+          </a:p>
+        </p:txBody>
+      </p:sp>
+    </p:spTree>
+    <p:extLst>
+      <p:ext uri="{BB962C8B-B14F-4D97-AF65-F5344CB8AC3E}">
+        <p14:creationId xmlns:p14="http://schemas.microsoft.com/office/powerpoint/2010/main" val="696767277"/>
       </p:ext>
     </p:extLst>
   </p:cSld>

</xml_diff>